<commit_message>
testing my new commit setup
</commit_message>
<xml_diff>
--- a/powerpoint/An Introduction to GIT.pptx
+++ b/powerpoint/An Introduction to GIT.pptx
@@ -218,7 +218,7 @@
           <a:p>
             <a:fld id="{CF5FA76E-0005-4B7A-ABE9-E41867DADC96}" type="datetimeFigureOut">
               <a:rPr lang="en-CA" smtClean="0"/>
-              <a:t>04/24/2015</a:t>
+              <a:t>04/27/2015</a:t>
             </a:fld>
             <a:endParaRPr lang="en-CA"/>
           </a:p>
@@ -1183,11 +1183,7 @@
             </a:r>
             <a:r>
               <a:rPr lang="en-CA" baseline="0" dirty="0" smtClean="0"/>
-              <a:t> still have not found a better way to use GIT</a:t>
-            </a:r>
-            <a:r>
-              <a:rPr lang="en-CA" baseline="0" dirty="0" smtClean="0"/>
-              <a:t>.</a:t>
+              <a:t> still have not found a better way to use GIT.</a:t>
             </a:r>
           </a:p>
           <a:p>
@@ -1195,7 +1191,6 @@
               <a:rPr lang="en-CA" baseline="0" dirty="0" smtClean="0"/>
               <a:t>GIT Extensions is a UI for GIT for </a:t>
             </a:r>
-            <a:endParaRPr lang="en-CA" baseline="0" dirty="0" smtClean="0"/>
           </a:p>
           <a:p>
             <a:r>
@@ -4269,7 +4264,7 @@
           <a:p>
             <a:fld id="{BF9F5C43-4730-4541-9866-C3226782E959}" type="datetimeFigureOut">
               <a:rPr lang="en-CA" smtClean="0"/>
-              <a:t>04/24/2015</a:t>
+              <a:t>04/27/2015</a:t>
             </a:fld>
             <a:endParaRPr lang="en-CA"/>
           </a:p>
@@ -4439,7 +4434,7 @@
           <a:p>
             <a:fld id="{BF9F5C43-4730-4541-9866-C3226782E959}" type="datetimeFigureOut">
               <a:rPr lang="en-CA" smtClean="0"/>
-              <a:t>04/24/2015</a:t>
+              <a:t>04/27/2015</a:t>
             </a:fld>
             <a:endParaRPr lang="en-CA"/>
           </a:p>
@@ -4619,7 +4614,7 @@
           <a:p>
             <a:fld id="{BF9F5C43-4730-4541-9866-C3226782E959}" type="datetimeFigureOut">
               <a:rPr lang="en-CA" smtClean="0"/>
-              <a:t>04/24/2015</a:t>
+              <a:t>04/27/2015</a:t>
             </a:fld>
             <a:endParaRPr lang="en-CA"/>
           </a:p>
@@ -4789,7 +4784,7 @@
           <a:p>
             <a:fld id="{BF9F5C43-4730-4541-9866-C3226782E959}" type="datetimeFigureOut">
               <a:rPr lang="en-CA" smtClean="0"/>
-              <a:t>04/24/2015</a:t>
+              <a:t>04/27/2015</a:t>
             </a:fld>
             <a:endParaRPr lang="en-CA"/>
           </a:p>
@@ -5035,7 +5030,7 @@
           <a:p>
             <a:fld id="{BF9F5C43-4730-4541-9866-C3226782E959}" type="datetimeFigureOut">
               <a:rPr lang="en-CA" smtClean="0"/>
-              <a:t>04/24/2015</a:t>
+              <a:t>04/27/2015</a:t>
             </a:fld>
             <a:endParaRPr lang="en-CA"/>
           </a:p>
@@ -5323,7 +5318,7 @@
           <a:p>
             <a:fld id="{BF9F5C43-4730-4541-9866-C3226782E959}" type="datetimeFigureOut">
               <a:rPr lang="en-CA" smtClean="0"/>
-              <a:t>04/24/2015</a:t>
+              <a:t>04/27/2015</a:t>
             </a:fld>
             <a:endParaRPr lang="en-CA"/>
           </a:p>
@@ -5745,7 +5740,7 @@
           <a:p>
             <a:fld id="{BF9F5C43-4730-4541-9866-C3226782E959}" type="datetimeFigureOut">
               <a:rPr lang="en-CA" smtClean="0"/>
-              <a:t>04/24/2015</a:t>
+              <a:t>04/27/2015</a:t>
             </a:fld>
             <a:endParaRPr lang="en-CA"/>
           </a:p>
@@ -5863,7 +5858,7 @@
           <a:p>
             <a:fld id="{BF9F5C43-4730-4541-9866-C3226782E959}" type="datetimeFigureOut">
               <a:rPr lang="en-CA" smtClean="0"/>
-              <a:t>04/24/2015</a:t>
+              <a:t>04/27/2015</a:t>
             </a:fld>
             <a:endParaRPr lang="en-CA"/>
           </a:p>
@@ -5958,7 +5953,7 @@
           <a:p>
             <a:fld id="{BF9F5C43-4730-4541-9866-C3226782E959}" type="datetimeFigureOut">
               <a:rPr lang="en-CA" smtClean="0"/>
-              <a:t>04/24/2015</a:t>
+              <a:t>04/27/2015</a:t>
             </a:fld>
             <a:endParaRPr lang="en-CA"/>
           </a:p>
@@ -6235,7 +6230,7 @@
           <a:p>
             <a:fld id="{BF9F5C43-4730-4541-9866-C3226782E959}" type="datetimeFigureOut">
               <a:rPr lang="en-CA" smtClean="0"/>
-              <a:t>04/24/2015</a:t>
+              <a:t>04/27/2015</a:t>
             </a:fld>
             <a:endParaRPr lang="en-CA"/>
           </a:p>
@@ -6488,7 +6483,7 @@
           <a:p>
             <a:fld id="{BF9F5C43-4730-4541-9866-C3226782E959}" type="datetimeFigureOut">
               <a:rPr lang="en-CA" smtClean="0"/>
-              <a:t>04/24/2015</a:t>
+              <a:t>04/27/2015</a:t>
             </a:fld>
             <a:endParaRPr lang="en-CA"/>
           </a:p>
@@ -6701,7 +6696,7 @@
           <a:p>
             <a:fld id="{BF9F5C43-4730-4541-9866-C3226782E959}" type="datetimeFigureOut">
               <a:rPr lang="en-CA" smtClean="0"/>
-              <a:t>04/24/2015</a:t>
+              <a:t>04/27/2015</a:t>
             </a:fld>
             <a:endParaRPr lang="en-CA"/>
           </a:p>
@@ -8385,23 +8380,7 @@
                   <a:srgbClr val="FF0000"/>
                 </a:solidFill>
               </a:rPr>
-              <a:t>BEWARE OF TOOLS THAT </a:t>
-            </a:r>
-            <a:r>
-              <a:rPr lang="en-CA" sz="5400" b="1" dirty="0" smtClean="0">
-                <a:solidFill>
-                  <a:srgbClr val="FF0000"/>
-                </a:solidFill>
-              </a:rPr>
-              <a:t>(TRY TO) </a:t>
-            </a:r>
-            <a:r>
-              <a:rPr lang="en-CA" sz="5400" b="1" dirty="0" smtClean="0">
-                <a:solidFill>
-                  <a:srgbClr val="FF0000"/>
-                </a:solidFill>
-              </a:rPr>
-              <a:t>DO THE THINKING FOR YOU!</a:t>
+              <a:t>BEWARE OF TOOLS THAT (TRY TO) DO THE THINKING FOR YOU!</a:t>
             </a:r>
             <a:endParaRPr lang="en-CA" sz="5400" b="1" dirty="0">
               <a:solidFill>
@@ -8758,11 +8737,7 @@
           <a:p>
             <a:r>
               <a:rPr lang="en-CA" dirty="0" smtClean="0"/>
-              <a:t>Clone – replicate a remote repository into a local repository in its entirety. The entire history of the repository gets copied over. The remote repository is set as an upstream repository so you can use push/pull to synchronize it</a:t>
-            </a:r>
-            <a:r>
-              <a:rPr lang="en-CA" dirty="0" smtClean="0"/>
-              <a:t>.</a:t>
+              <a:t>Clone – replicate a remote repository into a local repository in its entirety. The entire history of the repository gets copied over. The remote repository is set as an upstream repository so you can use push/pull to synchronize it.</a:t>
             </a:r>
           </a:p>
           <a:p>
@@ -9253,7 +9228,6 @@
               <a:rPr lang="en-CA" sz="1600" dirty="0" smtClean="0"/>
               <a:t>/Clone/Add/Check-in/Check-out</a:t>
             </a:r>
-            <a:endParaRPr lang="en-CA" sz="1600" dirty="0" smtClean="0"/>
           </a:p>
           <a:p>
             <a:pPr lvl="1"/>
@@ -9290,7 +9264,6 @@
               <a:rPr lang="en-CA" sz="1600" dirty="0" smtClean="0"/>
               <a:t>Rolling Back Changes</a:t>
             </a:r>
-            <a:endParaRPr lang="en-CA" sz="1600" dirty="0" smtClean="0"/>
           </a:p>
           <a:p>
             <a:r>
@@ -9309,11 +9282,7 @@
             <a:pPr lvl="1"/>
             <a:r>
               <a:rPr lang="en-CA" sz="1600" dirty="0" smtClean="0"/>
-              <a:t>Where is my branch</a:t>
-            </a:r>
-            <a:r>
-              <a:rPr lang="en-CA" sz="1600" dirty="0" smtClean="0"/>
-              <a:t>?</a:t>
+              <a:t>Where is my branch?</a:t>
             </a:r>
           </a:p>
           <a:p>
@@ -9322,7 +9291,6 @@
               <a:rPr lang="en-CA" sz="1600" dirty="0" smtClean="0"/>
               <a:t>Merging a branch</a:t>
             </a:r>
-            <a:endParaRPr lang="en-CA" sz="1600" dirty="0" smtClean="0"/>
           </a:p>
           <a:p>
             <a:pPr lvl="1"/>
@@ -9330,7 +9298,6 @@
               <a:rPr lang="en-CA" sz="1600" dirty="0" smtClean="0"/>
               <a:t>Cherry-picking</a:t>
             </a:r>
-            <a:endParaRPr lang="en-CA" sz="1600" dirty="0" smtClean="0"/>
           </a:p>
           <a:p>
             <a:pPr lvl="1"/>
@@ -9342,11 +9309,7 @@
           <a:p>
             <a:r>
               <a:rPr lang="en-CA" sz="1600" dirty="0" smtClean="0"/>
-              <a:t>How </a:t>
-            </a:r>
-            <a:r>
-              <a:rPr lang="en-CA" sz="1600" dirty="0" smtClean="0"/>
-              <a:t>to manage a large application with GIT</a:t>
+              <a:t>How to manage a large application with GIT</a:t>
             </a:r>
           </a:p>
           <a:p>
@@ -9380,15 +9343,7 @@
             <a:pPr lvl="1"/>
             <a:r>
               <a:rPr lang="en-CA" sz="1600" dirty="0" smtClean="0"/>
-              <a:t>How to </a:t>
-            </a:r>
-            <a:r>
-              <a:rPr lang="en-CA" sz="1600" dirty="0" smtClean="0"/>
-              <a:t>use a </a:t>
-            </a:r>
-            <a:r>
-              <a:rPr lang="en-CA" sz="1600" dirty="0" smtClean="0"/>
-              <a:t>native TFS repository with GIT?</a:t>
+              <a:t>How to use a native TFS repository with GIT?</a:t>
             </a:r>
           </a:p>
           <a:p>
@@ -9625,7 +9580,7 @@
         <p:spPr>
           <a:xfrm>
             <a:off x="3786703" y="2556773"/>
-            <a:ext cx="4621458" cy="646331"/>
+            <a:ext cx="4661084" cy="646331"/>
           </a:xfrm>
           <a:prstGeom prst="rect">
             <a:avLst/>
@@ -9640,13 +9595,37 @@
           <a:p>
             <a:r>
               <a:rPr lang="en-CA" b="1" dirty="0" smtClean="0"/>
-              <a:t>Conflict area begins. HEAD is the head pointer </a:t>
-            </a:r>
-          </a:p>
-          <a:p>
+              <a:t>Conflict area begins. HEAD is the </a:t>
+            </a:r>
             <a:r>
               <a:rPr lang="en-CA" b="1" dirty="0" smtClean="0"/>
-              <a:t>of your repository.  Your version is on top.</a:t>
+              <a:t>development </a:t>
+            </a:r>
+          </a:p>
+          <a:p>
+            <a:r>
+              <a:rPr lang="en-CA" b="1" dirty="0" smtClean="0"/>
+              <a:t>pointer </a:t>
+            </a:r>
+            <a:r>
+              <a:rPr lang="en-CA" b="1" dirty="0"/>
+              <a:t> </a:t>
+            </a:r>
+            <a:r>
+              <a:rPr lang="en-CA" b="1" dirty="0" smtClean="0"/>
+              <a:t>of </a:t>
+            </a:r>
+            <a:r>
+              <a:rPr lang="en-CA" b="1" dirty="0" smtClean="0"/>
+              <a:t>your </a:t>
+            </a:r>
+            <a:r>
+              <a:rPr lang="en-CA" b="1" dirty="0" smtClean="0"/>
+              <a:t>branch.  </a:t>
+            </a:r>
+            <a:r>
+              <a:rPr lang="en-CA" b="1" dirty="0" smtClean="0"/>
+              <a:t>Your version is on top.</a:t>
             </a:r>
             <a:endParaRPr lang="en-CA" b="1" dirty="0"/>
           </a:p>

</xml_diff>

<commit_message>
completed section on branching and tagging.
</commit_message>
<xml_diff>
--- a/powerpoint/An Introduction to GIT.pptx
+++ b/powerpoint/An Introduction to GIT.pptx
@@ -5,7 +5,7 @@
     <p:sldMasterId id="2147483648" r:id="rId1"/>
   </p:sldMasterIdLst>
   <p:notesMasterIdLst>
-    <p:notesMasterId r:id="rId29"/>
+    <p:notesMasterId r:id="rId31"/>
   </p:notesMasterIdLst>
   <p:sldIdLst>
     <p:sldId id="256" r:id="rId2"/>
@@ -34,7 +34,9 @@
     <p:sldId id="279" r:id="rId25"/>
     <p:sldId id="280" r:id="rId26"/>
     <p:sldId id="282" r:id="rId27"/>
-    <p:sldId id="281" r:id="rId28"/>
+    <p:sldId id="283" r:id="rId28"/>
+    <p:sldId id="281" r:id="rId29"/>
+    <p:sldId id="284" r:id="rId30"/>
   </p:sldIdLst>
   <p:sldSz cx="9144000" cy="6858000" type="screen4x3"/>
   <p:notesSz cx="6858000" cy="9144000"/>
@@ -545,11 +547,7 @@
             </a:r>
             <a:r>
               <a:rPr lang="en-CA" baseline="0" dirty="0" smtClean="0"/>
-              <a:t> to be an expert</a:t>
-            </a:r>
-            <a:r>
-              <a:rPr lang="en-CA" baseline="0" dirty="0" smtClean="0"/>
-              <a:t>. I learned it on a Linux command line for a personal project, so I am using it this way almost exclusively. I don’t claim this is the only or the best way to do it. I do not focus on the command-line syntax. I introduce the language. I introduce the concepts. I want you to have the right picture in your head when working with GIT. You are free to use it either directly, or by means of any tool you find appealing.</a:t>
+              <a:t> to be an expert. I learned it on a Linux command line for a personal project, so I am using it this way almost exclusively. I don’t claim this is the only or the best way to do it. I do not focus on the command-line syntax. I introduce the language. I introduce the concepts. I want you to have the right picture in your head when working with GIT. You are free to use it either directly, or by means of any tool you find appealing.</a:t>
             </a:r>
             <a:endParaRPr lang="en-CA" dirty="0"/>
           </a:p>
@@ -1189,21 +1187,8 @@
           <a:p>
             <a:r>
               <a:rPr lang="en-CA" baseline="0" dirty="0" smtClean="0"/>
-              <a:t>GIT Extensions is </a:t>
-            </a:r>
-            <a:r>
-              <a:rPr lang="en-CA" baseline="0" dirty="0" smtClean="0"/>
-              <a:t>a very simple usable </a:t>
-            </a:r>
-            <a:r>
-              <a:rPr lang="en-CA" baseline="0" dirty="0" smtClean="0"/>
-              <a:t>UI for GIT for </a:t>
-            </a:r>
-            <a:r>
-              <a:rPr lang="en-CA" baseline="0" dirty="0" smtClean="0"/>
-              <a:t>lots of platforms. Highly recommend.</a:t>
-            </a:r>
-            <a:endParaRPr lang="en-CA" baseline="0" dirty="0" smtClean="0"/>
+              <a:t>GIT Extensions is a very simple usable UI for GIT for lots of platforms. Highly recommend.</a:t>
+            </a:r>
           </a:p>
           <a:p>
             <a:r>
@@ -1228,13 +1213,8 @@
           <a:p>
             <a:r>
               <a:rPr lang="en-CA" baseline="0" dirty="0" smtClean="0"/>
-              <a:t>GIT-TF works with GIT for Windows to allow integration of native TFS repositories with GIT. It works surprisingly </a:t>
-            </a:r>
-            <a:r>
-              <a:rPr lang="en-CA" baseline="0" dirty="0" smtClean="0"/>
-              <a:t>well, given how different TFS is.</a:t>
-            </a:r>
-            <a:endParaRPr lang="en-CA" baseline="0" dirty="0" smtClean="0"/>
+              <a:t>GIT-TF works with GIT for Windows to allow integration of native TFS repositories with GIT. It works surprisingly well, given how different TFS is.</a:t>
+            </a:r>
           </a:p>
           <a:p>
             <a:r>
@@ -1705,7 +1685,11 @@
             </a:pPr>
             <a:r>
               <a:rPr lang="en-CA" dirty="0" smtClean="0"/>
-              <a:t>G:\temp\gitdemo&gt;git push</a:t>
+              <a:t>G</a:t>
+            </a:r>
+            <a:r>
+              <a:rPr lang="en-CA" dirty="0" smtClean="0"/>
+              <a:t>:\temp\gitdemo&gt;git push</a:t>
             </a:r>
           </a:p>
           <a:p>
@@ -1854,8 +1838,22 @@
           <a:p>
             <a:r>
               <a:rPr lang="en-CA" baseline="0" dirty="0" smtClean="0"/>
-              <a:t>hint: See the 'Note about fast-forwards' in 'git push --help' for details.</a:t>
-            </a:r>
+              <a:t>hint: See the 'Note about fast-forwards' in 'git push --help' for details</a:t>
+            </a:r>
+            <a:r>
+              <a:rPr lang="en-CA" baseline="0" dirty="0" smtClean="0"/>
+              <a:t>.</a:t>
+            </a:r>
+          </a:p>
+          <a:p>
+            <a:endParaRPr lang="en-CA" baseline="0" dirty="0" smtClean="0"/>
+          </a:p>
+          <a:p>
+            <a:r>
+              <a:rPr lang="en-CA" baseline="0" dirty="0" smtClean="0"/>
+              <a:t>*** Don’t pull just yet.</a:t>
+            </a:r>
+            <a:endParaRPr lang="en-CA" baseline="0" dirty="0" smtClean="0"/>
           </a:p>
         </p:txBody>
       </p:sp>
@@ -2597,15 +2595,27 @@
             </a:r>
             <a:r>
               <a:rPr lang="en-CA" baseline="0" dirty="0" smtClean="0"/>
-              <a:t>, though as you can see it is used very differently: with GIT you will be using branches to track your work items, not just entire projects. Rolling back a feature in this case is a simple exercise in locating the branch it was implemented in and rolling back the merge commit for it. One does not need to know what the change is, or even where it is, in order to undo it</a:t>
+              <a:t>, though as you can see it is used very differently: with GIT you will be using branches to track your </a:t>
             </a:r>
             <a:r>
               <a:rPr lang="en-CA" baseline="0" dirty="0" smtClean="0"/>
-              <a:t>. Also, that features can be re-merged at some point in the future, bring </a:t>
-            </a:r>
-            <a:r>
-              <a:rPr lang="en-CA" baseline="0" smtClean="0"/>
-              <a:t>it </a:t>
+              <a:t>personal work </a:t>
+            </a:r>
+            <a:r>
+              <a:rPr lang="en-CA" baseline="0" dirty="0" smtClean="0"/>
+              <a:t>items, not </a:t>
+            </a:r>
+            <a:r>
+              <a:rPr lang="en-CA" baseline="0" dirty="0" smtClean="0"/>
+              <a:t>simply </a:t>
+            </a:r>
+            <a:r>
+              <a:rPr lang="en-CA" baseline="0" dirty="0" smtClean="0"/>
+              <a:t>entire projects. Rolling back a feature in this case is a simple exercise in locating the branch it was implemented in and rolling back the merge commit for it. One does not need to know what the change is, or even where it is, in order to undo it. Also, that features can be re-merged at some point in the future, bring it </a:t>
+            </a:r>
+            <a:r>
+              <a:rPr lang="en-CA" baseline="0" dirty="0" smtClean="0"/>
+              <a:t>back.</a:t>
             </a:r>
             <a:endParaRPr lang="en-CA" baseline="0" dirty="0" smtClean="0"/>
           </a:p>
@@ -2615,7 +2625,23 @@
           <a:p>
             <a:r>
               <a:rPr lang="en-CA" baseline="0" dirty="0" smtClean="0"/>
-              <a:t>What is the main branch? This is the branch your GIT repository is first created with. It is called “master”. What is special about it? Nothing, it was just the first branch created. There is nothing to say you have to always merge to it, though this is the accepted practice.</a:t>
+              <a:t>What is the main branch? This is the branch your GIT repository is first created with. It is </a:t>
+            </a:r>
+            <a:r>
+              <a:rPr lang="en-CA" baseline="0" dirty="0" smtClean="0"/>
+              <a:t>usually called </a:t>
+            </a:r>
+            <a:r>
+              <a:rPr lang="en-CA" baseline="0" dirty="0" smtClean="0"/>
+              <a:t>“master”. What is special about it? Nothing, it was just the first branch created. There is nothing to say you have to always </a:t>
+            </a:r>
+            <a:r>
+              <a:rPr lang="en-CA" baseline="0" dirty="0" smtClean="0"/>
+              <a:t>ultimately merge </a:t>
+            </a:r>
+            <a:r>
+              <a:rPr lang="en-CA" baseline="0" dirty="0" smtClean="0"/>
+              <a:t>to it, though this is the accepted practice.</a:t>
             </a:r>
           </a:p>
         </p:txBody>
@@ -2702,8 +2728,29 @@
           <a:p>
             <a:r>
               <a:rPr lang="en-CA" baseline="0" dirty="0" smtClean="0"/>
-              <a:t>I rolled back a merge before, which effectively deleted the commits performed after my branch’s sync point at the time. Ouch! What happens to the GIT repository that pushed them now? Nothing, it is fine and well, but an attempt to sync again yields something rather interesting.</a:t>
-            </a:r>
+              <a:t>I rolled back a merge before, which effectively deleted the commits performed after my branch’s sync point at the time. Ouch! What happens to the GIT repository that pushed them now? Nothing, it is fine and well, </a:t>
+            </a:r>
+            <a:r>
+              <a:rPr lang="en-CA" baseline="0" dirty="0" smtClean="0"/>
+              <a:t>it simply has to be pushed again. An </a:t>
+            </a:r>
+            <a:r>
+              <a:rPr lang="en-CA" baseline="0" dirty="0" smtClean="0"/>
+              <a:t>attempt to </a:t>
+            </a:r>
+            <a:r>
+              <a:rPr lang="en-CA" baseline="0" dirty="0" smtClean="0"/>
+              <a:t>do so </a:t>
+            </a:r>
+            <a:r>
+              <a:rPr lang="en-CA" baseline="0" dirty="0" smtClean="0"/>
+              <a:t>yields something rather </a:t>
+            </a:r>
+            <a:r>
+              <a:rPr lang="en-CA" baseline="0" dirty="0" smtClean="0"/>
+              <a:t>interesting:</a:t>
+            </a:r>
+            <a:endParaRPr lang="en-CA" baseline="0" dirty="0" smtClean="0"/>
           </a:p>
           <a:p>
             <a:endParaRPr lang="en-CA" baseline="0" dirty="0" smtClean="0"/>
@@ -2784,6 +2831,33 @@
             <a:endParaRPr lang="en-CA" dirty="0" smtClean="0"/>
           </a:p>
           <a:p>
+            <a:endParaRPr lang="en-CA" dirty="0" smtClean="0"/>
+          </a:p>
+          <a:p>
+            <a:r>
+              <a:rPr lang="en-CA" dirty="0" smtClean="0"/>
+              <a:t>I</a:t>
+            </a:r>
+            <a:r>
+              <a:rPr lang="en-CA" baseline="0" dirty="0" smtClean="0"/>
+              <a:t> have created a local branch. And this is how I push it to the world</a:t>
+            </a:r>
+          </a:p>
+          <a:p>
+            <a:endParaRPr lang="en-CA" baseline="0" dirty="0" smtClean="0"/>
+          </a:p>
+          <a:p>
+            <a:r>
+              <a:rPr lang="en-CA" dirty="0" smtClean="0"/>
+              <a:t>$ git push origin </a:t>
+            </a:r>
+            <a:r>
+              <a:rPr lang="en-CA" dirty="0" err="1" smtClean="0"/>
+              <a:t>testbranch</a:t>
+            </a:r>
+            <a:endParaRPr lang="en-CA" dirty="0" smtClean="0"/>
+          </a:p>
+          <a:p>
             <a:r>
               <a:rPr lang="en-CA" dirty="0" smtClean="0"/>
               <a:t>To </a:t>
@@ -2827,39 +2901,72 @@
           <a:p>
             <a:r>
               <a:rPr lang="en-CA" dirty="0" smtClean="0"/>
-              <a:t>I</a:t>
-            </a:r>
-            <a:r>
-              <a:rPr lang="en-CA" baseline="0" dirty="0" smtClean="0"/>
-              <a:t> have created a local branch. And this is how I push it to the world</a:t>
-            </a:r>
-          </a:p>
-          <a:p>
-            <a:endParaRPr lang="en-CA" baseline="0" dirty="0" smtClean="0"/>
-          </a:p>
-          <a:p>
-            <a:r>
-              <a:rPr lang="en-CA" dirty="0" smtClean="0"/>
-              <a:t>$ git push origin </a:t>
+              <a:t>No </a:t>
+            </a:r>
+            <a:r>
+              <a:rPr lang="en-CA" dirty="0" smtClean="0"/>
+              <a:t>conflict </a:t>
+            </a:r>
+            <a:r>
+              <a:rPr lang="en-CA" dirty="0" smtClean="0"/>
+              <a:t>now, at least not in my </a:t>
             </a:r>
             <a:r>
               <a:rPr lang="en-CA" dirty="0" err="1" smtClean="0"/>
               <a:t>testbranch</a:t>
             </a:r>
-            <a:endParaRPr lang="en-CA" dirty="0" smtClean="0"/>
-          </a:p>
-          <a:p>
-            <a:endParaRPr lang="en-CA" dirty="0" smtClean="0"/>
-          </a:p>
-          <a:p>
-            <a:r>
-              <a:rPr lang="en-CA" dirty="0" smtClean="0"/>
-              <a:t>No conflict now. I haven’t avoided it, though,</a:t>
+            <a:r>
+              <a:rPr lang="en-CA" dirty="0" smtClean="0"/>
+              <a:t>. </a:t>
+            </a:r>
+            <a:r>
+              <a:rPr lang="en-CA" dirty="0" smtClean="0"/>
+              <a:t>I haven’t avoided it, though,</a:t>
             </a:r>
             <a:r>
               <a:rPr lang="en-CA" baseline="0" dirty="0" smtClean="0"/>
-              <a:t> I have simply created an alternative development flow. I am free to develop in my own separate branch, until I try to merge my branch to the master. That conflict will happen all over again then.</a:t>
-            </a:r>
+              <a:t> I have simply created an alternative development flow. I am free to develop in my own separate branch, until I try to merge my branch to the master. That conflict will happen all over again then</a:t>
+            </a:r>
+            <a:r>
+              <a:rPr lang="en-CA" baseline="0" dirty="0" smtClean="0"/>
+              <a:t>.</a:t>
+            </a:r>
+          </a:p>
+          <a:p>
+            <a:endParaRPr lang="en-CA" baseline="0" dirty="0" smtClean="0"/>
+          </a:p>
+          <a:p>
+            <a:r>
+              <a:rPr lang="en-CA" baseline="0" dirty="0" smtClean="0"/>
+              <a:t>G:\github\demo&gt;git fetch origin master</a:t>
+            </a:r>
+          </a:p>
+          <a:p>
+            <a:r>
+              <a:rPr lang="en-CA" baseline="0" dirty="0" smtClean="0"/>
+              <a:t>From </a:t>
+            </a:r>
+            <a:r>
+              <a:rPr lang="en-CA" baseline="0" dirty="0" err="1" smtClean="0"/>
+              <a:t>github.com:kangelov</a:t>
+            </a:r>
+            <a:r>
+              <a:rPr lang="en-CA" baseline="0" dirty="0" smtClean="0"/>
+              <a:t>/demo</a:t>
+            </a:r>
+          </a:p>
+          <a:p>
+            <a:r>
+              <a:rPr lang="en-CA" baseline="0" dirty="0" smtClean="0"/>
+              <a:t> * branch            master     -&gt; FETCH_HEAD</a:t>
+            </a:r>
+          </a:p>
+          <a:p>
+            <a:r>
+              <a:rPr lang="en-CA" baseline="0" dirty="0" smtClean="0"/>
+              <a:t>G:\github\demo&gt;git log --all --branches --decorate --graph</a:t>
+            </a:r>
+            <a:endParaRPr lang="en-CA" baseline="0" dirty="0" smtClean="0"/>
           </a:p>
           <a:p>
             <a:endParaRPr lang="en-CA" baseline="0" dirty="0" smtClean="0"/>
@@ -2956,6 +3063,50 @@
           <a:bodyPr/>
           <a:lstStyle/>
           <a:p>
+            <a:r>
+              <a:rPr lang="en-CA" dirty="0" smtClean="0"/>
+              <a:t>Time to bite the bullet and</a:t>
+            </a:r>
+            <a:r>
+              <a:rPr lang="en-CA" baseline="0" dirty="0" smtClean="0"/>
+              <a:t> fix my conflict.</a:t>
+            </a:r>
+          </a:p>
+          <a:p>
+            <a:endParaRPr lang="en-CA" baseline="0" dirty="0" smtClean="0"/>
+          </a:p>
+          <a:p>
+            <a:r>
+              <a:rPr lang="en-CA" baseline="0" dirty="0" smtClean="0"/>
+              <a:t>git checkout master</a:t>
+            </a:r>
+          </a:p>
+          <a:p>
+            <a:r>
+              <a:rPr lang="en-CA" baseline="0" dirty="0" smtClean="0"/>
+              <a:t>git merge </a:t>
+            </a:r>
+            <a:r>
+              <a:rPr lang="en-CA" baseline="0" dirty="0" err="1" smtClean="0"/>
+              <a:t>testbranch</a:t>
+            </a:r>
+            <a:endParaRPr lang="en-CA" baseline="0" dirty="0" smtClean="0"/>
+          </a:p>
+          <a:p>
+            <a:r>
+              <a:rPr lang="en-CA" dirty="0" smtClean="0"/>
+              <a:t>git</a:t>
+            </a:r>
+            <a:r>
+              <a:rPr lang="en-CA" baseline="0" dirty="0" smtClean="0"/>
+              <a:t> add test.txt</a:t>
+            </a:r>
+          </a:p>
+          <a:p>
+            <a:r>
+              <a:rPr lang="en-CA" baseline="0" dirty="0" smtClean="0"/>
+              <a:t>git commit</a:t>
+            </a:r>
             <a:endParaRPr lang="en-CA" dirty="0"/>
           </a:p>
         </p:txBody>
@@ -2987,6 +3138,728 @@
     <p:extLst>
       <p:ext uri="{BB962C8B-B14F-4D97-AF65-F5344CB8AC3E}">
         <p14:creationId xmlns:p14="http://schemas.microsoft.com/office/powerpoint/2010/main" val="714024740"/>
+      </p:ext>
+    </p:extLst>
+  </p:cSld>
+  <p:clrMapOvr>
+    <a:masterClrMapping/>
+  </p:clrMapOvr>
+</p:notes>
+</file>
+
+<file path=ppt/notesSlides/notesSlide23.xml><?xml version="1.0" encoding="utf-8"?>
+<p:notes xmlns:a="http://schemas.openxmlformats.org/drawingml/2006/main" xmlns:r="http://schemas.openxmlformats.org/officeDocument/2006/relationships" xmlns:p="http://schemas.openxmlformats.org/presentationml/2006/main">
+  <p:cSld>
+    <p:spTree>
+      <p:nvGrpSpPr>
+        <p:cNvPr id="1" name=""/>
+        <p:cNvGrpSpPr/>
+        <p:nvPr/>
+      </p:nvGrpSpPr>
+      <p:grpSpPr>
+        <a:xfrm>
+          <a:off x="0" y="0"/>
+          <a:ext cx="0" cy="0"/>
+          <a:chOff x="0" y="0"/>
+          <a:chExt cx="0" cy="0"/>
+        </a:xfrm>
+      </p:grpSpPr>
+      <p:sp>
+        <p:nvSpPr>
+          <p:cNvPr id="2" name="Slide Image Placeholder 1"/>
+          <p:cNvSpPr>
+            <a:spLocks noGrp="1" noRot="1" noChangeAspect="1"/>
+          </p:cNvSpPr>
+          <p:nvPr>
+            <p:ph type="sldImg"/>
+          </p:nvPr>
+        </p:nvSpPr>
+        <p:spPr/>
+      </p:sp>
+      <p:sp>
+        <p:nvSpPr>
+          <p:cNvPr id="3" name="Notes Placeholder 2"/>
+          <p:cNvSpPr>
+            <a:spLocks noGrp="1"/>
+          </p:cNvSpPr>
+          <p:nvPr>
+            <p:ph type="body" idx="1"/>
+          </p:nvPr>
+        </p:nvSpPr>
+        <p:spPr/>
+        <p:txBody>
+          <a:bodyPr/>
+          <a:lstStyle/>
+          <a:p>
+            <a:r>
+              <a:rPr lang="en-CA" dirty="0" smtClean="0"/>
+              <a:t>You should only really consider doing this to rid a repository of abandoned branches as part of an effort to trim</a:t>
+            </a:r>
+            <a:r>
+              <a:rPr lang="en-CA" baseline="0" dirty="0" smtClean="0"/>
+              <a:t> it down. Under normal circumstances a developer should not be doing this.</a:t>
+            </a:r>
+            <a:endParaRPr lang="en-CA" dirty="0" smtClean="0"/>
+          </a:p>
+          <a:p>
+            <a:endParaRPr lang="en-CA" dirty="0" smtClean="0"/>
+          </a:p>
+          <a:p>
+            <a:r>
+              <a:rPr lang="en-CA" dirty="0" smtClean="0"/>
+              <a:t>G:\gitdemo&gt;git branch -D test</a:t>
+            </a:r>
+          </a:p>
+          <a:p>
+            <a:r>
+              <a:rPr lang="en-CA" dirty="0" smtClean="0"/>
+              <a:t>Deleted branch test (was c0cbc0d).</a:t>
+            </a:r>
+          </a:p>
+          <a:p>
+            <a:endParaRPr lang="en-CA" dirty="0" smtClean="0"/>
+          </a:p>
+          <a:p>
+            <a:r>
+              <a:rPr lang="en-CA" dirty="0" smtClean="0"/>
+              <a:t>G:\gitdemo&gt;git push origin :test</a:t>
+            </a:r>
+          </a:p>
+          <a:p>
+            <a:r>
+              <a:rPr lang="en-CA" dirty="0" smtClean="0"/>
+              <a:t>To </a:t>
+            </a:r>
+            <a:r>
+              <a:rPr lang="en-CA" dirty="0" err="1" smtClean="0"/>
+              <a:t>git@github.com:kangelov</a:t>
+            </a:r>
+            <a:r>
+              <a:rPr lang="en-CA" dirty="0" smtClean="0"/>
+              <a:t>/</a:t>
+            </a:r>
+            <a:r>
+              <a:rPr lang="en-CA" dirty="0" err="1" smtClean="0"/>
+              <a:t>gitdemo.git</a:t>
+            </a:r>
+            <a:endParaRPr lang="en-CA" dirty="0" smtClean="0"/>
+          </a:p>
+          <a:p>
+            <a:r>
+              <a:rPr lang="en-CA" dirty="0" smtClean="0"/>
+              <a:t> - [deleted]         test</a:t>
+            </a:r>
+          </a:p>
+          <a:p>
+            <a:endParaRPr lang="en-CA" dirty="0"/>
+          </a:p>
+        </p:txBody>
+      </p:sp>
+      <p:sp>
+        <p:nvSpPr>
+          <p:cNvPr id="4" name="Slide Number Placeholder 3"/>
+          <p:cNvSpPr>
+            <a:spLocks noGrp="1"/>
+          </p:cNvSpPr>
+          <p:nvPr>
+            <p:ph type="sldNum" sz="quarter" idx="10"/>
+          </p:nvPr>
+        </p:nvSpPr>
+        <p:spPr/>
+        <p:txBody>
+          <a:bodyPr/>
+          <a:lstStyle/>
+          <a:p>
+            <a:fld id="{CB55E3E3-40A9-4EFD-94DF-114BB2F8C3AE}" type="slidenum">
+              <a:rPr lang="en-CA" smtClean="0"/>
+              <a:t>27</a:t>
+            </a:fld>
+            <a:endParaRPr lang="en-CA"/>
+          </a:p>
+        </p:txBody>
+      </p:sp>
+    </p:spTree>
+    <p:extLst>
+      <p:ext uri="{BB962C8B-B14F-4D97-AF65-F5344CB8AC3E}">
+        <p14:creationId xmlns:p14="http://schemas.microsoft.com/office/powerpoint/2010/main" val="1739495290"/>
+      </p:ext>
+    </p:extLst>
+  </p:cSld>
+  <p:clrMapOvr>
+    <a:masterClrMapping/>
+  </p:clrMapOvr>
+</p:notes>
+</file>
+
+<file path=ppt/notesSlides/notesSlide24.xml><?xml version="1.0" encoding="utf-8"?>
+<p:notes xmlns:a="http://schemas.openxmlformats.org/drawingml/2006/main" xmlns:r="http://schemas.openxmlformats.org/officeDocument/2006/relationships" xmlns:p="http://schemas.openxmlformats.org/presentationml/2006/main">
+  <p:cSld>
+    <p:spTree>
+      <p:nvGrpSpPr>
+        <p:cNvPr id="1" name=""/>
+        <p:cNvGrpSpPr/>
+        <p:nvPr/>
+      </p:nvGrpSpPr>
+      <p:grpSpPr>
+        <a:xfrm>
+          <a:off x="0" y="0"/>
+          <a:ext cx="0" cy="0"/>
+          <a:chOff x="0" y="0"/>
+          <a:chExt cx="0" cy="0"/>
+        </a:xfrm>
+      </p:grpSpPr>
+      <p:sp>
+        <p:nvSpPr>
+          <p:cNvPr id="2" name="Slide Image Placeholder 1"/>
+          <p:cNvSpPr>
+            <a:spLocks noGrp="1" noRot="1" noChangeAspect="1"/>
+          </p:cNvSpPr>
+          <p:nvPr>
+            <p:ph type="sldImg"/>
+          </p:nvPr>
+        </p:nvSpPr>
+        <p:spPr/>
+      </p:sp>
+      <p:sp>
+        <p:nvSpPr>
+          <p:cNvPr id="3" name="Notes Placeholder 2"/>
+          <p:cNvSpPr>
+            <a:spLocks noGrp="1"/>
+          </p:cNvSpPr>
+          <p:nvPr>
+            <p:ph type="body" idx="1"/>
+          </p:nvPr>
+        </p:nvSpPr>
+        <p:spPr/>
+        <p:txBody>
+          <a:bodyPr/>
+          <a:lstStyle/>
+          <a:p>
+            <a:r>
+              <a:rPr lang="en-CA" dirty="0" smtClean="0"/>
+              <a:t>Ok, so I am going to go back in time and create a branch at a point in the past just before I create this whole</a:t>
+            </a:r>
+            <a:r>
+              <a:rPr lang="en-CA" baseline="0" dirty="0" smtClean="0"/>
+              <a:t> test.txt mess:</a:t>
+            </a:r>
+            <a:endParaRPr lang="en-CA" dirty="0" smtClean="0"/>
+          </a:p>
+          <a:p>
+            <a:endParaRPr lang="en-CA" dirty="0" smtClean="0"/>
+          </a:p>
+          <a:p>
+            <a:r>
+              <a:rPr lang="en-CA" dirty="0" smtClean="0"/>
+              <a:t>G:\github\demo2&gt;git checkout 33665c94ac59497813a2338f7fd3993ad6f445d0</a:t>
+            </a:r>
+          </a:p>
+          <a:p>
+            <a:endParaRPr lang="en-CA" dirty="0" smtClean="0"/>
+          </a:p>
+          <a:p>
+            <a:r>
+              <a:rPr lang="en-CA" dirty="0" smtClean="0"/>
+              <a:t>I am now going to create</a:t>
+            </a:r>
+            <a:r>
+              <a:rPr lang="en-CA" baseline="0" dirty="0" smtClean="0"/>
+              <a:t> a branch there:</a:t>
+            </a:r>
+          </a:p>
+          <a:p>
+            <a:endParaRPr lang="en-CA" baseline="0" dirty="0" smtClean="0"/>
+          </a:p>
+          <a:p>
+            <a:r>
+              <a:rPr lang="en-CA" dirty="0" smtClean="0"/>
+              <a:t>G:\github\demo2&gt;git checkout -b </a:t>
+            </a:r>
+            <a:r>
+              <a:rPr lang="en-CA" dirty="0" err="1" smtClean="0"/>
+              <a:t>cherrypickbranch</a:t>
+            </a:r>
+            <a:endParaRPr lang="en-CA" dirty="0" smtClean="0"/>
+          </a:p>
+          <a:p>
+            <a:r>
+              <a:rPr lang="en-CA" dirty="0" smtClean="0"/>
+              <a:t>Switched to a new branch '</a:t>
+            </a:r>
+            <a:r>
+              <a:rPr lang="en-CA" dirty="0" err="1" smtClean="0"/>
+              <a:t>cherrypickbranch</a:t>
+            </a:r>
+            <a:r>
+              <a:rPr lang="en-CA" dirty="0" smtClean="0"/>
+              <a:t>'</a:t>
+            </a:r>
+          </a:p>
+          <a:p>
+            <a:endParaRPr lang="en-CA" dirty="0" smtClean="0"/>
+          </a:p>
+          <a:p>
+            <a:r>
+              <a:rPr lang="en-CA" dirty="0" smtClean="0"/>
+              <a:t>G:\github\demo2&gt;git push origin </a:t>
+            </a:r>
+            <a:r>
+              <a:rPr lang="en-CA" dirty="0" err="1" smtClean="0"/>
+              <a:t>cherrypickbranch</a:t>
+            </a:r>
+            <a:endParaRPr lang="en-CA" dirty="0" smtClean="0"/>
+          </a:p>
+          <a:p>
+            <a:r>
+              <a:rPr lang="en-CA" dirty="0" smtClean="0"/>
+              <a:t>Total 0 (delta 0), reused 0 (delta 0)</a:t>
+            </a:r>
+          </a:p>
+          <a:p>
+            <a:r>
+              <a:rPr lang="en-CA" dirty="0" smtClean="0"/>
+              <a:t>To </a:t>
+            </a:r>
+            <a:r>
+              <a:rPr lang="en-CA" dirty="0" err="1" smtClean="0"/>
+              <a:t>git@github.com:kangelov</a:t>
+            </a:r>
+            <a:r>
+              <a:rPr lang="en-CA" dirty="0" smtClean="0"/>
+              <a:t>/</a:t>
+            </a:r>
+            <a:r>
+              <a:rPr lang="en-CA" dirty="0" err="1" smtClean="0"/>
+              <a:t>demo.git</a:t>
+            </a:r>
+            <a:endParaRPr lang="en-CA" dirty="0" smtClean="0"/>
+          </a:p>
+          <a:p>
+            <a:r>
+              <a:rPr lang="en-CA" dirty="0" smtClean="0"/>
+              <a:t> * [new branch]      </a:t>
+            </a:r>
+            <a:r>
+              <a:rPr lang="en-CA" dirty="0" err="1" smtClean="0"/>
+              <a:t>cherrypickbranch</a:t>
+            </a:r>
+            <a:r>
+              <a:rPr lang="en-CA" dirty="0" smtClean="0"/>
+              <a:t> -&gt; </a:t>
+            </a:r>
+            <a:r>
+              <a:rPr lang="en-CA" dirty="0" err="1" smtClean="0"/>
+              <a:t>cherrypickbranch</a:t>
+            </a:r>
+            <a:endParaRPr lang="en-CA" dirty="0" smtClean="0"/>
+          </a:p>
+          <a:p>
+            <a:endParaRPr lang="en-CA" dirty="0" smtClean="0"/>
+          </a:p>
+          <a:p>
+            <a:r>
+              <a:rPr lang="en-CA" dirty="0" smtClean="0"/>
+              <a:t>Suppose I want</a:t>
+            </a:r>
+            <a:r>
+              <a:rPr lang="en-CA" baseline="0" dirty="0" smtClean="0"/>
+              <a:t> to go back to the commit I merged into a new branch:</a:t>
+            </a:r>
+            <a:endParaRPr lang="en-CA" dirty="0" smtClean="0"/>
+          </a:p>
+          <a:p>
+            <a:endParaRPr lang="en-CA" dirty="0" smtClean="0"/>
+          </a:p>
+          <a:p>
+            <a:r>
+              <a:rPr lang="en-CA" dirty="0" smtClean="0"/>
+              <a:t>G:\github\demo2&gt;git cherry-pick 1db7049636410d93ef4a4e38110ac86a36bd5c9c</a:t>
+            </a:r>
+          </a:p>
+          <a:p>
+            <a:r>
+              <a:rPr lang="en-CA" dirty="0" smtClean="0"/>
+              <a:t>G:\github\demo2&gt;git push</a:t>
+            </a:r>
+          </a:p>
+          <a:p>
+            <a:r>
+              <a:rPr lang="en-CA" dirty="0" smtClean="0"/>
+              <a:t>G:\github\demo2&gt;git log --all --branches --decorate --graph</a:t>
+            </a:r>
+          </a:p>
+          <a:p>
+            <a:endParaRPr lang="en-CA" dirty="0" smtClean="0"/>
+          </a:p>
+          <a:p>
+            <a:r>
+              <a:rPr lang="en-CA" dirty="0" smtClean="0"/>
+              <a:t>I now have the unmerged test.txt into a branch of its own. I have effectively recreated</a:t>
+            </a:r>
+            <a:r>
+              <a:rPr lang="en-CA" baseline="0" dirty="0" smtClean="0"/>
+              <a:t> the </a:t>
+            </a:r>
+            <a:r>
+              <a:rPr lang="en-CA" baseline="0" dirty="0" err="1" smtClean="0"/>
+              <a:t>testbranch</a:t>
+            </a:r>
+            <a:r>
+              <a:rPr lang="en-CA" baseline="0" dirty="0" smtClean="0"/>
+              <a:t> I deleted earlier. </a:t>
+            </a:r>
+          </a:p>
+          <a:p>
+            <a:endParaRPr lang="en-CA" baseline="0" dirty="0" smtClean="0"/>
+          </a:p>
+          <a:p>
+            <a:r>
+              <a:rPr lang="en-CA" baseline="0" dirty="0" smtClean="0"/>
+              <a:t>This trick can be used to merge individual commits from a branch with lots of commits. I have used this trick in the past to create production patches for testing from changes I create against a development artifact.</a:t>
+            </a:r>
+          </a:p>
+          <a:p>
+            <a:endParaRPr lang="en-CA" baseline="0" dirty="0" smtClean="0"/>
+          </a:p>
+          <a:p>
+            <a:r>
+              <a:rPr lang="en-CA" baseline="0" dirty="0" smtClean="0"/>
+              <a:t>This feature should be used lightly: I pluck a </a:t>
+            </a:r>
+            <a:r>
+              <a:rPr lang="en-CA" baseline="0" dirty="0" err="1" smtClean="0"/>
+              <a:t>changeset</a:t>
+            </a:r>
+            <a:r>
+              <a:rPr lang="en-CA" baseline="0" dirty="0" smtClean="0"/>
+              <a:t> out of context and out of order with its peers. Anything at all can happen: maybe the developer never formatted his </a:t>
+            </a:r>
+            <a:r>
+              <a:rPr lang="en-CA" baseline="0" dirty="0" err="1" smtClean="0"/>
+              <a:t>changesets</a:t>
+            </a:r>
+            <a:r>
+              <a:rPr lang="en-CA" baseline="0" dirty="0" smtClean="0"/>
+              <a:t> properly, so the feature spans multiple </a:t>
+            </a:r>
+            <a:r>
+              <a:rPr lang="en-CA" baseline="0" dirty="0" err="1" smtClean="0"/>
+              <a:t>changesets</a:t>
+            </a:r>
+            <a:r>
+              <a:rPr lang="en-CA" baseline="0" dirty="0" smtClean="0"/>
+              <a:t>, or is mixed with other unrelated changes in a </a:t>
+            </a:r>
+            <a:r>
+              <a:rPr lang="en-CA" baseline="0" dirty="0" err="1" smtClean="0"/>
+              <a:t>changeset</a:t>
+            </a:r>
+            <a:r>
+              <a:rPr lang="en-CA" baseline="0" dirty="0" smtClean="0"/>
+              <a:t>. I can’t cherry-pick half of a </a:t>
+            </a:r>
+            <a:r>
+              <a:rPr lang="en-CA" baseline="0" dirty="0" err="1" smtClean="0"/>
+              <a:t>changeset</a:t>
+            </a:r>
+            <a:r>
+              <a:rPr lang="en-CA" baseline="0" dirty="0" smtClean="0"/>
+              <a:t>, it’s all or nothing. Development etiquette is to keep </a:t>
+            </a:r>
+            <a:r>
+              <a:rPr lang="en-CA" baseline="0" dirty="0" err="1" smtClean="0"/>
+              <a:t>changesets</a:t>
+            </a:r>
+            <a:r>
+              <a:rPr lang="en-CA" baseline="0" dirty="0" smtClean="0"/>
+              <a:t> self-contained, but GIT is not enforcing that. GIT simply trusts you know best.</a:t>
+            </a:r>
+          </a:p>
+          <a:p>
+            <a:endParaRPr lang="en-CA" baseline="0" dirty="0" smtClean="0"/>
+          </a:p>
+          <a:p>
+            <a:r>
+              <a:rPr lang="en-CA" baseline="0" dirty="0" smtClean="0"/>
+              <a:t>With great power comes great responsibility.</a:t>
+            </a:r>
+            <a:endParaRPr lang="en-CA" dirty="0"/>
+          </a:p>
+        </p:txBody>
+      </p:sp>
+      <p:sp>
+        <p:nvSpPr>
+          <p:cNvPr id="4" name="Slide Number Placeholder 3"/>
+          <p:cNvSpPr>
+            <a:spLocks noGrp="1"/>
+          </p:cNvSpPr>
+          <p:nvPr>
+            <p:ph type="sldNum" sz="quarter" idx="10"/>
+          </p:nvPr>
+        </p:nvSpPr>
+        <p:spPr/>
+        <p:txBody>
+          <a:bodyPr/>
+          <a:lstStyle/>
+          <a:p>
+            <a:fld id="{CB55E3E3-40A9-4EFD-94DF-114BB2F8C3AE}" type="slidenum">
+              <a:rPr lang="en-CA" smtClean="0"/>
+              <a:t>28</a:t>
+            </a:fld>
+            <a:endParaRPr lang="en-CA"/>
+          </a:p>
+        </p:txBody>
+      </p:sp>
+    </p:spTree>
+    <p:extLst>
+      <p:ext uri="{BB962C8B-B14F-4D97-AF65-F5344CB8AC3E}">
+        <p14:creationId xmlns:p14="http://schemas.microsoft.com/office/powerpoint/2010/main" val="475285037"/>
+      </p:ext>
+    </p:extLst>
+  </p:cSld>
+  <p:clrMapOvr>
+    <a:masterClrMapping/>
+  </p:clrMapOvr>
+</p:notes>
+</file>
+
+<file path=ppt/notesSlides/notesSlide25.xml><?xml version="1.0" encoding="utf-8"?>
+<p:notes xmlns:a="http://schemas.openxmlformats.org/drawingml/2006/main" xmlns:r="http://schemas.openxmlformats.org/officeDocument/2006/relationships" xmlns:p="http://schemas.openxmlformats.org/presentationml/2006/main">
+  <p:cSld>
+    <p:spTree>
+      <p:nvGrpSpPr>
+        <p:cNvPr id="1" name=""/>
+        <p:cNvGrpSpPr/>
+        <p:nvPr/>
+      </p:nvGrpSpPr>
+      <p:grpSpPr>
+        <a:xfrm>
+          <a:off x="0" y="0"/>
+          <a:ext cx="0" cy="0"/>
+          <a:chOff x="0" y="0"/>
+          <a:chExt cx="0" cy="0"/>
+        </a:xfrm>
+      </p:grpSpPr>
+      <p:sp>
+        <p:nvSpPr>
+          <p:cNvPr id="2" name="Slide Image Placeholder 1"/>
+          <p:cNvSpPr>
+            <a:spLocks noGrp="1" noRot="1" noChangeAspect="1"/>
+          </p:cNvSpPr>
+          <p:nvPr>
+            <p:ph type="sldImg"/>
+          </p:nvPr>
+        </p:nvSpPr>
+        <p:spPr/>
+      </p:sp>
+      <p:sp>
+        <p:nvSpPr>
+          <p:cNvPr id="3" name="Notes Placeholder 2"/>
+          <p:cNvSpPr>
+            <a:spLocks noGrp="1"/>
+          </p:cNvSpPr>
+          <p:nvPr>
+            <p:ph type="body" idx="1"/>
+          </p:nvPr>
+        </p:nvSpPr>
+        <p:spPr/>
+        <p:txBody>
+          <a:bodyPr/>
+          <a:lstStyle/>
+          <a:p>
+            <a:r>
+              <a:rPr lang="en-CA" dirty="0" smtClean="0"/>
+              <a:t>G:\github\demo2&gt;git tag "SILLY_TAG“</a:t>
+            </a:r>
+          </a:p>
+          <a:p>
+            <a:endParaRPr lang="en-CA" dirty="0" smtClean="0"/>
+          </a:p>
+          <a:p>
+            <a:r>
+              <a:rPr lang="en-CA" dirty="0" smtClean="0"/>
+              <a:t>G:\github\demo2&gt;git push --tag</a:t>
+            </a:r>
+          </a:p>
+          <a:p>
+            <a:r>
+              <a:rPr lang="en-CA" dirty="0" smtClean="0"/>
+              <a:t>Total 0 (delta 0), reused 0 (delta 0)</a:t>
+            </a:r>
+          </a:p>
+          <a:p>
+            <a:r>
+              <a:rPr lang="en-CA" dirty="0" smtClean="0"/>
+              <a:t>To </a:t>
+            </a:r>
+            <a:r>
+              <a:rPr lang="en-CA" dirty="0" err="1" smtClean="0"/>
+              <a:t>git@github.com:kangelov</a:t>
+            </a:r>
+            <a:r>
+              <a:rPr lang="en-CA" dirty="0" smtClean="0"/>
+              <a:t>/</a:t>
+            </a:r>
+            <a:r>
+              <a:rPr lang="en-CA" dirty="0" err="1" smtClean="0"/>
+              <a:t>demo.git</a:t>
+            </a:r>
+            <a:endParaRPr lang="en-CA" dirty="0" smtClean="0"/>
+          </a:p>
+          <a:p>
+            <a:r>
+              <a:rPr lang="en-CA" dirty="0" smtClean="0"/>
+              <a:t> * [new tag]         SILLY_TAG -&gt; SILLY_TAG</a:t>
+            </a:r>
+          </a:p>
+          <a:p>
+            <a:endParaRPr lang="en-CA" dirty="0" smtClean="0"/>
+          </a:p>
+          <a:p>
+            <a:r>
+              <a:rPr lang="en-CA" dirty="0" smtClean="0"/>
+              <a:t>Only</a:t>
+            </a:r>
+            <a:r>
+              <a:rPr lang="en-CA" baseline="0" dirty="0" smtClean="0"/>
+              <a:t> little caveat: GIT does not push or pull tags automatically. It needs to be told to do so.</a:t>
+            </a:r>
+          </a:p>
+          <a:p>
+            <a:endParaRPr lang="en-CA" baseline="0" dirty="0" smtClean="0"/>
+          </a:p>
+          <a:p>
+            <a:r>
+              <a:rPr lang="en-CA" dirty="0" smtClean="0"/>
+              <a:t>G:\github\demo&gt;git pull –-tags</a:t>
+            </a:r>
+          </a:p>
+          <a:p>
+            <a:r>
+              <a:rPr lang="en-CA" dirty="0" smtClean="0"/>
+              <a:t>remote: Counting objects: 3, done.</a:t>
+            </a:r>
+          </a:p>
+          <a:p>
+            <a:r>
+              <a:rPr lang="en-CA" dirty="0" smtClean="0"/>
+              <a:t>remote: Compressing objects: 100% (2/2), done.</a:t>
+            </a:r>
+          </a:p>
+          <a:p>
+            <a:r>
+              <a:rPr lang="en-CA" dirty="0" smtClean="0"/>
+              <a:t>remote: Total 3 (delta 0), reused 3 (delta 0), pack-reused 0</a:t>
+            </a:r>
+          </a:p>
+          <a:p>
+            <a:r>
+              <a:rPr lang="en-CA" dirty="0" smtClean="0"/>
+              <a:t>Unpacking objects: 100% (3/3), done.</a:t>
+            </a:r>
+          </a:p>
+          <a:p>
+            <a:r>
+              <a:rPr lang="en-CA" dirty="0" smtClean="0"/>
+              <a:t>From </a:t>
+            </a:r>
+            <a:r>
+              <a:rPr lang="en-CA" dirty="0" err="1" smtClean="0"/>
+              <a:t>github.com:kangelov</a:t>
+            </a:r>
+            <a:r>
+              <a:rPr lang="en-CA" dirty="0" smtClean="0"/>
+              <a:t>/demo</a:t>
+            </a:r>
+          </a:p>
+          <a:p>
+            <a:r>
+              <a:rPr lang="en-CA" dirty="0" smtClean="0"/>
+              <a:t> * [new branch]      </a:t>
+            </a:r>
+            <a:r>
+              <a:rPr lang="en-CA" dirty="0" err="1" smtClean="0"/>
+              <a:t>cherrypickbranch</a:t>
+            </a:r>
+            <a:r>
+              <a:rPr lang="en-CA" dirty="0" smtClean="0"/>
+              <a:t> -&gt; origin/</a:t>
+            </a:r>
+            <a:r>
+              <a:rPr lang="en-CA" dirty="0" err="1" smtClean="0"/>
+              <a:t>cherrypickbranch</a:t>
+            </a:r>
+            <a:endParaRPr lang="en-CA" dirty="0" smtClean="0"/>
+          </a:p>
+          <a:p>
+            <a:r>
+              <a:rPr lang="en-CA" dirty="0" smtClean="0"/>
+              <a:t> * [new tag]         SILLY_TAG  -&gt; SILLY_TAG</a:t>
+            </a:r>
+          </a:p>
+          <a:p>
+            <a:r>
+              <a:rPr lang="en-CA" dirty="0" smtClean="0"/>
+              <a:t>Already up-to-date.</a:t>
+            </a:r>
+          </a:p>
+          <a:p>
+            <a:endParaRPr lang="en-CA" dirty="0" smtClean="0"/>
+          </a:p>
+          <a:p>
+            <a:r>
+              <a:rPr lang="en-CA" dirty="0" smtClean="0"/>
+              <a:t>Of course, I can checkout a tag directly:</a:t>
+            </a:r>
+          </a:p>
+          <a:p>
+            <a:endParaRPr lang="en-CA" dirty="0" smtClean="0"/>
+          </a:p>
+          <a:p>
+            <a:r>
+              <a:rPr lang="en-CA" dirty="0" smtClean="0"/>
+              <a:t>G:\github\demo&gt;git checkout SILLY_TAG</a:t>
+            </a:r>
+          </a:p>
+          <a:p>
+            <a:endParaRPr lang="en-CA" dirty="0" smtClean="0"/>
+          </a:p>
+          <a:p>
+            <a:r>
+              <a:rPr lang="en-CA" dirty="0" smtClean="0"/>
+              <a:t>And this is what tags are good for.</a:t>
+            </a:r>
+            <a:endParaRPr lang="en-CA" dirty="0"/>
+          </a:p>
+        </p:txBody>
+      </p:sp>
+      <p:sp>
+        <p:nvSpPr>
+          <p:cNvPr id="4" name="Slide Number Placeholder 3"/>
+          <p:cNvSpPr>
+            <a:spLocks noGrp="1"/>
+          </p:cNvSpPr>
+          <p:nvPr>
+            <p:ph type="sldNum" sz="quarter" idx="10"/>
+          </p:nvPr>
+        </p:nvSpPr>
+        <p:spPr/>
+        <p:txBody>
+          <a:bodyPr/>
+          <a:lstStyle/>
+          <a:p>
+            <a:fld id="{CB55E3E3-40A9-4EFD-94DF-114BB2F8C3AE}" type="slidenum">
+              <a:rPr lang="en-CA" smtClean="0"/>
+              <a:t>29</a:t>
+            </a:fld>
+            <a:endParaRPr lang="en-CA"/>
+          </a:p>
+        </p:txBody>
+      </p:sp>
+    </p:spTree>
+    <p:extLst>
+      <p:ext uri="{BB962C8B-B14F-4D97-AF65-F5344CB8AC3E}">
+        <p14:creationId xmlns:p14="http://schemas.microsoft.com/office/powerpoint/2010/main" val="1361929206"/>
       </p:ext>
     </p:extLst>
   </p:cSld>
@@ -3063,19 +3936,7 @@
             </a:r>
             <a:r>
               <a:rPr lang="en-CA" baseline="0" dirty="0" smtClean="0"/>
-              <a:t> is built for the </a:t>
-            </a:r>
-            <a:r>
-              <a:rPr lang="en-CA" baseline="0" dirty="0" smtClean="0"/>
-              <a:t>traditional enterprise</a:t>
-            </a:r>
-            <a:r>
-              <a:rPr lang="en-CA" baseline="0" dirty="0" smtClean="0"/>
-              <a:t>: it is there to make sure you follow the rules of the enterprise. It assumes certain workflow and then tries to impose it on you: follow the process, or else. This is why it is so successful for waterfall development</a:t>
-            </a:r>
-            <a:r>
-              <a:rPr lang="en-CA" baseline="0" dirty="0" smtClean="0"/>
-              <a:t>.</a:t>
+              <a:t> is built for the traditional enterprise: it is there to make sure you follow the rules of the enterprise. It assumes certain workflow and then tries to impose it on you: follow the process, or else. This is why it is so successful for waterfall development.</a:t>
             </a:r>
             <a:endParaRPr lang="en-CA" dirty="0" smtClean="0"/>
           </a:p>
@@ -3131,37 +3992,8 @@
             </a:r>
             <a:r>
               <a:rPr lang="en-CA" baseline="0" dirty="0" smtClean="0"/>
-              <a:t> is there to enable you to do anything you may need to do, up until you try to merge your code. This is where most of the governance happens. This is very appropriate for </a:t>
-            </a:r>
-            <a:r>
-              <a:rPr lang="en-CA" baseline="0" dirty="0" smtClean="0"/>
-              <a:t>Agile development, </a:t>
-            </a:r>
-            <a:r>
-              <a:rPr lang="en-CA" baseline="0" dirty="0" smtClean="0"/>
-              <a:t>where </a:t>
-            </a:r>
-            <a:r>
-              <a:rPr lang="en-CA" baseline="0" dirty="0" smtClean="0"/>
-              <a:t>developers </a:t>
-            </a:r>
-            <a:r>
-              <a:rPr lang="en-CA" baseline="0" dirty="0" smtClean="0"/>
-              <a:t>are very loosely </a:t>
-            </a:r>
-            <a:r>
-              <a:rPr lang="en-CA" baseline="0" dirty="0" smtClean="0"/>
-              <a:t>organized </a:t>
-            </a:r>
-            <a:r>
-              <a:rPr lang="en-CA" baseline="0" dirty="0" smtClean="0"/>
-              <a:t>and scattered all over the world</a:t>
-            </a:r>
-            <a:r>
-              <a:rPr lang="en-CA" baseline="0" dirty="0" smtClean="0"/>
-              <a:t>. It is the go-to source control for many open-source projects.</a:t>
-            </a:r>
-            <a:endParaRPr lang="en-CA" baseline="0" dirty="0" smtClean="0"/>
+              <a:t> is there to enable you to do anything you may need to do, up until you try to merge your code. This is where most of the governance happens. This is very appropriate for Agile development, where developers are very loosely organized and scattered all over the world. It is the go-to source control for many open-source projects.</a:t>
+            </a:r>
           </a:p>
           <a:p>
             <a:endParaRPr lang="en-CA" baseline="0" dirty="0" smtClean="0"/>
@@ -3180,7 +4012,6 @@
               <a:rPr lang="en-CA" baseline="0" dirty="0" smtClean="0"/>
               <a:t>Which one is best? Best for what?</a:t>
             </a:r>
-            <a:endParaRPr lang="en-CA" baseline="0" dirty="0" smtClean="0"/>
           </a:p>
         </p:txBody>
       </p:sp>
@@ -3283,59 +4114,17 @@
             </a:pPr>
             <a:r>
               <a:rPr lang="en-CA" baseline="0" dirty="0" smtClean="0"/>
-              <a:t>GIT imposes no constraints on how developers work. There is no “preferred workflow” everyone should follow. Developers can synchronize their code developer-to-developer directly, or even </a:t>
-            </a:r>
+              <a:t>GIT imposes no constraints on how developers work. There is no “preferred workflow” everyone should follow. Developers can synchronize their code developer-to-developer directly, or even create intermediate “feature masters”, which then get merged into the “master”. The merge operation is the gatekeeper: at that point conflicts and other merge issues are identified and are being resolved. Some open-source projects introduce a full-blown code review process at this time! Does this sound like Agile to anyone?</a:t>
+            </a:r>
+          </a:p>
+          <a:p>
+            <a:endParaRPr lang="en-CA" baseline="0" dirty="0" smtClean="0"/>
+          </a:p>
+          <a:p>
             <a:r>
               <a:rPr lang="en-CA" baseline="0" dirty="0" smtClean="0"/>
-              <a:t>create intermediate </a:t>
-            </a:r>
-            <a:r>
-              <a:rPr lang="en-CA" baseline="0" dirty="0" smtClean="0"/>
-              <a:t>“feature </a:t>
-            </a:r>
-            <a:r>
-              <a:rPr lang="en-CA" baseline="0" dirty="0" smtClean="0"/>
-              <a:t>masters”, </a:t>
-            </a:r>
-            <a:r>
-              <a:rPr lang="en-CA" baseline="0" dirty="0" smtClean="0"/>
-              <a:t>which then </a:t>
-            </a:r>
-            <a:r>
-              <a:rPr lang="en-CA" baseline="0" dirty="0" smtClean="0"/>
-              <a:t>get </a:t>
-            </a:r>
-            <a:r>
-              <a:rPr lang="en-CA" baseline="0" dirty="0" smtClean="0"/>
-              <a:t>merged into </a:t>
-            </a:r>
-            <a:r>
-              <a:rPr lang="en-CA" baseline="0" dirty="0" smtClean="0"/>
-              <a:t>the “master</a:t>
-            </a:r>
-            <a:r>
-              <a:rPr lang="en-CA" baseline="0" dirty="0" smtClean="0"/>
-              <a:t>”. The merge operation is the gatekeeper: at that point conflicts and other merge issues are identified and are being resolved. Some open-source projects introduce a full-blown code review process at this time</a:t>
-            </a:r>
-            <a:r>
-              <a:rPr lang="en-CA" baseline="0" dirty="0" smtClean="0"/>
-              <a:t>! Does this sound like Agile to anyone?</a:t>
-            </a:r>
-            <a:endParaRPr lang="en-CA" baseline="0" dirty="0" smtClean="0"/>
-          </a:p>
-          <a:p>
-            <a:endParaRPr lang="en-CA" baseline="0" dirty="0" smtClean="0"/>
-          </a:p>
-          <a:p>
-            <a:r>
-              <a:rPr lang="en-CA" baseline="0" dirty="0" smtClean="0"/>
-              <a:t>The downside? With great power comes great responsibility</a:t>
-            </a:r>
-            <a:r>
-              <a:rPr lang="en-CA" baseline="0" dirty="0" smtClean="0"/>
-              <a:t>. Here is a tool that can do wonders with no effort at all and keeps out of your way no matter what you are doing. Is this a good thing? What you do with it will make or break your development.</a:t>
-            </a:r>
-            <a:endParaRPr lang="en-CA" baseline="0" dirty="0" smtClean="0"/>
+              <a:t>The downside? With great power comes great responsibility. Here is a tool that can do wonders with no effort at all and keeps out of your way no matter what you are doing. Is this a good thing? What you do with it will make or break your development.</a:t>
+            </a:r>
           </a:p>
           <a:p>
             <a:endParaRPr lang="en-CA" baseline="0" dirty="0" smtClean="0"/>
@@ -3565,15 +4354,7 @@
             </a:r>
             <a:r>
               <a:rPr lang="en-CA" baseline="0" dirty="0" smtClean="0"/>
-              <a:t>, but also on their </a:t>
-            </a:r>
-            <a:r>
-              <a:rPr lang="en-CA" baseline="0" dirty="0" smtClean="0"/>
-              <a:t>position. </a:t>
-            </a:r>
-            <a:r>
-              <a:rPr lang="en-CA" baseline="0" dirty="0" smtClean="0"/>
-              <a:t>My </a:t>
+              <a:t>, but also on their position. My </a:t>
             </a:r>
             <a:r>
               <a:rPr lang="en-CA" baseline="0" dirty="0" err="1" smtClean="0"/>
@@ -3597,19 +4378,7 @@
             </a:r>
             <a:r>
               <a:rPr lang="en-CA" baseline="0" dirty="0" smtClean="0"/>
-              <a:t> into my </a:t>
-            </a:r>
-            <a:r>
-              <a:rPr lang="en-CA" baseline="0" dirty="0" smtClean="0"/>
-              <a:t>repository first, </a:t>
-            </a:r>
-            <a:r>
-              <a:rPr lang="en-CA" baseline="0" dirty="0" smtClean="0"/>
-              <a:t>thus pushing your change before mine, and then attempt to sync again. Alternatively, I have to </a:t>
-            </a:r>
-            <a:r>
-              <a:rPr lang="en-CA" baseline="0" dirty="0" smtClean="0"/>
-              <a:t>rollback your </a:t>
+              <a:t> into my repository first, thus pushing your change before mine, and then attempt to sync again. Alternatively, I have to rollback your </a:t>
             </a:r>
             <a:r>
               <a:rPr lang="en-CA" baseline="0" dirty="0" err="1" smtClean="0"/>
@@ -3617,11 +4386,7 @@
             </a:r>
             <a:r>
               <a:rPr lang="en-CA" baseline="0" dirty="0" smtClean="0"/>
-              <a:t> from </a:t>
-            </a:r>
-            <a:r>
-              <a:rPr lang="en-CA" baseline="0" dirty="0" smtClean="0"/>
-              <a:t>master, sync my change and then ask you to re-sync yours, thus pushing your </a:t>
+              <a:t> from master, sync my change and then ask you to re-sync yours, thus pushing your </a:t>
             </a:r>
             <a:r>
               <a:rPr lang="en-CA" baseline="0" dirty="0" err="1" smtClean="0"/>
@@ -3631,27 +4396,14 @@
               <a:rPr lang="en-CA" baseline="0" dirty="0" smtClean="0"/>
               <a:t> after mine.</a:t>
             </a:r>
+          </a:p>
+          <a:p>
             <a:endParaRPr lang="en-CA" baseline="0" dirty="0" smtClean="0"/>
           </a:p>
           <a:p>
-            <a:endParaRPr lang="en-CA" baseline="0" dirty="0" smtClean="0"/>
-          </a:p>
-          <a:p>
             <a:r>
               <a:rPr lang="en-CA" baseline="0" dirty="0" smtClean="0"/>
-              <a:t>Needless to say a GIT repository with a very large code base stored inside would be very difficult to work </a:t>
-            </a:r>
-            <a:r>
-              <a:rPr lang="en-CA" baseline="0" dirty="0" smtClean="0"/>
-              <a:t>with: there will be merge conflicts abound, sync operations will take forever and everyone will get very annoyed very quickly. This is </a:t>
-            </a:r>
-            <a:r>
-              <a:rPr lang="en-CA" baseline="0" dirty="0" smtClean="0"/>
-              <a:t>something </a:t>
-            </a:r>
-            <a:r>
-              <a:rPr lang="en-CA" baseline="0" dirty="0" smtClean="0"/>
-              <a:t>both </a:t>
+              <a:t>Needless to say a GIT repository with a very large code base stored inside would be very difficult to work with: there will be merge conflicts abound, sync operations will take forever and everyone will get very annoyed very quickly. This is something both </a:t>
             </a:r>
             <a:r>
               <a:rPr lang="en-CA" baseline="0" dirty="0" err="1" smtClean="0"/>
@@ -3659,17 +4411,8 @@
             </a:r>
             <a:r>
               <a:rPr lang="en-CA" baseline="0" dirty="0" smtClean="0"/>
-              <a:t> and TFS have </a:t>
-            </a:r>
-            <a:r>
-              <a:rPr lang="en-CA" baseline="0" dirty="0" smtClean="0"/>
-              <a:t>no trouble </a:t>
-            </a:r>
-            <a:r>
-              <a:rPr lang="en-CA" baseline="0" dirty="0" smtClean="0"/>
-              <a:t>with, but then they are meant for a different type of development.</a:t>
-            </a:r>
-            <a:endParaRPr lang="en-CA" baseline="0" dirty="0" smtClean="0"/>
+              <a:t> and TFS have no trouble with, but then they are meant for a different type of development.</a:t>
+            </a:r>
           </a:p>
         </p:txBody>
       </p:sp>
@@ -3767,11 +4510,7 @@
             </a:r>
             <a:r>
               <a:rPr lang="en-CA" baseline="0" dirty="0" smtClean="0"/>
-              <a:t> server’s hard drive</a:t>
-            </a:r>
-            <a:r>
-              <a:rPr lang="en-CA" baseline="0" dirty="0" smtClean="0"/>
-              <a:t>. I walk away with a </a:t>
+              <a:t> server’s hard drive. I walk away with a </a:t>
             </a:r>
             <a:r>
               <a:rPr lang="en-CA" baseline="0" dirty="0" err="1" smtClean="0"/>
@@ -3779,17 +4518,8 @@
             </a:r>
             <a:r>
               <a:rPr lang="en-CA" baseline="0" dirty="0" smtClean="0"/>
-              <a:t> instance I can use independently. </a:t>
-            </a:r>
-            <a:r>
-              <a:rPr lang="en-CA" baseline="0" dirty="0" smtClean="0"/>
-              <a:t>Needless to say GIT performs at its best when the individual repositories are kept very small</a:t>
-            </a:r>
-            <a:r>
-              <a:rPr lang="en-CA" baseline="0" dirty="0" smtClean="0"/>
-              <a:t>. In general, large code bases will be structured as lots of very small repositories, which interact by some means.</a:t>
-            </a:r>
-            <a:endParaRPr lang="en-CA" baseline="0" dirty="0" smtClean="0"/>
+              <a:t> instance I can use independently. Needless to say GIT performs at its best when the individual repositories are kept very small. In general, large code bases will be structured as lots of very small repositories, which interact by some means.</a:t>
+            </a:r>
           </a:p>
           <a:p>
             <a:endParaRPr lang="en-CA" baseline="0" dirty="0" smtClean="0"/>
@@ -3805,23 +4535,7 @@
             </a:r>
             <a:r>
               <a:rPr lang="en-CA" baseline="0" dirty="0" smtClean="0"/>
-              <a:t> of the file that ever was. Furthermore it does not recover even if I delete the checked-in artifact, since </a:t>
-            </a:r>
-            <a:r>
-              <a:rPr lang="en-CA" baseline="0" dirty="0" smtClean="0"/>
-              <a:t>the </a:t>
-            </a:r>
-            <a:r>
-              <a:rPr lang="en-CA" baseline="0" dirty="0" smtClean="0"/>
-              <a:t>file lives </a:t>
-            </a:r>
-            <a:r>
-              <a:rPr lang="en-CA" baseline="0" dirty="0" smtClean="0"/>
-              <a:t>on in </a:t>
-            </a:r>
-            <a:r>
-              <a:rPr lang="en-CA" baseline="0" dirty="0" smtClean="0"/>
-              <a:t>the </a:t>
+              <a:t> of the file that ever was. Furthermore it does not recover even if I delete the checked-in artifact, since the file lives on in the </a:t>
             </a:r>
             <a:r>
               <a:rPr lang="en-CA" baseline="0" dirty="0" err="1" smtClean="0"/>
@@ -7479,8 +8193,8 @@
           <a:lstStyle/>
           <a:p>
             <a:r>
-              <a:rPr lang="en-CA" dirty="0" smtClean="0"/>
-              <a:t>Structure of a GIT Repository</a:t>
+              <a:rPr lang="en-CA" dirty="0"/>
+              <a:t>STRUCTURE OF A GIT REPOSITORY</a:t>
             </a:r>
             <a:endParaRPr lang="en-CA" dirty="0"/>
           </a:p>
@@ -7624,8 +8338,8 @@
           <a:lstStyle/>
           <a:p>
             <a:r>
-              <a:rPr lang="en-CA" dirty="0" smtClean="0"/>
-              <a:t>Structure of a GIT Repository</a:t>
+              <a:rPr lang="en-CA" dirty="0"/>
+              <a:t>STRUCTURE OF A GIT REPOSITORY</a:t>
             </a:r>
             <a:endParaRPr lang="en-CA" dirty="0"/>
           </a:p>
@@ -8009,9 +8723,10 @@
           <a:lstStyle/>
           <a:p>
             <a:r>
-              <a:rPr lang="en-CA" dirty="0"/>
-              <a:t>Structure of a GIT Repository</a:t>
-            </a:r>
+              <a:rPr lang="en-CA" dirty="0" smtClean="0"/>
+              <a:t>STRUCTURE OF A GIT REPOSITORY</a:t>
+            </a:r>
+            <a:endParaRPr lang="en-CA" dirty="0"/>
           </a:p>
         </p:txBody>
       </p:sp>
@@ -8653,7 +9368,7 @@
           <a:p>
             <a:r>
               <a:rPr lang="en-CA" dirty="0" smtClean="0"/>
-              <a:t>The Tools</a:t>
+              <a:t>THE TOOLS</a:t>
             </a:r>
             <a:endParaRPr lang="en-CA" dirty="0"/>
           </a:p>
@@ -8753,7 +9468,7 @@
           <a:p>
             <a:r>
               <a:rPr lang="en-CA" dirty="0" smtClean="0"/>
-              <a:t>The Tools</a:t>
+              <a:t>THE TOOLS</a:t>
             </a:r>
             <a:endParaRPr lang="en-CA" dirty="0"/>
           </a:p>
@@ -8986,12 +9701,8 @@
           <a:lstStyle/>
           <a:p>
             <a:r>
-              <a:rPr lang="en-CA" dirty="0" err="1" smtClean="0"/>
-              <a:t>Init</a:t>
-            </a:r>
-            <a:r>
-              <a:rPr lang="en-CA" dirty="0" smtClean="0"/>
-              <a:t>/Clone/Add/Commit</a:t>
+              <a:rPr lang="en-CA" dirty="0" smtClean="0"/>
+              <a:t>INIT / CLONE / ADD / COMMIT</a:t>
             </a:r>
             <a:endParaRPr lang="en-CA" dirty="0"/>
           </a:p>
@@ -9031,13 +9742,8 @@
             </a:r>
             <a:r>
               <a:rPr lang="en-CA" dirty="0" smtClean="0"/>
-              <a:t> – creates a brand new GIT repository from scratch. Use when you do not intend to synchronize your repository anywhere else, or you wish to create a new master </a:t>
-            </a:r>
-            <a:r>
-              <a:rPr lang="en-CA" dirty="0" smtClean="0"/>
-              <a:t>repository others will synchronize into.</a:t>
-            </a:r>
-            <a:endParaRPr lang="en-CA" dirty="0" smtClean="0"/>
+              <a:t> – creates a brand new GIT repository from scratch. Use when you do not intend to synchronize your repository anywhere else, or you wish to create a new master repository others will synchronize into.</a:t>
+            </a:r>
           </a:p>
           <a:p>
             <a:r>
@@ -9125,7 +9831,7 @@
           <a:p>
             <a:r>
               <a:rPr lang="en-CA" dirty="0" smtClean="0"/>
-              <a:t>Push/Pull</a:t>
+              <a:t>PUSH / PULL</a:t>
             </a:r>
             <a:endParaRPr lang="en-CA" dirty="0"/>
           </a:p>
@@ -9456,7 +10162,11 @@
           <a:p>
             <a:r>
               <a:rPr lang="en-CA" dirty="0" smtClean="0"/>
-              <a:t>What I am going to cover</a:t>
+              <a:t>What I am going to </a:t>
+            </a:r>
+            <a:r>
+              <a:rPr lang="en-CA" dirty="0" smtClean="0"/>
+              <a:t>cover here</a:t>
             </a:r>
             <a:endParaRPr lang="en-CA" dirty="0"/>
           </a:p>
@@ -9594,8 +10304,20 @@
             <a:pPr lvl="1"/>
             <a:r>
               <a:rPr lang="en-CA" sz="1600" dirty="0" smtClean="0"/>
-              <a:t>Merging a branch</a:t>
-            </a:r>
+              <a:t>Merging a </a:t>
+            </a:r>
+            <a:r>
+              <a:rPr lang="en-CA" sz="1600" dirty="0" smtClean="0"/>
+              <a:t>branch</a:t>
+            </a:r>
+          </a:p>
+          <a:p>
+            <a:pPr lvl="1"/>
+            <a:r>
+              <a:rPr lang="en-CA" sz="1600" dirty="0" smtClean="0"/>
+              <a:t>Deleting a branch</a:t>
+            </a:r>
+            <a:endParaRPr lang="en-CA" sz="1600" dirty="0" smtClean="0"/>
           </a:p>
           <a:p>
             <a:pPr lvl="1"/>
@@ -10284,33 +11006,13 @@
           <a:p>
             <a:r>
               <a:rPr lang="en-CA" dirty="0" smtClean="0"/>
-              <a:t>You have created one or more commits, but </a:t>
-            </a:r>
-            <a:r>
-              <a:rPr lang="en-CA" dirty="0" smtClean="0"/>
-              <a:t>have </a:t>
-            </a:r>
-            <a:r>
-              <a:rPr lang="en-CA" dirty="0" smtClean="0"/>
-              <a:t>not </a:t>
-            </a:r>
-            <a:r>
-              <a:rPr lang="en-CA" dirty="0" smtClean="0"/>
-              <a:t>yet pushed them.</a:t>
-            </a:r>
-          </a:p>
-          <a:p>
-            <a:r>
-              <a:rPr lang="en-CA" dirty="0" smtClean="0"/>
-              <a:t>You </a:t>
-            </a:r>
-            <a:r>
-              <a:rPr lang="en-CA" dirty="0" smtClean="0"/>
-              <a:t>have created one or more commits and have pushed them to </a:t>
-            </a:r>
-            <a:r>
-              <a:rPr lang="en-CA" dirty="0" smtClean="0"/>
-              <a:t>remote: you need to force the remote repository to discard the affected </a:t>
+              <a:t>You have created one or more commits, but have not yet pushed them.</a:t>
+            </a:r>
+          </a:p>
+          <a:p>
+            <a:r>
+              <a:rPr lang="en-CA" dirty="0" smtClean="0"/>
+              <a:t>You have created one or more commits and have pushed them to remote: you need to force the remote repository to discard the affected </a:t>
             </a:r>
             <a:r>
               <a:rPr lang="en-CA" dirty="0" err="1" smtClean="0"/>
@@ -10386,7 +11088,6 @@
               <a:rPr lang="en-CA" dirty="0" smtClean="0"/>
               <a:t>Needless to say these two operations are administrative, are highly destructive if used incorrectly, and should never be used lightly.</a:t>
             </a:r>
-            <a:endParaRPr lang="en-CA" dirty="0" smtClean="0"/>
           </a:p>
         </p:txBody>
       </p:sp>
@@ -11311,6 +12012,13 @@
   <p:clrMapOvr>
     <a:masterClrMapping/>
   </p:clrMapOvr>
+  <p:timing>
+    <p:tnLst>
+      <p:par>
+        <p:cTn id="1" dur="indefinite" restart="never" nodeType="tmRoot"/>
+      </p:par>
+    </p:tnLst>
+  </p:timing>
 </p:sld>
 </file>
 
@@ -11390,14 +12098,7 @@
                 <a:latin typeface="+mj-lt"/>
                 <a:cs typeface="Courier New" panose="02070309020205020404" pitchFamily="49" charset="0"/>
               </a:rPr>
-              <a:t>You </a:t>
-            </a:r>
-            <a:r>
-              <a:rPr lang="en-CA" dirty="0" smtClean="0">
-                <a:latin typeface="+mj-lt"/>
-                <a:cs typeface="Courier New" panose="02070309020205020404" pitchFamily="49" charset="0"/>
-              </a:rPr>
-              <a:t>are not required to push every branch you create.</a:t>
+              <a:t>You are not required to push every branch you create.</a:t>
             </a:r>
           </a:p>
           <a:p>
@@ -11434,6 +12135,13 @@
   <p:clrMapOvr>
     <a:masterClrMapping/>
   </p:clrMapOvr>
+  <p:timing>
+    <p:tnLst>
+      <p:par>
+        <p:cTn id="1" dur="indefinite" restart="never" nodeType="tmRoot"/>
+      </p:par>
+    </p:tnLst>
+  </p:timing>
 </p:sld>
 </file>
 
@@ -12302,6 +13010,13 @@
   <p:clrMapOvr>
     <a:masterClrMapping/>
   </p:clrMapOvr>
+  <p:timing>
+    <p:tnLst>
+      <p:par>
+        <p:cTn id="1" dur="indefinite" restart="never" nodeType="tmRoot"/>
+      </p:par>
+    </p:tnLst>
+  </p:timing>
 </p:sld>
 </file>
 
@@ -12339,6 +13054,948 @@
           <a:p>
             <a:r>
               <a:rPr lang="en-CA" dirty="0" smtClean="0"/>
+              <a:t>DELETING A BRANCH</a:t>
+            </a:r>
+            <a:endParaRPr lang="en-CA" dirty="0"/>
+          </a:p>
+        </p:txBody>
+      </p:sp>
+      <p:cxnSp>
+        <p:nvCxnSpPr>
+          <p:cNvPr id="4" name="Elbow Connector 3"/>
+          <p:cNvCxnSpPr/>
+          <p:nvPr/>
+        </p:nvCxnSpPr>
+        <p:spPr>
+          <a:xfrm flipV="1">
+            <a:off x="1619672" y="1484784"/>
+            <a:ext cx="3780420" cy="2053952"/>
+          </a:xfrm>
+          <a:prstGeom prst="bentConnector3">
+            <a:avLst>
+              <a:gd name="adj1" fmla="val 100145"/>
+            </a:avLst>
+          </a:prstGeom>
+          <a:ln w="44450">
+            <a:tailEnd type="arrow"/>
+          </a:ln>
+        </p:spPr>
+        <p:style>
+          <a:lnRef idx="1">
+            <a:schemeClr val="accent1"/>
+          </a:lnRef>
+          <a:fillRef idx="0">
+            <a:schemeClr val="accent1"/>
+          </a:fillRef>
+          <a:effectRef idx="0">
+            <a:schemeClr val="accent1"/>
+          </a:effectRef>
+          <a:fontRef idx="minor">
+            <a:schemeClr val="tx1"/>
+          </a:fontRef>
+        </p:style>
+      </p:cxnSp>
+      <p:cxnSp>
+        <p:nvCxnSpPr>
+          <p:cNvPr id="5" name="Straight Arrow Connector 4"/>
+          <p:cNvCxnSpPr/>
+          <p:nvPr/>
+        </p:nvCxnSpPr>
+        <p:spPr>
+          <a:xfrm flipH="1" flipV="1">
+            <a:off x="1619672" y="1412776"/>
+            <a:ext cx="108012" cy="5184576"/>
+          </a:xfrm>
+          <a:prstGeom prst="straightConnector1">
+            <a:avLst/>
+          </a:prstGeom>
+          <a:ln w="44450">
+            <a:tailEnd type="arrow"/>
+          </a:ln>
+        </p:spPr>
+        <p:style>
+          <a:lnRef idx="1">
+            <a:schemeClr val="accent1"/>
+          </a:lnRef>
+          <a:fillRef idx="0">
+            <a:schemeClr val="accent1"/>
+          </a:fillRef>
+          <a:effectRef idx="0">
+            <a:schemeClr val="accent1"/>
+          </a:effectRef>
+          <a:fontRef idx="minor">
+            <a:schemeClr val="tx1"/>
+          </a:fontRef>
+        </p:style>
+      </p:cxnSp>
+      <p:sp>
+        <p:nvSpPr>
+          <p:cNvPr id="6" name="Trapezoid 5"/>
+          <p:cNvSpPr/>
+          <p:nvPr/>
+        </p:nvSpPr>
+        <p:spPr>
+          <a:xfrm>
+            <a:off x="467544" y="5190404"/>
+            <a:ext cx="2520280" cy="1152128"/>
+          </a:xfrm>
+          <a:prstGeom prst="trapezoid">
+            <a:avLst/>
+          </a:prstGeom>
+        </p:spPr>
+        <p:style>
+          <a:lnRef idx="2">
+            <a:schemeClr val="accent1">
+              <a:shade val="50000"/>
+            </a:schemeClr>
+          </a:lnRef>
+          <a:fillRef idx="1">
+            <a:schemeClr val="accent1"/>
+          </a:fillRef>
+          <a:effectRef idx="0">
+            <a:schemeClr val="accent1"/>
+          </a:effectRef>
+          <a:fontRef idx="minor">
+            <a:schemeClr val="lt1"/>
+          </a:fontRef>
+        </p:style>
+        <p:txBody>
+          <a:bodyPr rtlCol="0" anchor="ctr"/>
+          <a:lstStyle/>
+          <a:p>
+            <a:r>
+              <a:rPr lang="en-CA" dirty="0" smtClean="0">
+                <a:ln w="18415" cmpd="sng">
+                  <a:solidFill>
+                    <a:srgbClr val="FFFFFF"/>
+                  </a:solidFill>
+                  <a:prstDash val="solid"/>
+                </a:ln>
+                <a:solidFill>
+                  <a:srgbClr val="FFFFFF"/>
+                </a:solidFill>
+                <a:latin typeface="Courier New" panose="02070309020205020404" pitchFamily="49" charset="0"/>
+                <a:cs typeface="Courier New" panose="02070309020205020404" pitchFamily="49" charset="0"/>
+              </a:rPr>
+              <a:t>Repository</a:t>
+            </a:r>
+          </a:p>
+          <a:p>
+            <a:r>
+              <a:rPr lang="en-CA" dirty="0" smtClean="0">
+                <a:ln w="18415" cmpd="sng">
+                  <a:solidFill>
+                    <a:srgbClr val="FFFFFF"/>
+                  </a:solidFill>
+                  <a:prstDash val="solid"/>
+                </a:ln>
+                <a:solidFill>
+                  <a:srgbClr val="FFFFFF"/>
+                </a:solidFill>
+                <a:latin typeface="Courier New" panose="02070309020205020404" pitchFamily="49" charset="0"/>
+                <a:cs typeface="Courier New" panose="02070309020205020404" pitchFamily="49" charset="0"/>
+              </a:rPr>
+              <a:t> | +</a:t>
+            </a:r>
+            <a:r>
+              <a:rPr lang="en-CA" dirty="0" err="1" smtClean="0">
+                <a:ln w="18415" cmpd="sng">
+                  <a:solidFill>
+                    <a:srgbClr val="FFFFFF"/>
+                  </a:solidFill>
+                  <a:prstDash val="solid"/>
+                </a:ln>
+                <a:solidFill>
+                  <a:srgbClr val="FFFFFF"/>
+                </a:solidFill>
+                <a:latin typeface="Courier New" panose="02070309020205020404" pitchFamily="49" charset="0"/>
+                <a:cs typeface="Courier New" panose="02070309020205020404" pitchFamily="49" charset="0"/>
+              </a:rPr>
+              <a:t>dir</a:t>
+            </a:r>
+            <a:r>
+              <a:rPr lang="en-CA" dirty="0" smtClean="0">
+                <a:ln w="18415" cmpd="sng">
+                  <a:solidFill>
+                    <a:srgbClr val="FFFFFF"/>
+                  </a:solidFill>
+                  <a:prstDash val="solid"/>
+                </a:ln>
+                <a:solidFill>
+                  <a:srgbClr val="FFFFFF"/>
+                </a:solidFill>
+                <a:latin typeface="Courier New" panose="02070309020205020404" pitchFamily="49" charset="0"/>
+                <a:cs typeface="Courier New" panose="02070309020205020404" pitchFamily="49" charset="0"/>
+              </a:rPr>
+              <a:t> 1</a:t>
+            </a:r>
+          </a:p>
+        </p:txBody>
+      </p:sp>
+      <p:sp>
+        <p:nvSpPr>
+          <p:cNvPr id="7" name="Trapezoid 6"/>
+          <p:cNvSpPr/>
+          <p:nvPr/>
+        </p:nvSpPr>
+        <p:spPr>
+          <a:xfrm>
+            <a:off x="467544" y="4149080"/>
+            <a:ext cx="2520280" cy="1152128"/>
+          </a:xfrm>
+          <a:prstGeom prst="trapezoid">
+            <a:avLst/>
+          </a:prstGeom>
+        </p:spPr>
+        <p:style>
+          <a:lnRef idx="2">
+            <a:schemeClr val="accent1">
+              <a:shade val="50000"/>
+            </a:schemeClr>
+          </a:lnRef>
+          <a:fillRef idx="1">
+            <a:schemeClr val="accent1"/>
+          </a:fillRef>
+          <a:effectRef idx="0">
+            <a:schemeClr val="accent1"/>
+          </a:effectRef>
+          <a:fontRef idx="minor">
+            <a:schemeClr val="lt1"/>
+          </a:fontRef>
+        </p:style>
+        <p:txBody>
+          <a:bodyPr rtlCol="0" anchor="ctr"/>
+          <a:lstStyle/>
+          <a:p>
+            <a:r>
+              <a:rPr lang="en-CA" dirty="0" smtClean="0">
+                <a:ln w="18415" cmpd="sng">
+                  <a:solidFill>
+                    <a:srgbClr val="FFFFFF"/>
+                  </a:solidFill>
+                  <a:prstDash val="solid"/>
+                </a:ln>
+                <a:solidFill>
+                  <a:srgbClr val="FFFFFF"/>
+                </a:solidFill>
+                <a:latin typeface="Courier New" panose="02070309020205020404" pitchFamily="49" charset="0"/>
+                <a:cs typeface="Courier New" panose="02070309020205020404" pitchFamily="49" charset="0"/>
+              </a:rPr>
+              <a:t>Repository</a:t>
+            </a:r>
+          </a:p>
+          <a:p>
+            <a:r>
+              <a:rPr lang="en-CA" dirty="0">
+                <a:ln w="18415" cmpd="sng">
+                  <a:solidFill>
+                    <a:srgbClr val="FFFFFF"/>
+                  </a:solidFill>
+                  <a:prstDash val="solid"/>
+                </a:ln>
+                <a:solidFill>
+                  <a:srgbClr val="FFFFFF"/>
+                </a:solidFill>
+                <a:latin typeface="Courier New" panose="02070309020205020404" pitchFamily="49" charset="0"/>
+                <a:cs typeface="Courier New" panose="02070309020205020404" pitchFamily="49" charset="0"/>
+              </a:rPr>
+              <a:t> </a:t>
+            </a:r>
+            <a:r>
+              <a:rPr lang="en-CA" dirty="0" smtClean="0">
+                <a:ln w="18415" cmpd="sng">
+                  <a:solidFill>
+                    <a:srgbClr val="FFFFFF"/>
+                  </a:solidFill>
+                  <a:prstDash val="solid"/>
+                </a:ln>
+                <a:solidFill>
+                  <a:srgbClr val="FFFFFF"/>
+                </a:solidFill>
+                <a:latin typeface="Courier New" panose="02070309020205020404" pitchFamily="49" charset="0"/>
+                <a:cs typeface="Courier New" panose="02070309020205020404" pitchFamily="49" charset="0"/>
+              </a:rPr>
+              <a:t>| *</a:t>
+            </a:r>
+            <a:r>
+              <a:rPr lang="en-CA" dirty="0" err="1" smtClean="0">
+                <a:ln w="18415" cmpd="sng">
+                  <a:solidFill>
+                    <a:srgbClr val="FFFFFF"/>
+                  </a:solidFill>
+                  <a:prstDash val="solid"/>
+                </a:ln>
+                <a:solidFill>
+                  <a:srgbClr val="FFFFFF"/>
+                </a:solidFill>
+                <a:latin typeface="Courier New" panose="02070309020205020404" pitchFamily="49" charset="0"/>
+                <a:cs typeface="Courier New" panose="02070309020205020404" pitchFamily="49" charset="0"/>
+              </a:rPr>
+              <a:t>dir</a:t>
+            </a:r>
+            <a:r>
+              <a:rPr lang="en-CA" dirty="0" smtClean="0">
+                <a:ln w="18415" cmpd="sng">
+                  <a:solidFill>
+                    <a:srgbClr val="FFFFFF"/>
+                  </a:solidFill>
+                  <a:prstDash val="solid"/>
+                </a:ln>
+                <a:solidFill>
+                  <a:srgbClr val="FFFFFF"/>
+                </a:solidFill>
+                <a:latin typeface="Courier New" panose="02070309020205020404" pitchFamily="49" charset="0"/>
+                <a:cs typeface="Courier New" panose="02070309020205020404" pitchFamily="49" charset="0"/>
+              </a:rPr>
+              <a:t> 1</a:t>
+            </a:r>
+          </a:p>
+          <a:p>
+            <a:r>
+              <a:rPr lang="en-CA" dirty="0">
+                <a:ln w="18415" cmpd="sng">
+                  <a:solidFill>
+                    <a:srgbClr val="FFFFFF"/>
+                  </a:solidFill>
+                  <a:prstDash val="solid"/>
+                </a:ln>
+                <a:solidFill>
+                  <a:srgbClr val="FFFFFF"/>
+                </a:solidFill>
+                <a:latin typeface="Courier New" panose="02070309020205020404" pitchFamily="49" charset="0"/>
+                <a:cs typeface="Courier New" panose="02070309020205020404" pitchFamily="49" charset="0"/>
+              </a:rPr>
+              <a:t> </a:t>
+            </a:r>
+            <a:r>
+              <a:rPr lang="en-CA" dirty="0" smtClean="0">
+                <a:ln w="18415" cmpd="sng">
+                  <a:solidFill>
+                    <a:srgbClr val="FFFFFF"/>
+                  </a:solidFill>
+                  <a:prstDash val="solid"/>
+                </a:ln>
+                <a:solidFill>
+                  <a:srgbClr val="FFFFFF"/>
+                </a:solidFill>
+                <a:latin typeface="Courier New" panose="02070309020205020404" pitchFamily="49" charset="0"/>
+                <a:cs typeface="Courier New" panose="02070309020205020404" pitchFamily="49" charset="0"/>
+              </a:rPr>
+              <a:t>  \ +file 1</a:t>
+            </a:r>
+          </a:p>
+        </p:txBody>
+      </p:sp>
+      <p:sp>
+        <p:nvSpPr>
+          <p:cNvPr id="8" name="Trapezoid 7"/>
+          <p:cNvSpPr/>
+          <p:nvPr/>
+        </p:nvSpPr>
+        <p:spPr>
+          <a:xfrm>
+            <a:off x="467544" y="2996952"/>
+            <a:ext cx="2520280" cy="1152128"/>
+          </a:xfrm>
+          <a:prstGeom prst="trapezoid">
+            <a:avLst/>
+          </a:prstGeom>
+          <a:solidFill>
+            <a:srgbClr val="92D050"/>
+          </a:solidFill>
+        </p:spPr>
+        <p:style>
+          <a:lnRef idx="2">
+            <a:schemeClr val="accent1">
+              <a:shade val="50000"/>
+            </a:schemeClr>
+          </a:lnRef>
+          <a:fillRef idx="1">
+            <a:schemeClr val="accent1"/>
+          </a:fillRef>
+          <a:effectRef idx="0">
+            <a:schemeClr val="accent1"/>
+          </a:effectRef>
+          <a:fontRef idx="minor">
+            <a:schemeClr val="lt1"/>
+          </a:fontRef>
+        </p:style>
+        <p:txBody>
+          <a:bodyPr rtlCol="0" anchor="ctr"/>
+          <a:lstStyle/>
+          <a:p>
+            <a:r>
+              <a:rPr lang="en-CA" dirty="0" smtClean="0">
+                <a:ln w="18415" cmpd="sng">
+                  <a:solidFill>
+                    <a:srgbClr val="FFFFFF"/>
+                  </a:solidFill>
+                  <a:prstDash val="solid"/>
+                </a:ln>
+                <a:solidFill>
+                  <a:srgbClr val="FFFFFF"/>
+                </a:solidFill>
+                <a:latin typeface="Courier New" panose="02070309020205020404" pitchFamily="49" charset="0"/>
+                <a:cs typeface="Courier New" panose="02070309020205020404" pitchFamily="49" charset="0"/>
+              </a:rPr>
+              <a:t>Repository</a:t>
+            </a:r>
+          </a:p>
+          <a:p>
+            <a:r>
+              <a:rPr lang="en-CA" dirty="0" smtClean="0">
+                <a:ln w="18415" cmpd="sng">
+                  <a:solidFill>
+                    <a:srgbClr val="FFFFFF"/>
+                  </a:solidFill>
+                  <a:prstDash val="solid"/>
+                </a:ln>
+                <a:solidFill>
+                  <a:srgbClr val="FFFFFF"/>
+                </a:solidFill>
+                <a:latin typeface="Courier New" panose="02070309020205020404" pitchFamily="49" charset="0"/>
+                <a:cs typeface="Courier New" panose="02070309020205020404" pitchFamily="49" charset="0"/>
+              </a:rPr>
+              <a:t> |  </a:t>
+            </a:r>
+          </a:p>
+          <a:p>
+            <a:r>
+              <a:rPr lang="en-CA" dirty="0" smtClean="0">
+                <a:ln w="18415" cmpd="sng">
+                  <a:solidFill>
+                    <a:srgbClr val="FFFFFF"/>
+                  </a:solidFill>
+                  <a:prstDash val="solid"/>
+                </a:ln>
+                <a:solidFill>
+                  <a:srgbClr val="FFFFFF"/>
+                </a:solidFill>
+                <a:latin typeface="Courier New" panose="02070309020205020404" pitchFamily="49" charset="0"/>
+                <a:cs typeface="Courier New" panose="02070309020205020404" pitchFamily="49" charset="0"/>
+              </a:rPr>
+              <a:t> |  </a:t>
+            </a:r>
+          </a:p>
+          <a:p>
+            <a:r>
+              <a:rPr lang="en-CA" dirty="0" smtClean="0">
+                <a:ln w="18415" cmpd="sng">
+                  <a:solidFill>
+                    <a:srgbClr val="FFFFFF"/>
+                  </a:solidFill>
+                  <a:prstDash val="solid"/>
+                </a:ln>
+                <a:solidFill>
+                  <a:srgbClr val="FFFFFF"/>
+                </a:solidFill>
+                <a:latin typeface="Courier New" panose="02070309020205020404" pitchFamily="49" charset="0"/>
+                <a:cs typeface="Courier New" panose="02070309020205020404" pitchFamily="49" charset="0"/>
+              </a:rPr>
+              <a:t> | +</a:t>
+            </a:r>
+            <a:r>
+              <a:rPr lang="en-CA" dirty="0" err="1" smtClean="0">
+                <a:ln w="18415" cmpd="sng">
+                  <a:solidFill>
+                    <a:srgbClr val="FFFFFF"/>
+                  </a:solidFill>
+                  <a:prstDash val="solid"/>
+                </a:ln>
+                <a:solidFill>
+                  <a:srgbClr val="FFFFFF"/>
+                </a:solidFill>
+                <a:latin typeface="Courier New" panose="02070309020205020404" pitchFamily="49" charset="0"/>
+                <a:cs typeface="Courier New" panose="02070309020205020404" pitchFamily="49" charset="0"/>
+              </a:rPr>
+              <a:t>dir</a:t>
+            </a:r>
+            <a:r>
+              <a:rPr lang="en-CA" dirty="0" smtClean="0">
+                <a:ln w="18415" cmpd="sng">
+                  <a:solidFill>
+                    <a:srgbClr val="FFFFFF"/>
+                  </a:solidFill>
+                  <a:prstDash val="solid"/>
+                </a:ln>
+                <a:solidFill>
+                  <a:srgbClr val="FFFFFF"/>
+                </a:solidFill>
+                <a:latin typeface="Courier New" panose="02070309020205020404" pitchFamily="49" charset="0"/>
+                <a:cs typeface="Courier New" panose="02070309020205020404" pitchFamily="49" charset="0"/>
+              </a:rPr>
+              <a:t> 2</a:t>
+            </a:r>
+          </a:p>
+        </p:txBody>
+      </p:sp>
+      <p:sp>
+        <p:nvSpPr>
+          <p:cNvPr id="9" name="Trapezoid 8"/>
+          <p:cNvSpPr/>
+          <p:nvPr/>
+        </p:nvSpPr>
+        <p:spPr>
+          <a:xfrm>
+            <a:off x="4139952" y="1844824"/>
+            <a:ext cx="2520280" cy="1152128"/>
+          </a:xfrm>
+          <a:prstGeom prst="trapezoid">
+            <a:avLst/>
+          </a:prstGeom>
+          <a:solidFill>
+            <a:srgbClr val="FF0000"/>
+          </a:solidFill>
+        </p:spPr>
+        <p:style>
+          <a:lnRef idx="2">
+            <a:schemeClr val="accent1">
+              <a:shade val="50000"/>
+            </a:schemeClr>
+          </a:lnRef>
+          <a:fillRef idx="1">
+            <a:schemeClr val="accent1"/>
+          </a:fillRef>
+          <a:effectRef idx="0">
+            <a:schemeClr val="accent1"/>
+          </a:effectRef>
+          <a:fontRef idx="minor">
+            <a:schemeClr val="lt1"/>
+          </a:fontRef>
+        </p:style>
+        <p:txBody>
+          <a:bodyPr rtlCol="0" anchor="ctr"/>
+          <a:lstStyle/>
+          <a:p>
+            <a:r>
+              <a:rPr lang="en-CA" dirty="0" smtClean="0">
+                <a:ln w="18415" cmpd="sng">
+                  <a:solidFill>
+                    <a:srgbClr val="FFFFFF"/>
+                  </a:solidFill>
+                  <a:prstDash val="solid"/>
+                </a:ln>
+                <a:solidFill>
+                  <a:srgbClr val="FFFFFF"/>
+                </a:solidFill>
+                <a:latin typeface="Courier New" panose="02070309020205020404" pitchFamily="49" charset="0"/>
+                <a:cs typeface="Courier New" panose="02070309020205020404" pitchFamily="49" charset="0"/>
+              </a:rPr>
+              <a:t>Repository</a:t>
+            </a:r>
+          </a:p>
+          <a:p>
+            <a:r>
+              <a:rPr lang="en-CA" dirty="0" smtClean="0">
+                <a:ln w="18415" cmpd="sng">
+                  <a:solidFill>
+                    <a:srgbClr val="FFFFFF"/>
+                  </a:solidFill>
+                  <a:prstDash val="solid"/>
+                </a:ln>
+                <a:solidFill>
+                  <a:srgbClr val="FFFFFF"/>
+                </a:solidFill>
+                <a:latin typeface="Courier New" panose="02070309020205020404" pitchFamily="49" charset="0"/>
+                <a:cs typeface="Courier New" panose="02070309020205020404" pitchFamily="49" charset="0"/>
+              </a:rPr>
+              <a:t> | </a:t>
+            </a:r>
+            <a:r>
+              <a:rPr lang="en-CA" dirty="0" err="1" smtClean="0">
+                <a:ln w="18415" cmpd="sng">
+                  <a:solidFill>
+                    <a:srgbClr val="FFFFFF"/>
+                  </a:solidFill>
+                  <a:prstDash val="solid"/>
+                </a:ln>
+                <a:solidFill>
+                  <a:srgbClr val="FFFFFF"/>
+                </a:solidFill>
+                <a:latin typeface="Courier New" panose="02070309020205020404" pitchFamily="49" charset="0"/>
+                <a:cs typeface="Courier New" panose="02070309020205020404" pitchFamily="49" charset="0"/>
+              </a:rPr>
+              <a:t>dir</a:t>
+            </a:r>
+            <a:r>
+              <a:rPr lang="en-CA" dirty="0" smtClean="0">
+                <a:ln w="18415" cmpd="sng">
+                  <a:solidFill>
+                    <a:srgbClr val="FFFFFF"/>
+                  </a:solidFill>
+                  <a:prstDash val="solid"/>
+                </a:ln>
+                <a:solidFill>
+                  <a:srgbClr val="FFFFFF"/>
+                </a:solidFill>
+                <a:latin typeface="Courier New" panose="02070309020205020404" pitchFamily="49" charset="0"/>
+                <a:cs typeface="Courier New" panose="02070309020205020404" pitchFamily="49" charset="0"/>
+              </a:rPr>
+              <a:t> 1 </a:t>
+            </a:r>
+          </a:p>
+          <a:p>
+            <a:r>
+              <a:rPr lang="en-CA" dirty="0" smtClean="0">
+                <a:ln w="18415" cmpd="sng">
+                  <a:solidFill>
+                    <a:srgbClr val="FFFFFF"/>
+                  </a:solidFill>
+                  <a:prstDash val="solid"/>
+                </a:ln>
+                <a:solidFill>
+                  <a:srgbClr val="FFFFFF"/>
+                </a:solidFill>
+                <a:latin typeface="Courier New" panose="02070309020205020404" pitchFamily="49" charset="0"/>
+                <a:cs typeface="Courier New" panose="02070309020205020404" pitchFamily="49" charset="0"/>
+              </a:rPr>
+              <a:t>   \ *file 1</a:t>
+            </a:r>
+          </a:p>
+        </p:txBody>
+      </p:sp>
+      <p:sp>
+        <p:nvSpPr>
+          <p:cNvPr id="10" name="Trapezoid 9"/>
+          <p:cNvSpPr/>
+          <p:nvPr/>
+        </p:nvSpPr>
+        <p:spPr>
+          <a:xfrm>
+            <a:off x="467544" y="1844824"/>
+            <a:ext cx="2520280" cy="1152128"/>
+          </a:xfrm>
+          <a:prstGeom prst="trapezoid">
+            <a:avLst/>
+          </a:prstGeom>
+          <a:solidFill>
+            <a:srgbClr val="FF0000"/>
+          </a:solidFill>
+        </p:spPr>
+        <p:style>
+          <a:lnRef idx="2">
+            <a:schemeClr val="accent1">
+              <a:shade val="50000"/>
+            </a:schemeClr>
+          </a:lnRef>
+          <a:fillRef idx="1">
+            <a:schemeClr val="accent1"/>
+          </a:fillRef>
+          <a:effectRef idx="0">
+            <a:schemeClr val="accent1"/>
+          </a:effectRef>
+          <a:fontRef idx="minor">
+            <a:schemeClr val="lt1"/>
+          </a:fontRef>
+        </p:style>
+        <p:txBody>
+          <a:bodyPr rtlCol="0" anchor="ctr"/>
+          <a:lstStyle/>
+          <a:p>
+            <a:r>
+              <a:rPr lang="en-CA" dirty="0" smtClean="0">
+                <a:ln w="18415" cmpd="sng">
+                  <a:solidFill>
+                    <a:srgbClr val="FFFFFF"/>
+                  </a:solidFill>
+                  <a:prstDash val="solid"/>
+                </a:ln>
+                <a:solidFill>
+                  <a:srgbClr val="FFFFFF"/>
+                </a:solidFill>
+                <a:latin typeface="Courier New" panose="02070309020205020404" pitchFamily="49" charset="0"/>
+                <a:cs typeface="Courier New" panose="02070309020205020404" pitchFamily="49" charset="0"/>
+              </a:rPr>
+              <a:t>Repository</a:t>
+            </a:r>
+          </a:p>
+          <a:p>
+            <a:r>
+              <a:rPr lang="en-CA" dirty="0" smtClean="0">
+                <a:ln w="18415" cmpd="sng">
+                  <a:solidFill>
+                    <a:srgbClr val="FFFFFF"/>
+                  </a:solidFill>
+                  <a:prstDash val="solid"/>
+                </a:ln>
+                <a:solidFill>
+                  <a:srgbClr val="FFFFFF"/>
+                </a:solidFill>
+                <a:latin typeface="Courier New" panose="02070309020205020404" pitchFamily="49" charset="0"/>
+                <a:cs typeface="Courier New" panose="02070309020205020404" pitchFamily="49" charset="0"/>
+              </a:rPr>
+              <a:t> | </a:t>
+            </a:r>
+            <a:r>
+              <a:rPr lang="en-CA" dirty="0" err="1" smtClean="0">
+                <a:ln w="18415" cmpd="sng">
+                  <a:solidFill>
+                    <a:srgbClr val="FFFFFF"/>
+                  </a:solidFill>
+                  <a:prstDash val="solid"/>
+                </a:ln>
+                <a:solidFill>
+                  <a:srgbClr val="FFFFFF"/>
+                </a:solidFill>
+                <a:latin typeface="Courier New" panose="02070309020205020404" pitchFamily="49" charset="0"/>
+                <a:cs typeface="Courier New" panose="02070309020205020404" pitchFamily="49" charset="0"/>
+              </a:rPr>
+              <a:t>dir</a:t>
+            </a:r>
+            <a:r>
+              <a:rPr lang="en-CA" dirty="0" smtClean="0">
+                <a:ln w="18415" cmpd="sng">
+                  <a:solidFill>
+                    <a:srgbClr val="FFFFFF"/>
+                  </a:solidFill>
+                  <a:prstDash val="solid"/>
+                </a:ln>
+                <a:solidFill>
+                  <a:srgbClr val="FFFFFF"/>
+                </a:solidFill>
+                <a:latin typeface="Courier New" panose="02070309020205020404" pitchFamily="49" charset="0"/>
+                <a:cs typeface="Courier New" panose="02070309020205020404" pitchFamily="49" charset="0"/>
+              </a:rPr>
+              <a:t> 1 </a:t>
+            </a:r>
+          </a:p>
+          <a:p>
+            <a:r>
+              <a:rPr lang="en-CA" dirty="0" smtClean="0">
+                <a:ln w="18415" cmpd="sng">
+                  <a:solidFill>
+                    <a:srgbClr val="FFFFFF"/>
+                  </a:solidFill>
+                  <a:prstDash val="solid"/>
+                </a:ln>
+                <a:solidFill>
+                  <a:srgbClr val="FFFFFF"/>
+                </a:solidFill>
+                <a:latin typeface="Courier New" panose="02070309020205020404" pitchFamily="49" charset="0"/>
+                <a:cs typeface="Courier New" panose="02070309020205020404" pitchFamily="49" charset="0"/>
+              </a:rPr>
+              <a:t>   \ -file 1</a:t>
+            </a:r>
+          </a:p>
+        </p:txBody>
+      </p:sp>
+      <p:cxnSp>
+        <p:nvCxnSpPr>
+          <p:cNvPr id="12" name="Straight Connector 11"/>
+          <p:cNvCxnSpPr/>
+          <p:nvPr/>
+        </p:nvCxnSpPr>
+        <p:spPr>
+          <a:xfrm>
+            <a:off x="3707904" y="1484784"/>
+            <a:ext cx="3672408" cy="1944216"/>
+          </a:xfrm>
+          <a:prstGeom prst="line">
+            <a:avLst/>
+          </a:prstGeom>
+          <a:ln w="127000">
+            <a:solidFill>
+              <a:schemeClr val="tx1"/>
+            </a:solidFill>
+          </a:ln>
+        </p:spPr>
+        <p:style>
+          <a:lnRef idx="1">
+            <a:schemeClr val="accent1"/>
+          </a:lnRef>
+          <a:fillRef idx="0">
+            <a:schemeClr val="accent1"/>
+          </a:fillRef>
+          <a:effectRef idx="0">
+            <a:schemeClr val="accent1"/>
+          </a:effectRef>
+          <a:fontRef idx="minor">
+            <a:schemeClr val="tx1"/>
+          </a:fontRef>
+        </p:style>
+      </p:cxnSp>
+      <p:cxnSp>
+        <p:nvCxnSpPr>
+          <p:cNvPr id="14" name="Straight Connector 13"/>
+          <p:cNvCxnSpPr/>
+          <p:nvPr/>
+        </p:nvCxnSpPr>
+        <p:spPr>
+          <a:xfrm flipV="1">
+            <a:off x="3707904" y="1484784"/>
+            <a:ext cx="3096344" cy="1800200"/>
+          </a:xfrm>
+          <a:prstGeom prst="line">
+            <a:avLst/>
+          </a:prstGeom>
+          <a:ln w="127000">
+            <a:solidFill>
+              <a:schemeClr val="tx1"/>
+            </a:solidFill>
+          </a:ln>
+        </p:spPr>
+        <p:style>
+          <a:lnRef idx="1">
+            <a:schemeClr val="accent1"/>
+          </a:lnRef>
+          <a:fillRef idx="0">
+            <a:schemeClr val="accent1"/>
+          </a:fillRef>
+          <a:effectRef idx="0">
+            <a:schemeClr val="accent1"/>
+          </a:effectRef>
+          <a:fontRef idx="minor">
+            <a:schemeClr val="tx1"/>
+          </a:fontRef>
+        </p:style>
+      </p:cxnSp>
+      <p:sp>
+        <p:nvSpPr>
+          <p:cNvPr id="15" name="TextBox 14"/>
+          <p:cNvSpPr txBox="1"/>
+          <p:nvPr/>
+        </p:nvSpPr>
+        <p:spPr>
+          <a:xfrm>
+            <a:off x="3131840" y="3779748"/>
+            <a:ext cx="5832648" cy="2585323"/>
+          </a:xfrm>
+          <a:prstGeom prst="rect">
+            <a:avLst/>
+          </a:prstGeom>
+          <a:noFill/>
+        </p:spPr>
+        <p:txBody>
+          <a:bodyPr wrap="square" rtlCol="0">
+            <a:spAutoFit/>
+          </a:bodyPr>
+          <a:lstStyle/>
+          <a:p>
+            <a:r>
+              <a:rPr lang="en-CA" dirty="0" smtClean="0"/>
+              <a:t>Deleting a branch removes the development pointer from the GIT repository. Any </a:t>
+            </a:r>
+            <a:r>
+              <a:rPr lang="en-CA" dirty="0" err="1" smtClean="0"/>
+              <a:t>changesets</a:t>
+            </a:r>
+            <a:r>
+              <a:rPr lang="en-CA" dirty="0" smtClean="0"/>
+              <a:t> not yet merged elsewhere are lost. Any </a:t>
+            </a:r>
+            <a:r>
+              <a:rPr lang="en-CA" dirty="0" err="1" smtClean="0"/>
+              <a:t>changesets</a:t>
+            </a:r>
+            <a:r>
+              <a:rPr lang="en-CA" dirty="0" smtClean="0"/>
+              <a:t> merged to other branches, remain in that branch only.</a:t>
+            </a:r>
+          </a:p>
+          <a:p>
+            <a:endParaRPr lang="en-CA" dirty="0"/>
+          </a:p>
+          <a:p>
+            <a:r>
+              <a:rPr lang="en-CA" dirty="0" smtClean="0"/>
+              <a:t>Two cases again: </a:t>
+            </a:r>
+          </a:p>
+          <a:p>
+            <a:pPr marL="285750" indent="-285750">
+              <a:buFont typeface="Arial" panose="020B0604020202020204" pitchFamily="34" charset="0"/>
+              <a:buChar char="•"/>
+            </a:pPr>
+            <a:r>
+              <a:rPr lang="en-CA" dirty="0" smtClean="0"/>
+              <a:t>you delete a local branch you have not yet pushed</a:t>
+            </a:r>
+          </a:p>
+          <a:p>
+            <a:pPr marL="285750" indent="-285750">
+              <a:buFont typeface="Arial" panose="020B0604020202020204" pitchFamily="34" charset="0"/>
+              <a:buChar char="•"/>
+            </a:pPr>
+            <a:r>
+              <a:rPr lang="en-CA" dirty="0" smtClean="0"/>
+              <a:t>You delete a branch already pushed (</a:t>
+            </a:r>
+            <a:r>
+              <a:rPr lang="en-CA" b="1" dirty="0" smtClean="0">
+                <a:solidFill>
+                  <a:srgbClr val="FF0000"/>
+                </a:solidFill>
+              </a:rPr>
+              <a:t>destructive!!!</a:t>
+            </a:r>
+            <a:r>
+              <a:rPr lang="en-CA" dirty="0" smtClean="0"/>
+              <a:t>)</a:t>
+            </a:r>
+          </a:p>
+          <a:p>
+            <a:r>
+              <a:rPr lang="en-CA" dirty="0" smtClean="0"/>
+              <a:t>In both cases, there is no going back from this.</a:t>
+            </a:r>
+            <a:endParaRPr lang="en-CA" dirty="0"/>
+          </a:p>
+        </p:txBody>
+      </p:sp>
+    </p:spTree>
+    <p:extLst>
+      <p:ext uri="{BB962C8B-B14F-4D97-AF65-F5344CB8AC3E}">
+        <p14:creationId xmlns:p14="http://schemas.microsoft.com/office/powerpoint/2010/main" val="251038345"/>
+      </p:ext>
+    </p:extLst>
+  </p:cSld>
+  <p:clrMapOvr>
+    <a:masterClrMapping/>
+  </p:clrMapOvr>
+  <p:timing>
+    <p:tnLst>
+      <p:par>
+        <p:cTn id="1" dur="indefinite" restart="never" nodeType="tmRoot"/>
+      </p:par>
+    </p:tnLst>
+  </p:timing>
+</p:sld>
+</file>
+
+<file path=ppt/slides/slide28.xml><?xml version="1.0" encoding="utf-8"?>
+<p:sld xmlns:a="http://schemas.openxmlformats.org/drawingml/2006/main" xmlns:r="http://schemas.openxmlformats.org/officeDocument/2006/relationships" xmlns:p="http://schemas.openxmlformats.org/presentationml/2006/main">
+  <p:cSld>
+    <p:spTree>
+      <p:nvGrpSpPr>
+        <p:cNvPr id="1" name=""/>
+        <p:cNvGrpSpPr/>
+        <p:nvPr/>
+      </p:nvGrpSpPr>
+      <p:grpSpPr>
+        <a:xfrm>
+          <a:off x="0" y="0"/>
+          <a:ext cx="0" cy="0"/>
+          <a:chOff x="0" y="0"/>
+          <a:chExt cx="0" cy="0"/>
+        </a:xfrm>
+      </p:grpSpPr>
+      <p:sp>
+        <p:nvSpPr>
+          <p:cNvPr id="2" name="Title 1"/>
+          <p:cNvSpPr>
+            <a:spLocks noGrp="1"/>
+          </p:cNvSpPr>
+          <p:nvPr>
+            <p:ph type="title"/>
+          </p:nvPr>
+        </p:nvSpPr>
+        <p:spPr/>
+        <p:txBody>
+          <a:bodyPr/>
+          <a:lstStyle/>
+          <a:p>
+            <a:r>
+              <a:rPr lang="en-CA" dirty="0" smtClean="0"/>
               <a:t>CHERRY-PICKING</a:t>
             </a:r>
             <a:endParaRPr lang="en-CA" dirty="0"/>
@@ -12355,9 +14012,16 @@
             <p:ph idx="1"/>
           </p:nvPr>
         </p:nvSpPr>
-        <p:spPr/>
-        <p:txBody>
-          <a:bodyPr/>
+        <p:spPr>
+          <a:xfrm>
+            <a:off x="457200" y="1600201"/>
+            <a:ext cx="3178696" cy="4493096"/>
+          </a:xfrm>
+        </p:spPr>
+        <p:txBody>
+          <a:bodyPr>
+            <a:normAutofit fontScale="92500" lnSpcReduction="20000"/>
+          </a:bodyPr>
           <a:lstStyle/>
           <a:p>
             <a:pPr marL="0" indent="0">
@@ -12373,16 +14037,215 @@
             </a:r>
             <a:r>
               <a:rPr lang="en-CA" dirty="0" smtClean="0"/>
-              <a:t>(s) from another branch into yours, without merging the rest of the branch.</a:t>
-            </a:r>
+              <a:t>(s) from another branch into yours, without merging the rest of the branch</a:t>
+            </a:r>
+            <a:r>
+              <a:rPr lang="en-CA" dirty="0" smtClean="0"/>
+              <a:t>. The </a:t>
+            </a:r>
+            <a:r>
+              <a:rPr lang="en-CA" dirty="0" err="1" smtClean="0"/>
+              <a:t>changesets</a:t>
+            </a:r>
+            <a:r>
+              <a:rPr lang="en-CA" dirty="0" smtClean="0"/>
+              <a:t> I have cherry-picked get a new GUID.</a:t>
+            </a:r>
+          </a:p>
+          <a:p>
+            <a:pPr marL="0" indent="0">
+              <a:buNone/>
+            </a:pPr>
             <a:endParaRPr lang="en-CA" dirty="0"/>
           </a:p>
-        </p:txBody>
-      </p:sp>
+          <a:p>
+            <a:pPr marL="0" indent="0">
+              <a:buNone/>
+            </a:pPr>
+            <a:endParaRPr lang="en-CA" dirty="0"/>
+          </a:p>
+        </p:txBody>
+      </p:sp>
+      <p:pic>
+        <p:nvPicPr>
+          <p:cNvPr id="1027" name="Picture 3"/>
+          <p:cNvPicPr>
+            <a:picLocks noChangeAspect="1" noChangeArrowheads="1"/>
+          </p:cNvPicPr>
+          <p:nvPr/>
+        </p:nvPicPr>
+        <p:blipFill>
+          <a:blip r:embed="rId3">
+            <a:extLst>
+              <a:ext uri="{28A0092B-C50C-407E-A947-70E740481C1C}">
+                <a14:useLocalDpi xmlns:a14="http://schemas.microsoft.com/office/drawing/2010/main" val="0"/>
+              </a:ext>
+            </a:extLst>
+          </a:blip>
+          <a:srcRect/>
+          <a:stretch>
+            <a:fillRect/>
+          </a:stretch>
+        </p:blipFill>
+        <p:spPr bwMode="auto">
+          <a:xfrm>
+            <a:off x="3779912" y="1484784"/>
+            <a:ext cx="4944729" cy="4464496"/>
+          </a:xfrm>
+          <a:prstGeom prst="rect">
+            <a:avLst/>
+          </a:prstGeom>
+          <a:noFill/>
+          <a:ln>
+            <a:noFill/>
+          </a:ln>
+          <a:effectLst/>
+          <a:extLst>
+            <a:ext uri="{909E8E84-426E-40DD-AFC4-6F175D3DCCD1}">
+              <a14:hiddenFill xmlns:a14="http://schemas.microsoft.com/office/drawing/2010/main">
+                <a:solidFill>
+                  <a:schemeClr val="accent1"/>
+                </a:solidFill>
+              </a14:hiddenFill>
+            </a:ext>
+            <a:ext uri="{91240B29-F687-4F45-9708-019B960494DF}">
+              <a14:hiddenLine xmlns:a14="http://schemas.microsoft.com/office/drawing/2010/main" w="9525">
+                <a:solidFill>
+                  <a:schemeClr val="tx1"/>
+                </a:solidFill>
+                <a:miter lim="800000"/>
+                <a:headEnd/>
+                <a:tailEnd/>
+              </a14:hiddenLine>
+            </a:ext>
+            <a:ext uri="{AF507438-7753-43E0-B8FC-AC1667EBCBE1}">
+              <a14:hiddenEffects xmlns:a14="http://schemas.microsoft.com/office/drawing/2010/main">
+                <a:effectLst>
+                  <a:outerShdw dist="35921" dir="2700000" algn="ctr" rotWithShape="0">
+                    <a:schemeClr val="bg2"/>
+                  </a:outerShdw>
+                </a:effectLst>
+              </a14:hiddenEffects>
+            </a:ext>
+          </a:extLst>
+        </p:spPr>
+      </p:pic>
     </p:spTree>
     <p:extLst>
       <p:ext uri="{BB962C8B-B14F-4D97-AF65-F5344CB8AC3E}">
         <p14:creationId xmlns:p14="http://schemas.microsoft.com/office/powerpoint/2010/main" val="2958468915"/>
+      </p:ext>
+    </p:extLst>
+  </p:cSld>
+  <p:clrMapOvr>
+    <a:masterClrMapping/>
+  </p:clrMapOvr>
+  <p:timing>
+    <p:tnLst>
+      <p:par>
+        <p:cTn id="1" dur="indefinite" restart="never" nodeType="tmRoot"/>
+      </p:par>
+    </p:tnLst>
+  </p:timing>
+</p:sld>
+</file>
+
+<file path=ppt/slides/slide29.xml><?xml version="1.0" encoding="utf-8"?>
+<p:sld xmlns:a="http://schemas.openxmlformats.org/drawingml/2006/main" xmlns:r="http://schemas.openxmlformats.org/officeDocument/2006/relationships" xmlns:p="http://schemas.openxmlformats.org/presentationml/2006/main">
+  <p:cSld>
+    <p:spTree>
+      <p:nvGrpSpPr>
+        <p:cNvPr id="1" name=""/>
+        <p:cNvGrpSpPr/>
+        <p:nvPr/>
+      </p:nvGrpSpPr>
+      <p:grpSpPr>
+        <a:xfrm>
+          <a:off x="0" y="0"/>
+          <a:ext cx="0" cy="0"/>
+          <a:chOff x="0" y="0"/>
+          <a:chExt cx="0" cy="0"/>
+        </a:xfrm>
+      </p:grpSpPr>
+      <p:sp>
+        <p:nvSpPr>
+          <p:cNvPr id="2" name="Title 1"/>
+          <p:cNvSpPr>
+            <a:spLocks noGrp="1"/>
+          </p:cNvSpPr>
+          <p:nvPr>
+            <p:ph type="title"/>
+          </p:nvPr>
+        </p:nvSpPr>
+        <p:spPr/>
+        <p:txBody>
+          <a:bodyPr/>
+          <a:lstStyle/>
+          <a:p>
+            <a:r>
+              <a:rPr lang="en-CA" dirty="0" smtClean="0"/>
+              <a:t>WHAT GOOD ARE TAGS ANYWAY?</a:t>
+            </a:r>
+            <a:endParaRPr lang="en-CA" dirty="0"/>
+          </a:p>
+        </p:txBody>
+      </p:sp>
+      <p:sp>
+        <p:nvSpPr>
+          <p:cNvPr id="3" name="Content Placeholder 2"/>
+          <p:cNvSpPr>
+            <a:spLocks noGrp="1"/>
+          </p:cNvSpPr>
+          <p:nvPr>
+            <p:ph idx="1"/>
+          </p:nvPr>
+        </p:nvSpPr>
+        <p:spPr/>
+        <p:txBody>
+          <a:bodyPr/>
+          <a:lstStyle/>
+          <a:p>
+            <a:r>
+              <a:rPr lang="en-CA" dirty="0" smtClean="0"/>
+              <a:t>Tags are a equivalent to </a:t>
+            </a:r>
+            <a:r>
+              <a:rPr lang="en-CA" dirty="0" err="1" smtClean="0"/>
+              <a:t>ClearCase</a:t>
+            </a:r>
+            <a:r>
+              <a:rPr lang="en-CA" dirty="0" smtClean="0"/>
+              <a:t> labels: a piece of text serving to mark a particular build with something that makes sense to the developer.</a:t>
+            </a:r>
+          </a:p>
+          <a:p>
+            <a:r>
+              <a:rPr lang="en-CA" dirty="0" smtClean="0"/>
+              <a:t>Very </a:t>
+            </a:r>
+            <a:r>
+              <a:rPr lang="en-CA" dirty="0" err="1" smtClean="0"/>
+              <a:t>VERY</a:t>
+            </a:r>
+            <a:r>
+              <a:rPr lang="en-CA" dirty="0" smtClean="0"/>
+              <a:t> useful to mark the </a:t>
+            </a:r>
+            <a:r>
+              <a:rPr lang="en-CA" dirty="0" err="1" smtClean="0"/>
+              <a:t>changesets</a:t>
+            </a:r>
+            <a:r>
+              <a:rPr lang="en-CA" dirty="0" smtClean="0"/>
+              <a:t> for your builds. You can reproduce any build ever created.</a:t>
+            </a:r>
+          </a:p>
+        </p:txBody>
+      </p:sp>
+    </p:spTree>
+    <p:extLst>
+      <p:ext uri="{BB962C8B-B14F-4D97-AF65-F5344CB8AC3E}">
+        <p14:creationId xmlns:p14="http://schemas.microsoft.com/office/powerpoint/2010/main" val="3907325129"/>
       </p:ext>
     </p:extLst>
   </p:cSld>
@@ -12504,8 +14367,8 @@
           <a:lstStyle/>
           <a:p>
             <a:r>
-              <a:rPr lang="en-CA" dirty="0" smtClean="0"/>
-              <a:t>A GIT Repository</a:t>
+              <a:rPr lang="en-CA" dirty="0"/>
+              <a:t>A GIT REPOSITORY</a:t>
             </a:r>
             <a:endParaRPr lang="en-CA" dirty="0"/>
           </a:p>
@@ -12663,8 +14526,8 @@
           <a:lstStyle/>
           <a:p>
             <a:r>
-              <a:rPr lang="en-CA" dirty="0" smtClean="0"/>
-              <a:t>A GIT Repository</a:t>
+              <a:rPr lang="en-CA" dirty="0"/>
+              <a:t>A GIT REPOSITORY</a:t>
             </a:r>
             <a:endParaRPr lang="en-CA" dirty="0"/>
           </a:p>
@@ -12775,8 +14638,8 @@
           <a:lstStyle/>
           <a:p>
             <a:r>
-              <a:rPr lang="en-CA" dirty="0" smtClean="0"/>
-              <a:t>A GIT Repository</a:t>
+              <a:rPr lang="en-CA" dirty="0"/>
+              <a:t>A GIT REPOSITORY</a:t>
             </a:r>
             <a:endParaRPr lang="en-CA" dirty="0"/>
           </a:p>
@@ -13515,8 +15378,8 @@
           <a:lstStyle/>
           <a:p>
             <a:r>
-              <a:rPr lang="en-CA" dirty="0" smtClean="0"/>
-              <a:t>A GIT Repository</a:t>
+              <a:rPr lang="en-CA" dirty="0"/>
+              <a:t>A GIT REPOSITORY</a:t>
             </a:r>
             <a:endParaRPr lang="en-CA" dirty="0"/>
           </a:p>
@@ -14580,7 +16443,7 @@
           <a:p>
             <a:r>
               <a:rPr lang="en-CA" dirty="0" smtClean="0"/>
-              <a:t>A GIT Repository</a:t>
+              <a:t>A GIT REPOSITORY</a:t>
             </a:r>
             <a:endParaRPr lang="en-CA" dirty="0"/>
           </a:p>
@@ -15786,7 +17649,7 @@
           <a:p>
             <a:r>
               <a:rPr lang="en-CA" dirty="0" smtClean="0"/>
-              <a:t>Which Version Is The Latest?</a:t>
+              <a:t>WHICH VERSION IS THE LATEST?</a:t>
             </a:r>
             <a:endParaRPr lang="en-CA" dirty="0"/>
           </a:p>

</xml_diff>

<commit_message>
all done. Need to edit it out tomorrow.
</commit_message>
<xml_diff>
--- a/powerpoint/An Introduction to GIT.pptx
+++ b/powerpoint/An Introduction to GIT.pptx
@@ -5,7 +5,7 @@
     <p:sldMasterId id="2147483648" r:id="rId1"/>
   </p:sldMasterIdLst>
   <p:notesMasterIdLst>
-    <p:notesMasterId r:id="rId31"/>
+    <p:notesMasterId r:id="rId40"/>
   </p:notesMasterIdLst>
   <p:sldIdLst>
     <p:sldId id="256" r:id="rId2"/>
@@ -37,6 +37,15 @@
     <p:sldId id="283" r:id="rId28"/>
     <p:sldId id="281" r:id="rId29"/>
     <p:sldId id="284" r:id="rId30"/>
+    <p:sldId id="287" r:id="rId31"/>
+    <p:sldId id="286" r:id="rId32"/>
+    <p:sldId id="285" r:id="rId33"/>
+    <p:sldId id="288" r:id="rId34"/>
+    <p:sldId id="289" r:id="rId35"/>
+    <p:sldId id="290" r:id="rId36"/>
+    <p:sldId id="291" r:id="rId37"/>
+    <p:sldId id="293" r:id="rId38"/>
+    <p:sldId id="292" r:id="rId39"/>
   </p:sldIdLst>
   <p:sldSz cx="9144000" cy="6858000" type="screen4x3"/>
   <p:notesSz cx="6858000" cy="9144000"/>
@@ -543,7 +552,24 @@
           <a:p>
             <a:r>
               <a:rPr lang="en-CA" dirty="0" smtClean="0"/>
-              <a:t>I don’t claim</a:t>
+              <a:t>I have been working with</a:t>
+            </a:r>
+            <a:r>
+              <a:rPr lang="en-CA" baseline="0" dirty="0" smtClean="0"/>
+              <a:t> GIT for more than 3 years now. Most of the 3 years I’ve been helping other developers with their GIT problems.</a:t>
+            </a:r>
+          </a:p>
+          <a:p>
+            <a:endParaRPr lang="en-CA" baseline="0" dirty="0" smtClean="0"/>
+          </a:p>
+          <a:p>
+            <a:r>
+              <a:rPr lang="en-CA" dirty="0" smtClean="0"/>
+              <a:t>I </a:t>
+            </a:r>
+            <a:r>
+              <a:rPr lang="en-CA" dirty="0" smtClean="0"/>
+              <a:t>don’t claim</a:t>
             </a:r>
             <a:r>
               <a:rPr lang="en-CA" baseline="0" dirty="0" smtClean="0"/>
@@ -1685,11 +1711,7 @@
             </a:pPr>
             <a:r>
               <a:rPr lang="en-CA" dirty="0" smtClean="0"/>
-              <a:t>G</a:t>
-            </a:r>
-            <a:r>
-              <a:rPr lang="en-CA" dirty="0" smtClean="0"/>
-              <a:t>:\temp\gitdemo&gt;git push</a:t>
+              <a:t>G:\temp\gitdemo&gt;git push</a:t>
             </a:r>
           </a:p>
           <a:p>
@@ -1838,11 +1860,7 @@
           <a:p>
             <a:r>
               <a:rPr lang="en-CA" baseline="0" dirty="0" smtClean="0"/>
-              <a:t>hint: See the 'Note about fast-forwards' in 'git push --help' for details</a:t>
-            </a:r>
-            <a:r>
-              <a:rPr lang="en-CA" baseline="0" dirty="0" smtClean="0"/>
-              <a:t>.</a:t>
+              <a:t>hint: See the 'Note about fast-forwards' in 'git push --help' for details.</a:t>
             </a:r>
           </a:p>
           <a:p>
@@ -1853,7 +1871,6 @@
               <a:rPr lang="en-CA" baseline="0" dirty="0" smtClean="0"/>
               <a:t>*** Don’t pull just yet.</a:t>
             </a:r>
-            <a:endParaRPr lang="en-CA" baseline="0" dirty="0" smtClean="0"/>
           </a:p>
         </p:txBody>
       </p:sp>
@@ -2595,53 +2612,16 @@
             </a:r>
             <a:r>
               <a:rPr lang="en-CA" baseline="0" dirty="0" smtClean="0"/>
-              <a:t>, though as you can see it is used very differently: with GIT you will be using branches to track your </a:t>
-            </a:r>
-            <a:r>
-              <a:rPr lang="en-CA" baseline="0" dirty="0" smtClean="0"/>
-              <a:t>personal work </a:t>
-            </a:r>
-            <a:r>
-              <a:rPr lang="en-CA" baseline="0" dirty="0" smtClean="0"/>
-              <a:t>items, not </a:t>
-            </a:r>
-            <a:r>
-              <a:rPr lang="en-CA" baseline="0" dirty="0" smtClean="0"/>
-              <a:t>simply </a:t>
-            </a:r>
-            <a:r>
-              <a:rPr lang="en-CA" baseline="0" dirty="0" smtClean="0"/>
-              <a:t>entire projects. Rolling back a feature in this case is a simple exercise in locating the branch it was implemented in and rolling back the merge commit for it. One does not need to know what the change is, or even where it is, in order to undo it. Also, that features can be re-merged at some point in the future, bring it </a:t>
-            </a:r>
-            <a:r>
-              <a:rPr lang="en-CA" baseline="0" dirty="0" smtClean="0"/>
-              <a:t>back.</a:t>
-            </a:r>
+              <a:t>, though as you can see it is used very differently: with GIT you will be using branches to track your personal work items, not simply entire projects. Rolling back a feature in this case is a simple exercise in locating the branch it was implemented in and rolling back the merge commit for it. One does not need to know what the change is, or even where it is, in order to undo it. Also, that features can be re-merged at some point in the future, bring it back.</a:t>
+            </a:r>
+          </a:p>
+          <a:p>
             <a:endParaRPr lang="en-CA" baseline="0" dirty="0" smtClean="0"/>
           </a:p>
           <a:p>
-            <a:endParaRPr lang="en-CA" baseline="0" dirty="0" smtClean="0"/>
-          </a:p>
-          <a:p>
-            <a:r>
-              <a:rPr lang="en-CA" baseline="0" dirty="0" smtClean="0"/>
-              <a:t>What is the main branch? This is the branch your GIT repository is first created with. It is </a:t>
-            </a:r>
-            <a:r>
-              <a:rPr lang="en-CA" baseline="0" dirty="0" smtClean="0"/>
-              <a:t>usually called </a:t>
-            </a:r>
-            <a:r>
-              <a:rPr lang="en-CA" baseline="0" dirty="0" smtClean="0"/>
-              <a:t>“master”. What is special about it? Nothing, it was just the first branch created. There is nothing to say you have to always </a:t>
-            </a:r>
-            <a:r>
-              <a:rPr lang="en-CA" baseline="0" dirty="0" smtClean="0"/>
-              <a:t>ultimately merge </a:t>
-            </a:r>
-            <a:r>
-              <a:rPr lang="en-CA" baseline="0" dirty="0" smtClean="0"/>
-              <a:t>to it, though this is the accepted practice.</a:t>
+            <a:r>
+              <a:rPr lang="en-CA" baseline="0" dirty="0" smtClean="0"/>
+              <a:t>What is the main branch? This is the branch your GIT repository is first created with. It is usually called “master”. What is special about it? Nothing, it was just the first branch created. There is nothing to say you have to always ultimately merge to it, though this is the accepted practice.</a:t>
             </a:r>
           </a:p>
         </p:txBody>
@@ -2728,29 +2708,8 @@
           <a:p>
             <a:r>
               <a:rPr lang="en-CA" baseline="0" dirty="0" smtClean="0"/>
-              <a:t>I rolled back a merge before, which effectively deleted the commits performed after my branch’s sync point at the time. Ouch! What happens to the GIT repository that pushed them now? Nothing, it is fine and well, </a:t>
-            </a:r>
-            <a:r>
-              <a:rPr lang="en-CA" baseline="0" dirty="0" smtClean="0"/>
-              <a:t>it simply has to be pushed again. An </a:t>
-            </a:r>
-            <a:r>
-              <a:rPr lang="en-CA" baseline="0" dirty="0" smtClean="0"/>
-              <a:t>attempt to </a:t>
-            </a:r>
-            <a:r>
-              <a:rPr lang="en-CA" baseline="0" dirty="0" smtClean="0"/>
-              <a:t>do so </a:t>
-            </a:r>
-            <a:r>
-              <a:rPr lang="en-CA" baseline="0" dirty="0" smtClean="0"/>
-              <a:t>yields something rather </a:t>
-            </a:r>
-            <a:r>
-              <a:rPr lang="en-CA" baseline="0" dirty="0" smtClean="0"/>
-              <a:t>interesting:</a:t>
-            </a:r>
-            <a:endParaRPr lang="en-CA" baseline="0" dirty="0" smtClean="0"/>
+              <a:t>I rolled back a merge before, which effectively deleted the commits performed after my branch’s sync point at the time. Ouch! What happens to the GIT repository that pushed them now? Nothing, it is fine and well, it simply has to be pushed again. An attempt to do so yields something rather interesting:</a:t>
+            </a:r>
           </a:p>
           <a:p>
             <a:endParaRPr lang="en-CA" baseline="0" dirty="0" smtClean="0"/>
@@ -2901,15 +2860,7 @@
           <a:p>
             <a:r>
               <a:rPr lang="en-CA" dirty="0" smtClean="0"/>
-              <a:t>No </a:t>
-            </a:r>
-            <a:r>
-              <a:rPr lang="en-CA" dirty="0" smtClean="0"/>
-              <a:t>conflict </a:t>
-            </a:r>
-            <a:r>
-              <a:rPr lang="en-CA" dirty="0" smtClean="0"/>
-              <a:t>now, at least not in my </a:t>
+              <a:t>No conflict now, at least not in my </a:t>
             </a:r>
             <a:r>
               <a:rPr lang="en-CA" dirty="0" err="1" smtClean="0"/>
@@ -2917,19 +2868,11 @@
             </a:r>
             <a:r>
               <a:rPr lang="en-CA" dirty="0" smtClean="0"/>
-              <a:t>. </a:t>
-            </a:r>
-            <a:r>
-              <a:rPr lang="en-CA" dirty="0" smtClean="0"/>
-              <a:t>I haven’t avoided it, though,</a:t>
-            </a:r>
-            <a:r>
-              <a:rPr lang="en-CA" baseline="0" dirty="0" smtClean="0"/>
-              <a:t> I have simply created an alternative development flow. I am free to develop in my own separate branch, until I try to merge my branch to the master. That conflict will happen all over again then</a:t>
-            </a:r>
-            <a:r>
-              <a:rPr lang="en-CA" baseline="0" dirty="0" smtClean="0"/>
-              <a:t>.</a:t>
+              <a:t>. I haven’t avoided it, though,</a:t>
+            </a:r>
+            <a:r>
+              <a:rPr lang="en-CA" baseline="0" dirty="0" smtClean="0"/>
+              <a:t> I have simply created an alternative development flow. I am free to develop in my own separate branch, until I try to merge my branch to the master. That conflict will happen all over again then.</a:t>
             </a:r>
           </a:p>
           <a:p>
@@ -2966,7 +2909,6 @@
               <a:rPr lang="en-CA" baseline="0" dirty="0" smtClean="0"/>
               <a:t>G:\github\demo&gt;git log --all --branches --decorate --graph</a:t>
             </a:r>
-            <a:endParaRPr lang="en-CA" baseline="0" dirty="0" smtClean="0"/>
           </a:p>
           <a:p>
             <a:endParaRPr lang="en-CA" baseline="0" dirty="0" smtClean="0"/>
@@ -3869,6 +3811,600 @@
 </p:notes>
 </file>
 
+<file path=ppt/notesSlides/notesSlide26.xml><?xml version="1.0" encoding="utf-8"?>
+<p:notes xmlns:a="http://schemas.openxmlformats.org/drawingml/2006/main" xmlns:r="http://schemas.openxmlformats.org/officeDocument/2006/relationships" xmlns:p="http://schemas.openxmlformats.org/presentationml/2006/main">
+  <p:cSld>
+    <p:spTree>
+      <p:nvGrpSpPr>
+        <p:cNvPr id="1" name=""/>
+        <p:cNvGrpSpPr/>
+        <p:nvPr/>
+      </p:nvGrpSpPr>
+      <p:grpSpPr>
+        <a:xfrm>
+          <a:off x="0" y="0"/>
+          <a:ext cx="0" cy="0"/>
+          <a:chOff x="0" y="0"/>
+          <a:chExt cx="0" cy="0"/>
+        </a:xfrm>
+      </p:grpSpPr>
+      <p:sp>
+        <p:nvSpPr>
+          <p:cNvPr id="2" name="Slide Image Placeholder 1"/>
+          <p:cNvSpPr>
+            <a:spLocks noGrp="1" noRot="1" noChangeAspect="1"/>
+          </p:cNvSpPr>
+          <p:nvPr>
+            <p:ph type="sldImg"/>
+          </p:nvPr>
+        </p:nvSpPr>
+        <p:spPr/>
+      </p:sp>
+      <p:sp>
+        <p:nvSpPr>
+          <p:cNvPr id="3" name="Notes Placeholder 2"/>
+          <p:cNvSpPr>
+            <a:spLocks noGrp="1"/>
+          </p:cNvSpPr>
+          <p:nvPr>
+            <p:ph type="body" idx="1"/>
+          </p:nvPr>
+        </p:nvSpPr>
+        <p:spPr/>
+        <p:txBody>
+          <a:bodyPr/>
+          <a:lstStyle/>
+          <a:p>
+            <a:r>
+              <a:rPr lang="en-CA" dirty="0" smtClean="0"/>
+              <a:t>This is the beginning of the more advanced section of this presentation.</a:t>
+            </a:r>
+          </a:p>
+          <a:p>
+            <a:endParaRPr lang="en-CA" dirty="0" smtClean="0"/>
+          </a:p>
+          <a:p>
+            <a:r>
+              <a:rPr lang="en-CA" dirty="0" smtClean="0"/>
+              <a:t>I am going to start discuss</a:t>
+            </a:r>
+            <a:r>
+              <a:rPr lang="en-CA" baseline="0" dirty="0" smtClean="0"/>
+              <a:t> some fairly advanced topics I have noticed my team members are having problems with. This has to do with structuring a GIT repository, something most developers rarely have to deal with. Things are going to get somewhat abstract very quickly from here on. My experience introducing new developers to GIT is I should stop here and let my developers get some days/weeks of hands-on experience with GIT before exposing them to this.</a:t>
+            </a:r>
+          </a:p>
+          <a:p>
+            <a:endParaRPr lang="en-CA" baseline="0" dirty="0" smtClean="0"/>
+          </a:p>
+          <a:p>
+            <a:r>
+              <a:rPr lang="en-CA" baseline="0" dirty="0" smtClean="0"/>
+              <a:t>Depending on how (un)comfortable you are with what you saw so far, this might be a good time to stop and tackle any other topics you wish to see instead of this.</a:t>
+            </a:r>
+          </a:p>
+          <a:p>
+            <a:endParaRPr lang="en-CA" baseline="0" dirty="0" smtClean="0"/>
+          </a:p>
+          <a:p>
+            <a:endParaRPr lang="en-CA" baseline="0" dirty="0" smtClean="0"/>
+          </a:p>
+          <a:p>
+            <a:endParaRPr lang="en-CA" dirty="0"/>
+          </a:p>
+        </p:txBody>
+      </p:sp>
+      <p:sp>
+        <p:nvSpPr>
+          <p:cNvPr id="4" name="Slide Number Placeholder 3"/>
+          <p:cNvSpPr>
+            <a:spLocks noGrp="1"/>
+          </p:cNvSpPr>
+          <p:nvPr>
+            <p:ph type="sldNum" sz="quarter" idx="10"/>
+          </p:nvPr>
+        </p:nvSpPr>
+        <p:spPr/>
+        <p:txBody>
+          <a:bodyPr/>
+          <a:lstStyle/>
+          <a:p>
+            <a:fld id="{CB55E3E3-40A9-4EFD-94DF-114BB2F8C3AE}" type="slidenum">
+              <a:rPr lang="en-CA" smtClean="0"/>
+              <a:t>30</a:t>
+            </a:fld>
+            <a:endParaRPr lang="en-CA"/>
+          </a:p>
+        </p:txBody>
+      </p:sp>
+    </p:spTree>
+    <p:extLst>
+      <p:ext uri="{BB962C8B-B14F-4D97-AF65-F5344CB8AC3E}">
+        <p14:creationId xmlns:p14="http://schemas.microsoft.com/office/powerpoint/2010/main" val="260239133"/>
+      </p:ext>
+    </p:extLst>
+  </p:cSld>
+  <p:clrMapOvr>
+    <a:masterClrMapping/>
+  </p:clrMapOvr>
+</p:notes>
+</file>
+
+<file path=ppt/notesSlides/notesSlide27.xml><?xml version="1.0" encoding="utf-8"?>
+<p:notes xmlns:a="http://schemas.openxmlformats.org/drawingml/2006/main" xmlns:r="http://schemas.openxmlformats.org/officeDocument/2006/relationships" xmlns:p="http://schemas.openxmlformats.org/presentationml/2006/main">
+  <p:cSld>
+    <p:spTree>
+      <p:nvGrpSpPr>
+        <p:cNvPr id="1" name=""/>
+        <p:cNvGrpSpPr/>
+        <p:nvPr/>
+      </p:nvGrpSpPr>
+      <p:grpSpPr>
+        <a:xfrm>
+          <a:off x="0" y="0"/>
+          <a:ext cx="0" cy="0"/>
+          <a:chOff x="0" y="0"/>
+          <a:chExt cx="0" cy="0"/>
+        </a:xfrm>
+      </p:grpSpPr>
+      <p:sp>
+        <p:nvSpPr>
+          <p:cNvPr id="2" name="Slide Image Placeholder 1"/>
+          <p:cNvSpPr>
+            <a:spLocks noGrp="1" noRot="1" noChangeAspect="1"/>
+          </p:cNvSpPr>
+          <p:nvPr>
+            <p:ph type="sldImg"/>
+          </p:nvPr>
+        </p:nvSpPr>
+        <p:spPr/>
+      </p:sp>
+      <p:sp>
+        <p:nvSpPr>
+          <p:cNvPr id="3" name="Notes Placeholder 2"/>
+          <p:cNvSpPr>
+            <a:spLocks noGrp="1"/>
+          </p:cNvSpPr>
+          <p:nvPr>
+            <p:ph type="body" idx="1"/>
+          </p:nvPr>
+        </p:nvSpPr>
+        <p:spPr/>
+        <p:txBody>
+          <a:bodyPr/>
+          <a:lstStyle/>
+          <a:p>
+            <a:r>
+              <a:rPr lang="en-CA" dirty="0" smtClean="0"/>
+              <a:t>This is the beginning of the more advanced section of this presentation.</a:t>
+            </a:r>
+          </a:p>
+          <a:p>
+            <a:endParaRPr lang="en-CA" dirty="0" smtClean="0"/>
+          </a:p>
+          <a:p>
+            <a:r>
+              <a:rPr lang="en-CA" dirty="0" smtClean="0"/>
+              <a:t>I am going to discuss</a:t>
+            </a:r>
+            <a:r>
+              <a:rPr lang="en-CA" baseline="0" dirty="0" smtClean="0"/>
+              <a:t> some fairly advanced topics I have noticed my team members are having problems with. This has to do with structuring a GIT repository, something most developers don’t have to deal with. Things are going to get very abstract very quickly as I am going to have nested GIT repositories and people tend to get very confused.</a:t>
+            </a:r>
+          </a:p>
+          <a:p>
+            <a:endParaRPr lang="en-CA" baseline="0" dirty="0" smtClean="0"/>
+          </a:p>
+          <a:p>
+            <a:r>
+              <a:rPr lang="en-CA" baseline="0" dirty="0" smtClean="0"/>
+              <a:t>Depending on how (un)comfortable you are with what you saw so far, this might be a good time to stop and tackle any other topics you wish to see instead of this.</a:t>
+            </a:r>
+          </a:p>
+          <a:p>
+            <a:endParaRPr lang="en-CA" baseline="0" dirty="0" smtClean="0"/>
+          </a:p>
+          <a:p>
+            <a:r>
+              <a:rPr lang="en-CA" baseline="0" dirty="0" smtClean="0"/>
+              <a:t>Or I can keep going.</a:t>
+            </a:r>
+          </a:p>
+          <a:p>
+            <a:endParaRPr lang="en-CA" baseline="0" dirty="0" smtClean="0"/>
+          </a:p>
+          <a:p>
+            <a:endParaRPr lang="en-CA" dirty="0"/>
+          </a:p>
+        </p:txBody>
+      </p:sp>
+      <p:sp>
+        <p:nvSpPr>
+          <p:cNvPr id="4" name="Slide Number Placeholder 3"/>
+          <p:cNvSpPr>
+            <a:spLocks noGrp="1"/>
+          </p:cNvSpPr>
+          <p:nvPr>
+            <p:ph type="sldNum" sz="quarter" idx="10"/>
+          </p:nvPr>
+        </p:nvSpPr>
+        <p:spPr/>
+        <p:txBody>
+          <a:bodyPr/>
+          <a:lstStyle/>
+          <a:p>
+            <a:fld id="{CB55E3E3-40A9-4EFD-94DF-114BB2F8C3AE}" type="slidenum">
+              <a:rPr lang="en-CA" smtClean="0"/>
+              <a:t>31</a:t>
+            </a:fld>
+            <a:endParaRPr lang="en-CA"/>
+          </a:p>
+        </p:txBody>
+      </p:sp>
+    </p:spTree>
+    <p:extLst>
+      <p:ext uri="{BB962C8B-B14F-4D97-AF65-F5344CB8AC3E}">
+        <p14:creationId xmlns:p14="http://schemas.microsoft.com/office/powerpoint/2010/main" val="260239133"/>
+      </p:ext>
+    </p:extLst>
+  </p:cSld>
+  <p:clrMapOvr>
+    <a:masterClrMapping/>
+  </p:clrMapOvr>
+</p:notes>
+</file>
+
+<file path=ppt/notesSlides/notesSlide28.xml><?xml version="1.0" encoding="utf-8"?>
+<p:notes xmlns:a="http://schemas.openxmlformats.org/drawingml/2006/main" xmlns:r="http://schemas.openxmlformats.org/officeDocument/2006/relationships" xmlns:p="http://schemas.openxmlformats.org/presentationml/2006/main">
+  <p:cSld>
+    <p:spTree>
+      <p:nvGrpSpPr>
+        <p:cNvPr id="1" name=""/>
+        <p:cNvGrpSpPr/>
+        <p:nvPr/>
+      </p:nvGrpSpPr>
+      <p:grpSpPr>
+        <a:xfrm>
+          <a:off x="0" y="0"/>
+          <a:ext cx="0" cy="0"/>
+          <a:chOff x="0" y="0"/>
+          <a:chExt cx="0" cy="0"/>
+        </a:xfrm>
+      </p:grpSpPr>
+      <p:sp>
+        <p:nvSpPr>
+          <p:cNvPr id="2" name="Slide Image Placeholder 1"/>
+          <p:cNvSpPr>
+            <a:spLocks noGrp="1" noRot="1" noChangeAspect="1"/>
+          </p:cNvSpPr>
+          <p:nvPr>
+            <p:ph type="sldImg"/>
+          </p:nvPr>
+        </p:nvSpPr>
+        <p:spPr/>
+      </p:sp>
+      <p:sp>
+        <p:nvSpPr>
+          <p:cNvPr id="3" name="Notes Placeholder 2"/>
+          <p:cNvSpPr>
+            <a:spLocks noGrp="1"/>
+          </p:cNvSpPr>
+          <p:nvPr>
+            <p:ph type="body" idx="1"/>
+          </p:nvPr>
+        </p:nvSpPr>
+        <p:spPr/>
+        <p:txBody>
+          <a:bodyPr/>
+          <a:lstStyle/>
+          <a:p>
+            <a:r>
+              <a:rPr lang="en-CA" dirty="0" smtClean="0"/>
+              <a:t>A larger code base is the undoing of GIT.</a:t>
+            </a:r>
+            <a:r>
+              <a:rPr lang="en-CA" baseline="0" dirty="0" smtClean="0"/>
+              <a:t> Unlike </a:t>
+            </a:r>
+            <a:r>
+              <a:rPr lang="en-CA" baseline="0" dirty="0" err="1" smtClean="0"/>
+              <a:t>ClearCase</a:t>
+            </a:r>
+            <a:r>
+              <a:rPr lang="en-CA" baseline="0" dirty="0" smtClean="0"/>
+              <a:t> and TFS, all operations are on repository level, meaning the larger the repository is, the slower GIT gets.</a:t>
+            </a:r>
+          </a:p>
+          <a:p>
+            <a:r>
+              <a:rPr lang="en-CA" dirty="0" smtClean="0"/>
+              <a:t> </a:t>
+            </a:r>
+          </a:p>
+          <a:p>
+            <a:r>
+              <a:rPr lang="en-CA" dirty="0" smtClean="0"/>
+              <a:t>More files means larger</a:t>
+            </a:r>
+            <a:r>
+              <a:rPr lang="en-CA" baseline="0" dirty="0" smtClean="0"/>
+              <a:t> (or more than one) development teams working on it, in turn resulting in more </a:t>
+            </a:r>
+            <a:r>
+              <a:rPr lang="en-CA" baseline="0" dirty="0" err="1" smtClean="0"/>
+              <a:t>changesets</a:t>
+            </a:r>
+            <a:r>
+              <a:rPr lang="en-CA" baseline="0" dirty="0" smtClean="0"/>
+              <a:t> being pushed. Every time someone pushes, everyone else has to pull before they can push their changes.</a:t>
+            </a:r>
+          </a:p>
+          <a:p>
+            <a:r>
+              <a:rPr lang="en-CA" baseline="0" dirty="0" smtClean="0"/>
+              <a:t>A simple clone operation will take much longer, especially when used over a slow network connection (e.g. cellular network)</a:t>
+            </a:r>
+          </a:p>
+          <a:p>
+            <a:pPr marL="0" marR="0" indent="0" algn="l" defTabSz="914400" rtl="0" eaLnBrk="1" fontAlgn="auto" latinLnBrk="0" hangingPunct="1">
+              <a:lnSpc>
+                <a:spcPct val="100000"/>
+              </a:lnSpc>
+              <a:spcBef>
+                <a:spcPts val="0"/>
+              </a:spcBef>
+              <a:spcAft>
+                <a:spcPts val="0"/>
+              </a:spcAft>
+              <a:buClrTx/>
+              <a:buSzTx/>
+              <a:buFontTx/>
+              <a:buNone/>
+              <a:tabLst/>
+              <a:defRPr/>
+            </a:pPr>
+            <a:r>
+              <a:rPr lang="en-CA" dirty="0" smtClean="0"/>
+              <a:t>Merges will take longer as there will be more </a:t>
+            </a:r>
+            <a:r>
+              <a:rPr lang="en-CA" dirty="0" err="1" smtClean="0"/>
+              <a:t>changesets</a:t>
+            </a:r>
+            <a:r>
+              <a:rPr lang="en-CA" dirty="0" smtClean="0"/>
+              <a:t> to merge.</a:t>
+            </a:r>
+            <a:r>
+              <a:rPr lang="en-CA" baseline="0" dirty="0" smtClean="0"/>
+              <a:t> Those </a:t>
+            </a:r>
+            <a:r>
+              <a:rPr lang="en-CA" baseline="0" dirty="0" err="1" smtClean="0"/>
+              <a:t>changesets</a:t>
+            </a:r>
+            <a:r>
+              <a:rPr lang="en-CA" baseline="0" dirty="0" smtClean="0"/>
+              <a:t>, in turn, will impact more files.</a:t>
+            </a:r>
+            <a:r>
+              <a:rPr lang="en-CA" baseline="0" dirty="0" smtClean="0"/>
+              <a:t> </a:t>
+            </a:r>
+          </a:p>
+          <a:p>
+            <a:pPr marL="0" marR="0" indent="0" algn="l" defTabSz="914400" rtl="0" eaLnBrk="1" fontAlgn="auto" latinLnBrk="0" hangingPunct="1">
+              <a:lnSpc>
+                <a:spcPct val="100000"/>
+              </a:lnSpc>
+              <a:spcBef>
+                <a:spcPts val="0"/>
+              </a:spcBef>
+              <a:spcAft>
+                <a:spcPts val="0"/>
+              </a:spcAft>
+              <a:buClrTx/>
+              <a:buSzTx/>
+              <a:buFontTx/>
+              <a:buNone/>
+              <a:tabLst/>
+              <a:defRPr/>
+            </a:pPr>
+            <a:r>
+              <a:rPr lang="en-CA" baseline="0" dirty="0" smtClean="0"/>
+              <a:t>The internal GIT repository is indexed with a hash function: the efficiency of the internal database goes down significantly as the load coefficient becomes high.</a:t>
+            </a:r>
+            <a:endParaRPr lang="en-CA" baseline="0" dirty="0" smtClean="0"/>
+          </a:p>
+          <a:p>
+            <a:r>
+              <a:rPr lang="en-CA" baseline="0" dirty="0" smtClean="0"/>
+              <a:t>Conflicts are inevitable and more files means more conflicts.</a:t>
+            </a:r>
+          </a:p>
+          <a:p>
+            <a:r>
+              <a:rPr lang="en-CA" baseline="0" dirty="0" smtClean="0"/>
+              <a:t>It is much harder to keep a repository clean with more people touching it.</a:t>
+            </a:r>
+          </a:p>
+          <a:p>
+            <a:r>
+              <a:rPr lang="en-CA" baseline="0" dirty="0" smtClean="0"/>
+              <a:t>Branching becomes a nightmare as each one will contain multiple components, with only a small percentage of them actually changing. The purpose of the branch gets lost in the sea of files. Then, the branch itself is now harder to locate out of the big list of branches to inevitably get created.</a:t>
+            </a:r>
+          </a:p>
+          <a:p>
+            <a:endParaRPr lang="en-CA" baseline="0" dirty="0" smtClean="0"/>
+          </a:p>
+          <a:p>
+            <a:r>
+              <a:rPr lang="en-CA" baseline="0" dirty="0" smtClean="0"/>
+              <a:t>A large GIT repository is an </a:t>
+            </a:r>
+            <a:r>
+              <a:rPr lang="en-CA" baseline="0" dirty="0" err="1" smtClean="0"/>
+              <a:t>antipattern</a:t>
+            </a:r>
+            <a:r>
+              <a:rPr lang="en-CA" baseline="0" dirty="0" smtClean="0"/>
+              <a:t>.</a:t>
+            </a:r>
+          </a:p>
+        </p:txBody>
+      </p:sp>
+      <p:sp>
+        <p:nvSpPr>
+          <p:cNvPr id="4" name="Slide Number Placeholder 3"/>
+          <p:cNvSpPr>
+            <a:spLocks noGrp="1"/>
+          </p:cNvSpPr>
+          <p:nvPr>
+            <p:ph type="sldNum" sz="quarter" idx="10"/>
+          </p:nvPr>
+        </p:nvSpPr>
+        <p:spPr/>
+        <p:txBody>
+          <a:bodyPr/>
+          <a:lstStyle/>
+          <a:p>
+            <a:fld id="{CB55E3E3-40A9-4EFD-94DF-114BB2F8C3AE}" type="slidenum">
+              <a:rPr lang="en-CA" smtClean="0"/>
+              <a:t>32</a:t>
+            </a:fld>
+            <a:endParaRPr lang="en-CA"/>
+          </a:p>
+        </p:txBody>
+      </p:sp>
+    </p:spTree>
+    <p:extLst>
+      <p:ext uri="{BB962C8B-B14F-4D97-AF65-F5344CB8AC3E}">
+        <p14:creationId xmlns:p14="http://schemas.microsoft.com/office/powerpoint/2010/main" val="6600554"/>
+      </p:ext>
+    </p:extLst>
+  </p:cSld>
+  <p:clrMapOvr>
+    <a:masterClrMapping/>
+  </p:clrMapOvr>
+</p:notes>
+</file>
+
+<file path=ppt/notesSlides/notesSlide29.xml><?xml version="1.0" encoding="utf-8"?>
+<p:notes xmlns:a="http://schemas.openxmlformats.org/drawingml/2006/main" xmlns:r="http://schemas.openxmlformats.org/officeDocument/2006/relationships" xmlns:p="http://schemas.openxmlformats.org/presentationml/2006/main">
+  <p:cSld>
+    <p:spTree>
+      <p:nvGrpSpPr>
+        <p:cNvPr id="1" name=""/>
+        <p:cNvGrpSpPr/>
+        <p:nvPr/>
+      </p:nvGrpSpPr>
+      <p:grpSpPr>
+        <a:xfrm>
+          <a:off x="0" y="0"/>
+          <a:ext cx="0" cy="0"/>
+          <a:chOff x="0" y="0"/>
+          <a:chExt cx="0" cy="0"/>
+        </a:xfrm>
+      </p:grpSpPr>
+      <p:sp>
+        <p:nvSpPr>
+          <p:cNvPr id="2" name="Slide Image Placeholder 1"/>
+          <p:cNvSpPr>
+            <a:spLocks noGrp="1" noRot="1" noChangeAspect="1"/>
+          </p:cNvSpPr>
+          <p:nvPr>
+            <p:ph type="sldImg"/>
+          </p:nvPr>
+        </p:nvSpPr>
+        <p:spPr/>
+      </p:sp>
+      <p:sp>
+        <p:nvSpPr>
+          <p:cNvPr id="3" name="Notes Placeholder 2"/>
+          <p:cNvSpPr>
+            <a:spLocks noGrp="1"/>
+          </p:cNvSpPr>
+          <p:nvPr>
+            <p:ph type="body" idx="1"/>
+          </p:nvPr>
+        </p:nvSpPr>
+        <p:spPr/>
+        <p:txBody>
+          <a:bodyPr/>
+          <a:lstStyle/>
+          <a:p>
+            <a:r>
+              <a:rPr lang="en-CA" dirty="0" smtClean="0"/>
+              <a:t>Idea is to break down your project into lots of small ones, each in its own repository.</a:t>
+            </a:r>
+            <a:r>
+              <a:rPr lang="en-CA" baseline="0" dirty="0" smtClean="0"/>
+              <a:t> This is encouraged as a good practice: smaller modules are less risky to change, tend to be single-purpose and sport a clearly-defined interface.</a:t>
+            </a:r>
+          </a:p>
+          <a:p>
+            <a:endParaRPr lang="en-CA" baseline="0" dirty="0" smtClean="0"/>
+          </a:p>
+          <a:p>
+            <a:r>
+              <a:rPr lang="en-CA" baseline="0" dirty="0" smtClean="0"/>
+              <a:t>The code within a GIT repositories can define a build dependency on binaries generated by other GIT projects. This is why GIT is so often used with Maven and </a:t>
+            </a:r>
+            <a:r>
+              <a:rPr lang="en-CA" baseline="0" dirty="0" err="1" smtClean="0"/>
+              <a:t>Gradle</a:t>
+            </a:r>
+            <a:r>
+              <a:rPr lang="en-CA" baseline="0" dirty="0" smtClean="0"/>
+              <a:t>!</a:t>
+            </a:r>
+          </a:p>
+          <a:p>
+            <a:endParaRPr lang="en-CA" baseline="0" dirty="0" smtClean="0"/>
+          </a:p>
+          <a:p>
+            <a:r>
+              <a:rPr lang="en-CA" baseline="0" dirty="0" smtClean="0"/>
+              <a:t>Build tools such as Jenkins can defined composite builds, where one build kicks off another, which kicks off a third, until all components of the single application get built one at a time or in parallel.</a:t>
+            </a:r>
+          </a:p>
+        </p:txBody>
+      </p:sp>
+      <p:sp>
+        <p:nvSpPr>
+          <p:cNvPr id="4" name="Slide Number Placeholder 3"/>
+          <p:cNvSpPr>
+            <a:spLocks noGrp="1"/>
+          </p:cNvSpPr>
+          <p:nvPr>
+            <p:ph type="sldNum" sz="quarter" idx="10"/>
+          </p:nvPr>
+        </p:nvSpPr>
+        <p:spPr/>
+        <p:txBody>
+          <a:bodyPr/>
+          <a:lstStyle/>
+          <a:p>
+            <a:fld id="{CB55E3E3-40A9-4EFD-94DF-114BB2F8C3AE}" type="slidenum">
+              <a:rPr lang="en-CA" smtClean="0"/>
+              <a:t>33</a:t>
+            </a:fld>
+            <a:endParaRPr lang="en-CA"/>
+          </a:p>
+        </p:txBody>
+      </p:sp>
+    </p:spTree>
+    <p:extLst>
+      <p:ext uri="{BB962C8B-B14F-4D97-AF65-F5344CB8AC3E}">
+        <p14:creationId xmlns:p14="http://schemas.microsoft.com/office/powerpoint/2010/main" val="1075529859"/>
+      </p:ext>
+    </p:extLst>
+  </p:cSld>
+  <p:clrMapOvr>
+    <a:masterClrMapping/>
+  </p:clrMapOvr>
+</p:notes>
+</file>
+
 <file path=ppt/notesSlides/notesSlide3.xml><?xml version="1.0" encoding="utf-8"?>
 <p:notes xmlns:a="http://schemas.openxmlformats.org/drawingml/2006/main" xmlns:r="http://schemas.openxmlformats.org/officeDocument/2006/relationships" xmlns:p="http://schemas.openxmlformats.org/presentationml/2006/main">
   <p:cSld>
@@ -4042,6 +4578,1008 @@
     <p:extLst>
       <p:ext uri="{BB962C8B-B14F-4D97-AF65-F5344CB8AC3E}">
         <p14:creationId xmlns:p14="http://schemas.microsoft.com/office/powerpoint/2010/main" val="202790416"/>
+      </p:ext>
+    </p:extLst>
+  </p:cSld>
+  <p:clrMapOvr>
+    <a:masterClrMapping/>
+  </p:clrMapOvr>
+</p:notes>
+</file>
+
+<file path=ppt/notesSlides/notesSlide30.xml><?xml version="1.0" encoding="utf-8"?>
+<p:notes xmlns:a="http://schemas.openxmlformats.org/drawingml/2006/main" xmlns:r="http://schemas.openxmlformats.org/officeDocument/2006/relationships" xmlns:p="http://schemas.openxmlformats.org/presentationml/2006/main">
+  <p:cSld>
+    <p:spTree>
+      <p:nvGrpSpPr>
+        <p:cNvPr id="1" name=""/>
+        <p:cNvGrpSpPr/>
+        <p:nvPr/>
+      </p:nvGrpSpPr>
+      <p:grpSpPr>
+        <a:xfrm>
+          <a:off x="0" y="0"/>
+          <a:ext cx="0" cy="0"/>
+          <a:chOff x="0" y="0"/>
+          <a:chExt cx="0" cy="0"/>
+        </a:xfrm>
+      </p:grpSpPr>
+      <p:sp>
+        <p:nvSpPr>
+          <p:cNvPr id="2" name="Slide Image Placeholder 1"/>
+          <p:cNvSpPr>
+            <a:spLocks noGrp="1" noRot="1" noChangeAspect="1"/>
+          </p:cNvSpPr>
+          <p:nvPr>
+            <p:ph type="sldImg"/>
+          </p:nvPr>
+        </p:nvSpPr>
+        <p:spPr/>
+      </p:sp>
+      <p:sp>
+        <p:nvSpPr>
+          <p:cNvPr id="3" name="Notes Placeholder 2"/>
+          <p:cNvSpPr>
+            <a:spLocks noGrp="1"/>
+          </p:cNvSpPr>
+          <p:nvPr>
+            <p:ph type="body" idx="1"/>
+          </p:nvPr>
+        </p:nvSpPr>
+        <p:spPr/>
+        <p:txBody>
+          <a:bodyPr/>
+          <a:lstStyle/>
+          <a:p>
+            <a:r>
+              <a:rPr lang="en-CA" baseline="0" dirty="0" smtClean="0"/>
+              <a:t>Of course, many legacy projects are too far gone for refactoring to be feasible anymore. For this reason GIT is often considered for new development. </a:t>
+            </a:r>
+          </a:p>
+          <a:p>
+            <a:endParaRPr lang="en-CA" baseline="0" dirty="0" smtClean="0"/>
+          </a:p>
+          <a:p>
+            <a:r>
+              <a:rPr lang="en-CA" baseline="0" dirty="0" smtClean="0"/>
+              <a:t>There are other remedies, though.</a:t>
+            </a:r>
+          </a:p>
+          <a:p>
+            <a:endParaRPr lang="en-CA" dirty="0" smtClean="0"/>
+          </a:p>
+          <a:p>
+            <a:r>
+              <a:rPr lang="en-CA" dirty="0" smtClean="0"/>
+              <a:t>What you are about to see next is deprecated. None of it is a good idea, but is sometimes necessary.</a:t>
+            </a:r>
+            <a:endParaRPr lang="en-CA" dirty="0"/>
+          </a:p>
+        </p:txBody>
+      </p:sp>
+      <p:sp>
+        <p:nvSpPr>
+          <p:cNvPr id="4" name="Slide Number Placeholder 3"/>
+          <p:cNvSpPr>
+            <a:spLocks noGrp="1"/>
+          </p:cNvSpPr>
+          <p:nvPr>
+            <p:ph type="sldNum" sz="quarter" idx="10"/>
+          </p:nvPr>
+        </p:nvSpPr>
+        <p:spPr/>
+        <p:txBody>
+          <a:bodyPr/>
+          <a:lstStyle/>
+          <a:p>
+            <a:fld id="{CB55E3E3-40A9-4EFD-94DF-114BB2F8C3AE}" type="slidenum">
+              <a:rPr lang="en-CA" smtClean="0"/>
+              <a:t>34</a:t>
+            </a:fld>
+            <a:endParaRPr lang="en-CA"/>
+          </a:p>
+        </p:txBody>
+      </p:sp>
+    </p:spTree>
+    <p:extLst>
+      <p:ext uri="{BB962C8B-B14F-4D97-AF65-F5344CB8AC3E}">
+        <p14:creationId xmlns:p14="http://schemas.microsoft.com/office/powerpoint/2010/main" val="442740094"/>
+      </p:ext>
+    </p:extLst>
+  </p:cSld>
+  <p:clrMapOvr>
+    <a:masterClrMapping/>
+  </p:clrMapOvr>
+</p:notes>
+</file>
+
+<file path=ppt/notesSlides/notesSlide31.xml><?xml version="1.0" encoding="utf-8"?>
+<p:notes xmlns:a="http://schemas.openxmlformats.org/drawingml/2006/main" xmlns:r="http://schemas.openxmlformats.org/officeDocument/2006/relationships" xmlns:p="http://schemas.openxmlformats.org/presentationml/2006/main">
+  <p:cSld>
+    <p:spTree>
+      <p:nvGrpSpPr>
+        <p:cNvPr id="1" name=""/>
+        <p:cNvGrpSpPr/>
+        <p:nvPr/>
+      </p:nvGrpSpPr>
+      <p:grpSpPr>
+        <a:xfrm>
+          <a:off x="0" y="0"/>
+          <a:ext cx="0" cy="0"/>
+          <a:chOff x="0" y="0"/>
+          <a:chExt cx="0" cy="0"/>
+        </a:xfrm>
+      </p:grpSpPr>
+      <p:sp>
+        <p:nvSpPr>
+          <p:cNvPr id="2" name="Slide Image Placeholder 1"/>
+          <p:cNvSpPr>
+            <a:spLocks noGrp="1" noRot="1" noChangeAspect="1"/>
+          </p:cNvSpPr>
+          <p:nvPr>
+            <p:ph type="sldImg"/>
+          </p:nvPr>
+        </p:nvSpPr>
+        <p:spPr/>
+      </p:sp>
+      <p:sp>
+        <p:nvSpPr>
+          <p:cNvPr id="3" name="Notes Placeholder 2"/>
+          <p:cNvSpPr>
+            <a:spLocks noGrp="1"/>
+          </p:cNvSpPr>
+          <p:nvPr>
+            <p:ph type="body" idx="1"/>
+          </p:nvPr>
+        </p:nvSpPr>
+        <p:spPr/>
+        <p:txBody>
+          <a:bodyPr/>
+          <a:lstStyle/>
+          <a:p>
+            <a:r>
+              <a:rPr lang="en-CA" dirty="0" smtClean="0"/>
+              <a:t>Repository 2 is a subtree for Repository 1. Everything in “</a:t>
+            </a:r>
+            <a:r>
+              <a:rPr lang="en-CA" dirty="0" err="1" smtClean="0"/>
+              <a:t>dir</a:t>
+            </a:r>
+            <a:r>
+              <a:rPr lang="en-CA" dirty="0" smtClean="0"/>
+              <a:t> 1” in Repository 1 is really located in Repository 2. Repository 2 does not</a:t>
+            </a:r>
+            <a:r>
+              <a:rPr lang="en-CA" baseline="0" dirty="0" smtClean="0"/>
+              <a:t> build on its own, but Repository 1 fails to build without it. The only reason the code is split between two repositories is to work around GIT’s limitation. </a:t>
+            </a:r>
+          </a:p>
+          <a:p>
+            <a:pPr marL="0" marR="0" indent="0" algn="l" defTabSz="914400" rtl="0" eaLnBrk="1" fontAlgn="auto" latinLnBrk="0" hangingPunct="1">
+              <a:lnSpc>
+                <a:spcPct val="100000"/>
+              </a:lnSpc>
+              <a:spcBef>
+                <a:spcPts val="0"/>
+              </a:spcBef>
+              <a:spcAft>
+                <a:spcPts val="0"/>
+              </a:spcAft>
+              <a:buClrTx/>
+              <a:buSzTx/>
+              <a:buFontTx/>
+              <a:buNone/>
+              <a:tabLst/>
+              <a:defRPr/>
+            </a:pPr>
+            <a:endParaRPr lang="en-CA" baseline="0" dirty="0" smtClean="0"/>
+          </a:p>
+          <a:p>
+            <a:pPr marL="0" marR="0" indent="0" algn="l" defTabSz="914400" rtl="0" eaLnBrk="1" fontAlgn="auto" latinLnBrk="0" hangingPunct="1">
+              <a:lnSpc>
+                <a:spcPct val="100000"/>
+              </a:lnSpc>
+              <a:spcBef>
+                <a:spcPts val="0"/>
+              </a:spcBef>
+              <a:spcAft>
+                <a:spcPts val="0"/>
+              </a:spcAft>
+              <a:buClrTx/>
+              <a:buSzTx/>
+              <a:buFontTx/>
+              <a:buNone/>
+              <a:tabLst/>
+              <a:defRPr/>
+            </a:pPr>
+            <a:r>
+              <a:rPr lang="en-CA" baseline="0" dirty="0" smtClean="0"/>
+              <a:t>Problem with this is the following:</a:t>
+            </a:r>
+          </a:p>
+          <a:p>
+            <a:endParaRPr lang="en-CA" baseline="0" dirty="0" smtClean="0"/>
+          </a:p>
+          <a:p>
+            <a:pPr marL="171450" indent="-171450">
+              <a:buFont typeface="Arial" charset="0"/>
+              <a:buChar char="•"/>
+            </a:pPr>
+            <a:r>
+              <a:rPr lang="en-CA" baseline="0" dirty="0" smtClean="0"/>
+              <a:t>A subtree is a pointer to another GIT repository at a specific branch. Any changes to Repository 2 are seen by Repository 1 the next time someone remembers to merge them.</a:t>
+            </a:r>
+          </a:p>
+          <a:p>
+            <a:pPr marL="171450" indent="-171450">
+              <a:buFont typeface="Arial" charset="0"/>
+              <a:buChar char="•"/>
+            </a:pPr>
+            <a:r>
+              <a:rPr lang="en-CA" baseline="0" dirty="0" smtClean="0"/>
+              <a:t>Changes are hard to keep track of now as it is not immediately obvious what state of Repository 2 a certain </a:t>
+            </a:r>
+            <a:r>
+              <a:rPr lang="en-CA" baseline="0" dirty="0" err="1" smtClean="0"/>
+              <a:t>changeset</a:t>
+            </a:r>
+            <a:r>
+              <a:rPr lang="en-CA" baseline="0" dirty="0" smtClean="0"/>
+              <a:t> of Repository 1 was coded against.</a:t>
+            </a:r>
+          </a:p>
+          <a:p>
+            <a:pPr marL="171450" indent="-171450">
+              <a:buFont typeface="Arial" charset="0"/>
+              <a:buChar char="•"/>
+            </a:pPr>
+            <a:r>
+              <a:rPr lang="en-CA" baseline="0" dirty="0" smtClean="0"/>
+              <a:t>Branching becomes a major chore: creating a branch in Repository 1 does not do so for Repository 2. The same branch may need to be defined in Repository 2 as well, meaning now someone has to keep track which branch was merged and where, and which one was not. Probability of someone making a mistake merging climbs exponentially.</a:t>
+            </a:r>
+          </a:p>
+          <a:p>
+            <a:endParaRPr lang="en-CA" baseline="0" dirty="0" smtClean="0"/>
+          </a:p>
+          <a:p>
+            <a:pPr marL="0" indent="0">
+              <a:buFont typeface="Arial" panose="020B0604020202020204" pitchFamily="34" charset="0"/>
+              <a:buNone/>
+            </a:pPr>
+            <a:r>
+              <a:rPr lang="en-CA" dirty="0" smtClean="0"/>
+              <a:t>But if you need it, you</a:t>
+            </a:r>
+            <a:r>
+              <a:rPr lang="en-CA" baseline="0" dirty="0" smtClean="0"/>
+              <a:t> have it.</a:t>
+            </a:r>
+          </a:p>
+          <a:p>
+            <a:pPr marL="0" indent="0">
+              <a:buFont typeface="Arial" panose="020B0604020202020204" pitchFamily="34" charset="0"/>
+              <a:buNone/>
+            </a:pPr>
+            <a:endParaRPr lang="en-CA" baseline="0" dirty="0" smtClean="0"/>
+          </a:p>
+          <a:p>
+            <a:pPr marL="0" indent="0">
+              <a:buFont typeface="Arial" panose="020B0604020202020204" pitchFamily="34" charset="0"/>
+              <a:buNone/>
+            </a:pPr>
+            <a:r>
+              <a:rPr lang="en-CA" baseline="0" dirty="0" smtClean="0"/>
+              <a:t>git subtree add --prefix presentation </a:t>
+            </a:r>
+            <a:r>
+              <a:rPr lang="en-CA" baseline="0" dirty="0" err="1" smtClean="0"/>
+              <a:t>git@github.com:kangelov</a:t>
+            </a:r>
+            <a:r>
+              <a:rPr lang="en-CA" baseline="0" dirty="0" smtClean="0"/>
+              <a:t>/</a:t>
+            </a:r>
+            <a:r>
+              <a:rPr lang="en-CA" baseline="0" dirty="0" err="1" smtClean="0"/>
+              <a:t>gitdemo.git</a:t>
+            </a:r>
+            <a:r>
+              <a:rPr lang="en-CA" baseline="0" dirty="0" smtClean="0"/>
+              <a:t> master --</a:t>
+            </a:r>
+            <a:r>
+              <a:rPr lang="en-CA" baseline="0" dirty="0" err="1" smtClean="0"/>
+              <a:t>sqash</a:t>
+            </a:r>
+            <a:endParaRPr lang="en-CA" baseline="0" dirty="0" smtClean="0"/>
+          </a:p>
+          <a:p>
+            <a:pPr marL="0" indent="0">
+              <a:buFont typeface="Arial" panose="020B0604020202020204" pitchFamily="34" charset="0"/>
+              <a:buNone/>
+            </a:pPr>
+            <a:endParaRPr lang="en-CA" baseline="0" dirty="0" smtClean="0"/>
+          </a:p>
+          <a:p>
+            <a:pPr marL="0" indent="0">
+              <a:buFont typeface="Arial" panose="020B0604020202020204" pitchFamily="34" charset="0"/>
+              <a:buNone/>
+            </a:pPr>
+            <a:r>
+              <a:rPr lang="en-CA" baseline="0" dirty="0" smtClean="0"/>
+              <a:t>Now I have my </a:t>
+            </a:r>
+            <a:r>
+              <a:rPr lang="en-CA" baseline="0" dirty="0" err="1" smtClean="0"/>
+              <a:t>powerpoint</a:t>
+            </a:r>
+            <a:r>
+              <a:rPr lang="en-CA" baseline="0" dirty="0" smtClean="0"/>
+              <a:t> presentation defined as a “presentation” directory on my “demo” repository. Every time that repository changes, I have to say:</a:t>
+            </a:r>
+          </a:p>
+          <a:p>
+            <a:pPr marL="0" indent="0">
+              <a:buFont typeface="Arial" panose="020B0604020202020204" pitchFamily="34" charset="0"/>
+              <a:buNone/>
+            </a:pPr>
+            <a:endParaRPr lang="en-CA" baseline="0" dirty="0" smtClean="0"/>
+          </a:p>
+          <a:p>
+            <a:pPr marL="0" indent="0">
+              <a:buFont typeface="Arial" panose="020B0604020202020204" pitchFamily="34" charset="0"/>
+              <a:buNone/>
+            </a:pPr>
+            <a:r>
+              <a:rPr lang="en-CA" baseline="0" dirty="0" smtClean="0"/>
+              <a:t>git subtree pull --prefix presentation </a:t>
+            </a:r>
+            <a:r>
+              <a:rPr lang="en-CA" baseline="0" dirty="0" err="1" smtClean="0"/>
+              <a:t>git@github.com:kangelov</a:t>
+            </a:r>
+            <a:r>
+              <a:rPr lang="en-CA" baseline="0" dirty="0" smtClean="0"/>
+              <a:t>/</a:t>
+            </a:r>
+            <a:r>
+              <a:rPr lang="en-CA" baseline="0" dirty="0" err="1" smtClean="0"/>
+              <a:t>gitdemo.git</a:t>
+            </a:r>
+            <a:r>
+              <a:rPr lang="en-CA" baseline="0" dirty="0" smtClean="0"/>
+              <a:t> master --squash</a:t>
+            </a:r>
+          </a:p>
+          <a:p>
+            <a:pPr marL="0" indent="0">
+              <a:buFont typeface="Arial" panose="020B0604020202020204" pitchFamily="34" charset="0"/>
+              <a:buNone/>
+            </a:pPr>
+            <a:endParaRPr lang="en-CA" baseline="0" dirty="0" smtClean="0"/>
+          </a:p>
+          <a:p>
+            <a:pPr marL="0" indent="0">
+              <a:buFont typeface="Arial" panose="020B0604020202020204" pitchFamily="34" charset="0"/>
+              <a:buNone/>
+            </a:pPr>
+            <a:r>
+              <a:rPr lang="en-CA" baseline="0" dirty="0" smtClean="0"/>
+              <a:t>Which merges the subtree commits into Repository 1, collapsing them into a single commit.</a:t>
+            </a:r>
+          </a:p>
+          <a:p>
+            <a:pPr marL="0" indent="0">
+              <a:buFont typeface="Arial" panose="020B0604020202020204" pitchFamily="34" charset="0"/>
+              <a:buNone/>
+            </a:pPr>
+            <a:endParaRPr lang="en-CA" baseline="0" dirty="0" smtClean="0"/>
+          </a:p>
+          <a:p>
+            <a:pPr marL="0" indent="0">
+              <a:buFont typeface="Arial" panose="020B0604020202020204" pitchFamily="34" charset="0"/>
+              <a:buNone/>
+            </a:pPr>
+            <a:r>
+              <a:rPr lang="en-CA" baseline="0" dirty="0" smtClean="0"/>
+              <a:t>I don’t know very much about this, but the Internet is littered with horror stories from people shooting themselves in the foot with this and asking for advice.</a:t>
+            </a:r>
+          </a:p>
+        </p:txBody>
+      </p:sp>
+      <p:sp>
+        <p:nvSpPr>
+          <p:cNvPr id="4" name="Slide Number Placeholder 3"/>
+          <p:cNvSpPr>
+            <a:spLocks noGrp="1"/>
+          </p:cNvSpPr>
+          <p:nvPr>
+            <p:ph type="sldNum" sz="quarter" idx="10"/>
+          </p:nvPr>
+        </p:nvSpPr>
+        <p:spPr/>
+        <p:txBody>
+          <a:bodyPr/>
+          <a:lstStyle/>
+          <a:p>
+            <a:fld id="{CB55E3E3-40A9-4EFD-94DF-114BB2F8C3AE}" type="slidenum">
+              <a:rPr lang="en-CA" smtClean="0"/>
+              <a:t>35</a:t>
+            </a:fld>
+            <a:endParaRPr lang="en-CA"/>
+          </a:p>
+        </p:txBody>
+      </p:sp>
+    </p:spTree>
+    <p:extLst>
+      <p:ext uri="{BB962C8B-B14F-4D97-AF65-F5344CB8AC3E}">
+        <p14:creationId xmlns:p14="http://schemas.microsoft.com/office/powerpoint/2010/main" val="3117347024"/>
+      </p:ext>
+    </p:extLst>
+  </p:cSld>
+  <p:clrMapOvr>
+    <a:masterClrMapping/>
+  </p:clrMapOvr>
+</p:notes>
+</file>
+
+<file path=ppt/notesSlides/notesSlide32.xml><?xml version="1.0" encoding="utf-8"?>
+<p:notes xmlns:a="http://schemas.openxmlformats.org/drawingml/2006/main" xmlns:r="http://schemas.openxmlformats.org/officeDocument/2006/relationships" xmlns:p="http://schemas.openxmlformats.org/presentationml/2006/main">
+  <p:cSld>
+    <p:spTree>
+      <p:nvGrpSpPr>
+        <p:cNvPr id="1" name=""/>
+        <p:cNvGrpSpPr/>
+        <p:nvPr/>
+      </p:nvGrpSpPr>
+      <p:grpSpPr>
+        <a:xfrm>
+          <a:off x="0" y="0"/>
+          <a:ext cx="0" cy="0"/>
+          <a:chOff x="0" y="0"/>
+          <a:chExt cx="0" cy="0"/>
+        </a:xfrm>
+      </p:grpSpPr>
+      <p:sp>
+        <p:nvSpPr>
+          <p:cNvPr id="2" name="Slide Image Placeholder 1"/>
+          <p:cNvSpPr>
+            <a:spLocks noGrp="1" noRot="1" noChangeAspect="1"/>
+          </p:cNvSpPr>
+          <p:nvPr>
+            <p:ph type="sldImg"/>
+          </p:nvPr>
+        </p:nvSpPr>
+        <p:spPr/>
+      </p:sp>
+      <p:sp>
+        <p:nvSpPr>
+          <p:cNvPr id="3" name="Notes Placeholder 2"/>
+          <p:cNvSpPr>
+            <a:spLocks noGrp="1"/>
+          </p:cNvSpPr>
+          <p:nvPr>
+            <p:ph type="body" idx="1"/>
+          </p:nvPr>
+        </p:nvSpPr>
+        <p:spPr/>
+        <p:txBody>
+          <a:bodyPr/>
+          <a:lstStyle/>
+          <a:p>
+            <a:r>
+              <a:rPr lang="en-CA" dirty="0" smtClean="0"/>
+              <a:t>Submodule is very much like a subtree, except that now the reference</a:t>
+            </a:r>
+            <a:r>
+              <a:rPr lang="en-CA" baseline="0" dirty="0" smtClean="0"/>
+              <a:t> to the other repository is no longer by branch, but by a </a:t>
+            </a:r>
+            <a:r>
+              <a:rPr lang="en-CA" baseline="0" dirty="0" err="1" smtClean="0"/>
+              <a:t>changeset</a:t>
+            </a:r>
+            <a:r>
+              <a:rPr lang="en-CA" baseline="0" dirty="0" smtClean="0"/>
+              <a:t>. In a nutshell, both repositories are free to change as they please, however Repository 1 holds a pointer to a </a:t>
+            </a:r>
+            <a:r>
+              <a:rPr lang="en-CA" baseline="0" dirty="0" err="1" smtClean="0"/>
+              <a:t>changeset</a:t>
+            </a:r>
+            <a:r>
+              <a:rPr lang="en-CA" baseline="0" dirty="0" smtClean="0"/>
+              <a:t> in Repository 2, which needs to be maintained. Doesn’t sound like much?</a:t>
+            </a:r>
+          </a:p>
+          <a:p>
+            <a:endParaRPr lang="en-CA" baseline="0" dirty="0" smtClean="0"/>
+          </a:p>
+          <a:p>
+            <a:r>
+              <a:rPr lang="en-CA" baseline="0" dirty="0" smtClean="0"/>
+              <a:t>Having a submodule is like having a repository within a repository. Maintaining one repository involves managing a local repository and pushing to a remote repository. Maintaining one repository with a submodule involves managing 4 repositories:</a:t>
+            </a:r>
+          </a:p>
+          <a:p>
+            <a:pPr marL="171450" indent="-171450">
+              <a:buFont typeface="Arial" charset="0"/>
+              <a:buChar char="•"/>
+            </a:pPr>
+            <a:r>
+              <a:rPr lang="en-CA" baseline="0" dirty="0" smtClean="0"/>
+              <a:t>Remote</a:t>
+            </a:r>
+          </a:p>
+          <a:p>
+            <a:pPr marL="171450" indent="-171450">
+              <a:buFont typeface="Arial" charset="0"/>
+              <a:buChar char="•"/>
+            </a:pPr>
+            <a:r>
+              <a:rPr lang="en-CA" baseline="0" dirty="0" smtClean="0"/>
+              <a:t>Remote submodule</a:t>
+            </a:r>
+          </a:p>
+          <a:p>
+            <a:pPr marL="171450" indent="-171450">
+              <a:buFont typeface="Arial" charset="0"/>
+              <a:buChar char="•"/>
+            </a:pPr>
+            <a:r>
+              <a:rPr lang="en-CA" baseline="0" dirty="0" smtClean="0"/>
+              <a:t>Local</a:t>
+            </a:r>
+          </a:p>
+          <a:p>
+            <a:pPr marL="171450" indent="-171450">
+              <a:buFont typeface="Arial" charset="0"/>
+              <a:buChar char="•"/>
+            </a:pPr>
+            <a:r>
+              <a:rPr lang="en-CA" baseline="0" dirty="0" smtClean="0"/>
+              <a:t>Local submodule</a:t>
+            </a:r>
+          </a:p>
+          <a:p>
+            <a:pPr marL="171450" indent="-171450">
+              <a:buFont typeface="Arial" charset="0"/>
+              <a:buChar char="•"/>
+            </a:pPr>
+            <a:endParaRPr lang="en-CA" baseline="0" dirty="0" smtClean="0"/>
+          </a:p>
+          <a:p>
+            <a:pPr marL="0" indent="0">
+              <a:buFont typeface="Arial" charset="0"/>
+              <a:buNone/>
+            </a:pPr>
+            <a:r>
+              <a:rPr lang="en-CA" baseline="0" dirty="0" smtClean="0"/>
+              <a:t>Confused yet?</a:t>
+            </a:r>
+          </a:p>
+          <a:p>
+            <a:pPr marL="0" indent="0">
+              <a:buFont typeface="Arial" charset="0"/>
+              <a:buNone/>
+            </a:pPr>
+            <a:endParaRPr lang="en-CA" baseline="0" dirty="0" smtClean="0"/>
+          </a:p>
+          <a:p>
+            <a:pPr marL="0" indent="0">
+              <a:buFont typeface="Arial" charset="0"/>
+              <a:buNone/>
+            </a:pPr>
+            <a:r>
+              <a:rPr lang="en-CA" baseline="0" dirty="0" smtClean="0"/>
+              <a:t>Consider this: I make a change to Repository 2, commit and push. When I run the build against Repository 1, will it pick up my change?</a:t>
+            </a:r>
+          </a:p>
+          <a:p>
+            <a:pPr marL="0" indent="0">
+              <a:buFont typeface="Arial" charset="0"/>
+              <a:buNone/>
+            </a:pPr>
+            <a:endParaRPr lang="en-CA" baseline="0" dirty="0" smtClean="0"/>
+          </a:p>
+          <a:p>
+            <a:pPr marL="0" indent="0">
+              <a:buFont typeface="Arial" charset="0"/>
+              <a:buNone/>
+            </a:pPr>
+            <a:r>
+              <a:rPr lang="en-CA" baseline="0" dirty="0" smtClean="0"/>
+              <a:t>No, it will not.</a:t>
+            </a:r>
+          </a:p>
+          <a:p>
+            <a:pPr marL="0" indent="0">
+              <a:buFont typeface="Arial" charset="0"/>
+              <a:buNone/>
+            </a:pPr>
+            <a:endParaRPr lang="en-CA" baseline="0" dirty="0" smtClean="0"/>
+          </a:p>
+          <a:p>
+            <a:pPr marL="0" indent="0">
+              <a:buFont typeface="Arial" charset="0"/>
+              <a:buNone/>
+            </a:pPr>
+            <a:r>
+              <a:rPr lang="en-CA" baseline="0" dirty="0" smtClean="0"/>
+              <a:t>Modifying a submodule changes that repository, but a submodule is a reference to a CHANGESET. Adding another one thus changes the “</a:t>
+            </a:r>
+            <a:r>
+              <a:rPr lang="en-CA" baseline="0" dirty="0" err="1" smtClean="0"/>
+              <a:t>dir</a:t>
+            </a:r>
+            <a:r>
+              <a:rPr lang="en-CA" baseline="0" dirty="0" smtClean="0"/>
+              <a:t> 1” reference in Repository 1, so I have to remember to add and commit that one as well in order for my central build to pick up my change to Repository 2.</a:t>
+            </a:r>
+          </a:p>
+          <a:p>
+            <a:pPr marL="0" indent="0">
+              <a:buFont typeface="Arial" charset="0"/>
+              <a:buNone/>
+            </a:pPr>
+            <a:endParaRPr lang="en-CA" baseline="0" dirty="0" smtClean="0"/>
+          </a:p>
+          <a:p>
+            <a:pPr marL="0" indent="0">
+              <a:buFont typeface="Arial" charset="0"/>
+              <a:buNone/>
+            </a:pPr>
+            <a:r>
+              <a:rPr lang="en-CA" baseline="0" dirty="0" smtClean="0"/>
+              <a:t>In general, making a change to the submodule involves the following:</a:t>
+            </a:r>
+          </a:p>
+          <a:p>
+            <a:pPr marL="0" indent="0">
+              <a:buFont typeface="Arial" charset="0"/>
+              <a:buNone/>
+            </a:pPr>
+            <a:endParaRPr lang="en-CA" baseline="0" dirty="0" smtClean="0"/>
+          </a:p>
+          <a:p>
+            <a:pPr marL="228600" indent="-228600">
+              <a:buFont typeface="Arial" charset="0"/>
+              <a:buAutoNum type="arabicParenR"/>
+            </a:pPr>
+            <a:r>
+              <a:rPr lang="en-CA" baseline="0" dirty="0" smtClean="0"/>
+              <a:t>Update the submodule to the latest </a:t>
+            </a:r>
+            <a:r>
+              <a:rPr lang="en-CA" baseline="0" dirty="0" err="1" smtClean="0"/>
+              <a:t>changeset</a:t>
+            </a:r>
+            <a:r>
+              <a:rPr lang="en-CA" baseline="0" dirty="0" smtClean="0"/>
+              <a:t> (or else create a branch there at the commit I am at so that I can add another </a:t>
+            </a:r>
+            <a:r>
+              <a:rPr lang="en-CA" baseline="0" dirty="0" err="1" smtClean="0"/>
+              <a:t>changeset</a:t>
+            </a:r>
+            <a:r>
+              <a:rPr lang="en-CA" baseline="0" dirty="0" smtClean="0"/>
+              <a:t> directly there)</a:t>
+            </a:r>
+          </a:p>
+          <a:p>
+            <a:pPr marL="228600" indent="-228600">
+              <a:buFont typeface="Arial" charset="0"/>
+              <a:buAutoNum type="arabicParenR"/>
+            </a:pPr>
+            <a:r>
+              <a:rPr lang="en-CA" baseline="0" dirty="0" smtClean="0"/>
+              <a:t>Make the change</a:t>
+            </a:r>
+          </a:p>
+          <a:p>
+            <a:pPr marL="228600" indent="-228600">
+              <a:buFont typeface="Arial" charset="0"/>
+              <a:buAutoNum type="arabicParenR"/>
+            </a:pPr>
+            <a:r>
+              <a:rPr lang="en-CA" baseline="0" dirty="0" smtClean="0"/>
+              <a:t>Add and commit the change</a:t>
+            </a:r>
+          </a:p>
+          <a:p>
+            <a:pPr marL="228600" indent="-228600">
+              <a:buFont typeface="Arial" charset="0"/>
+              <a:buAutoNum type="arabicParenR"/>
+            </a:pPr>
+            <a:r>
+              <a:rPr lang="en-CA" baseline="0" dirty="0" smtClean="0"/>
+              <a:t>Push the submodule</a:t>
+            </a:r>
+          </a:p>
+          <a:p>
+            <a:pPr marL="228600" indent="-228600">
+              <a:buFont typeface="Arial" charset="0"/>
+              <a:buAutoNum type="arabicParenR"/>
+            </a:pPr>
+            <a:r>
+              <a:rPr lang="en-CA" baseline="0" dirty="0" smtClean="0"/>
+              <a:t>Go back to Repository 1</a:t>
+            </a:r>
+          </a:p>
+          <a:p>
+            <a:pPr marL="228600" indent="-228600">
+              <a:buFont typeface="Arial" charset="0"/>
+              <a:buAutoNum type="arabicParenR"/>
+            </a:pPr>
+            <a:r>
+              <a:rPr lang="en-CA" baseline="0" dirty="0" smtClean="0"/>
+              <a:t>Add and commit “</a:t>
+            </a:r>
+            <a:r>
+              <a:rPr lang="en-CA" baseline="0" dirty="0" err="1" smtClean="0"/>
+              <a:t>dir</a:t>
+            </a:r>
+            <a:r>
+              <a:rPr lang="en-CA" baseline="0" dirty="0" smtClean="0"/>
+              <a:t> 1”</a:t>
+            </a:r>
+          </a:p>
+          <a:p>
+            <a:pPr marL="228600" indent="-228600">
+              <a:buFont typeface="Arial" charset="0"/>
+              <a:buAutoNum type="arabicParenR"/>
+            </a:pPr>
+            <a:r>
+              <a:rPr lang="en-CA" dirty="0" smtClean="0"/>
+              <a:t>Push Repository</a:t>
+            </a:r>
+            <a:r>
+              <a:rPr lang="en-CA" baseline="0" dirty="0" smtClean="0"/>
+              <a:t> 1.</a:t>
+            </a:r>
+          </a:p>
+          <a:p>
+            <a:pPr marL="228600" indent="-228600">
+              <a:buFont typeface="Arial" charset="0"/>
+              <a:buAutoNum type="arabicParenR"/>
+            </a:pPr>
+            <a:endParaRPr lang="en-CA" baseline="0" dirty="0" smtClean="0"/>
+          </a:p>
+          <a:p>
+            <a:pPr marL="0" indent="0">
+              <a:buFont typeface="Arial" charset="0"/>
+              <a:buNone/>
+            </a:pPr>
+            <a:r>
+              <a:rPr lang="en-CA" baseline="0" dirty="0" smtClean="0"/>
+              <a:t>And if you forget any of that, you are up for a nasty surprise. AND THAT’S JUST ONE SUBMODULE! A second submodule increases the number of repositories you have to manage to 6. If it happened to be a sub-submodule, the number is 8. This solution does not scale.</a:t>
+            </a:r>
+          </a:p>
+          <a:p>
+            <a:pPr marL="0" indent="0">
+              <a:buFont typeface="Arial" charset="0"/>
+              <a:buNone/>
+            </a:pPr>
+            <a:endParaRPr lang="en-CA" baseline="0" dirty="0" smtClean="0"/>
+          </a:p>
+          <a:p>
+            <a:pPr marL="0" indent="0">
+              <a:buFont typeface="Arial" charset="0"/>
+              <a:buNone/>
+            </a:pPr>
+            <a:r>
+              <a:rPr lang="en-CA" baseline="0" dirty="0" smtClean="0"/>
+              <a:t>git submodule add -b master </a:t>
+            </a:r>
+            <a:r>
+              <a:rPr lang="en-CA" baseline="0" dirty="0" err="1" smtClean="0"/>
+              <a:t>git@github.com:kangelov</a:t>
+            </a:r>
+            <a:r>
+              <a:rPr lang="en-CA" baseline="0" dirty="0" smtClean="0"/>
+              <a:t>/</a:t>
+            </a:r>
+            <a:r>
+              <a:rPr lang="en-CA" baseline="0" dirty="0" err="1" smtClean="0"/>
+              <a:t>gitdemo.git</a:t>
+            </a:r>
+            <a:endParaRPr lang="en-CA" baseline="0" dirty="0" smtClean="0"/>
+          </a:p>
+          <a:p>
+            <a:pPr marL="0" indent="0">
+              <a:buFont typeface="Arial" charset="0"/>
+              <a:buNone/>
+            </a:pPr>
+            <a:endParaRPr lang="en-CA" baseline="0" dirty="0" smtClean="0"/>
+          </a:p>
+          <a:p>
+            <a:pPr marL="0" indent="0">
+              <a:buFont typeface="Arial" charset="0"/>
+              <a:buNone/>
+            </a:pPr>
+            <a:r>
+              <a:rPr lang="en-CA" baseline="0" dirty="0" smtClean="0"/>
+              <a:t>I am putting the tip of master as a submodule called “</a:t>
+            </a:r>
+            <a:r>
+              <a:rPr lang="en-CA" baseline="0" dirty="0" err="1" smtClean="0"/>
+              <a:t>gitdemo</a:t>
+            </a:r>
+            <a:r>
+              <a:rPr lang="en-CA" baseline="0" dirty="0" smtClean="0"/>
+              <a:t>” under my repository.</a:t>
+            </a:r>
+          </a:p>
+          <a:p>
+            <a:pPr marL="0" indent="0">
+              <a:buFont typeface="Arial" charset="0"/>
+              <a:buNone/>
+            </a:pPr>
+            <a:endParaRPr lang="en-CA" baseline="0" dirty="0" smtClean="0"/>
+          </a:p>
+          <a:p>
+            <a:pPr marL="0" indent="0">
+              <a:buFont typeface="Arial" charset="0"/>
+              <a:buNone/>
+            </a:pPr>
+            <a:r>
+              <a:rPr lang="en-CA" baseline="0" dirty="0" smtClean="0"/>
+              <a:t>I have personal experience with this one. When I first started looking at GIT for the </a:t>
+            </a:r>
+            <a:r>
+              <a:rPr lang="en-CA" baseline="0" dirty="0" err="1" smtClean="0"/>
+              <a:t>SelfServe</a:t>
+            </a:r>
+            <a:r>
+              <a:rPr lang="en-CA" baseline="0" dirty="0" smtClean="0"/>
+              <a:t> team, I introduced Fawzy to it and this become an integral part of our code sharing strategy between web services. It worked, however my team never managed to figure the submodule out how to maintain it and merge it. In retrospect that submodule was a dreadful idea. I will be happy to show you how I solved the same problem for </a:t>
+            </a:r>
+            <a:r>
+              <a:rPr lang="en-CA" baseline="0" dirty="0" err="1" smtClean="0"/>
+              <a:t>ClientAPI</a:t>
+            </a:r>
+            <a:r>
+              <a:rPr lang="en-CA" baseline="0" dirty="0" smtClean="0"/>
+              <a:t>.</a:t>
+            </a:r>
+          </a:p>
+          <a:p>
+            <a:pPr marL="0" indent="0">
+              <a:buFont typeface="Arial" charset="0"/>
+              <a:buNone/>
+            </a:pPr>
+            <a:endParaRPr lang="en-CA" baseline="0" dirty="0" smtClean="0"/>
+          </a:p>
+        </p:txBody>
+      </p:sp>
+      <p:sp>
+        <p:nvSpPr>
+          <p:cNvPr id="4" name="Slide Number Placeholder 3"/>
+          <p:cNvSpPr>
+            <a:spLocks noGrp="1"/>
+          </p:cNvSpPr>
+          <p:nvPr>
+            <p:ph type="sldNum" sz="quarter" idx="10"/>
+          </p:nvPr>
+        </p:nvSpPr>
+        <p:spPr/>
+        <p:txBody>
+          <a:bodyPr/>
+          <a:lstStyle/>
+          <a:p>
+            <a:fld id="{CB55E3E3-40A9-4EFD-94DF-114BB2F8C3AE}" type="slidenum">
+              <a:rPr lang="en-CA" smtClean="0"/>
+              <a:t>36</a:t>
+            </a:fld>
+            <a:endParaRPr lang="en-CA"/>
+          </a:p>
+        </p:txBody>
+      </p:sp>
+    </p:spTree>
+    <p:extLst>
+      <p:ext uri="{BB962C8B-B14F-4D97-AF65-F5344CB8AC3E}">
+        <p14:creationId xmlns:p14="http://schemas.microsoft.com/office/powerpoint/2010/main" val="3150243427"/>
+      </p:ext>
+    </p:extLst>
+  </p:cSld>
+  <p:clrMapOvr>
+    <a:masterClrMapping/>
+  </p:clrMapOvr>
+</p:notes>
+</file>
+
+<file path=ppt/notesSlides/notesSlide33.xml><?xml version="1.0" encoding="utf-8"?>
+<p:notes xmlns:a="http://schemas.openxmlformats.org/drawingml/2006/main" xmlns:r="http://schemas.openxmlformats.org/officeDocument/2006/relationships" xmlns:p="http://schemas.openxmlformats.org/presentationml/2006/main">
+  <p:cSld>
+    <p:spTree>
+      <p:nvGrpSpPr>
+        <p:cNvPr id="1" name=""/>
+        <p:cNvGrpSpPr/>
+        <p:nvPr/>
+      </p:nvGrpSpPr>
+      <p:grpSpPr>
+        <a:xfrm>
+          <a:off x="0" y="0"/>
+          <a:ext cx="0" cy="0"/>
+          <a:chOff x="0" y="0"/>
+          <a:chExt cx="0" cy="0"/>
+        </a:xfrm>
+      </p:grpSpPr>
+      <p:sp>
+        <p:nvSpPr>
+          <p:cNvPr id="2" name="Slide Image Placeholder 1"/>
+          <p:cNvSpPr>
+            <a:spLocks noGrp="1" noRot="1" noChangeAspect="1"/>
+          </p:cNvSpPr>
+          <p:nvPr>
+            <p:ph type="sldImg"/>
+          </p:nvPr>
+        </p:nvSpPr>
+        <p:spPr/>
+      </p:sp>
+      <p:sp>
+        <p:nvSpPr>
+          <p:cNvPr id="3" name="Notes Placeholder 2"/>
+          <p:cNvSpPr>
+            <a:spLocks noGrp="1"/>
+          </p:cNvSpPr>
+          <p:nvPr>
+            <p:ph type="body" idx="1"/>
+          </p:nvPr>
+        </p:nvSpPr>
+        <p:spPr/>
+        <p:txBody>
+          <a:bodyPr/>
+          <a:lstStyle/>
+          <a:p>
+            <a:r>
+              <a:rPr lang="en-CA" dirty="0" smtClean="0"/>
+              <a:t>I</a:t>
+            </a:r>
+            <a:r>
+              <a:rPr lang="en-CA" baseline="0" dirty="0" smtClean="0"/>
+              <a:t> am going to show you how I managed to get GIT to work with a native TFS repository. This is how I work every day. This has been tested and is working rather well even in some rather extreme situations.</a:t>
+            </a:r>
+          </a:p>
+          <a:p>
+            <a:endParaRPr lang="en-CA" baseline="0" dirty="0" smtClean="0"/>
+          </a:p>
+          <a:p>
+            <a:r>
+              <a:rPr lang="en-CA" baseline="0" dirty="0" smtClean="0"/>
+              <a:t>Credits for discovering this tool goes to Fawzy, though he denies any knowledge of it.</a:t>
+            </a:r>
+          </a:p>
+        </p:txBody>
+      </p:sp>
+      <p:sp>
+        <p:nvSpPr>
+          <p:cNvPr id="4" name="Slide Number Placeholder 3"/>
+          <p:cNvSpPr>
+            <a:spLocks noGrp="1"/>
+          </p:cNvSpPr>
+          <p:nvPr>
+            <p:ph type="sldNum" sz="quarter" idx="10"/>
+          </p:nvPr>
+        </p:nvSpPr>
+        <p:spPr/>
+        <p:txBody>
+          <a:bodyPr/>
+          <a:lstStyle/>
+          <a:p>
+            <a:fld id="{CB55E3E3-40A9-4EFD-94DF-114BB2F8C3AE}" type="slidenum">
+              <a:rPr lang="en-CA" smtClean="0"/>
+              <a:t>37</a:t>
+            </a:fld>
+            <a:endParaRPr lang="en-CA"/>
+          </a:p>
+        </p:txBody>
+      </p:sp>
+    </p:spTree>
+    <p:extLst>
+      <p:ext uri="{BB962C8B-B14F-4D97-AF65-F5344CB8AC3E}">
+        <p14:creationId xmlns:p14="http://schemas.microsoft.com/office/powerpoint/2010/main" val="260239133"/>
       </p:ext>
     </p:extLst>
   </p:cSld>
@@ -8196,7 +9734,6 @@
               <a:rPr lang="en-CA" dirty="0"/>
               <a:t>STRUCTURE OF A GIT REPOSITORY</a:t>
             </a:r>
-            <a:endParaRPr lang="en-CA" dirty="0"/>
           </a:p>
         </p:txBody>
       </p:sp>
@@ -8341,7 +9878,6 @@
               <a:rPr lang="en-CA" dirty="0"/>
               <a:t>STRUCTURE OF A GIT REPOSITORY</a:t>
             </a:r>
-            <a:endParaRPr lang="en-CA" dirty="0"/>
           </a:p>
         </p:txBody>
       </p:sp>
@@ -10162,11 +11698,7 @@
           <a:p>
             <a:r>
               <a:rPr lang="en-CA" dirty="0" smtClean="0"/>
-              <a:t>What I am going to </a:t>
-            </a:r>
-            <a:r>
-              <a:rPr lang="en-CA" dirty="0" smtClean="0"/>
-              <a:t>cover here</a:t>
+              <a:t>What I am going to cover here</a:t>
             </a:r>
             <a:endParaRPr lang="en-CA" dirty="0"/>
           </a:p>
@@ -10304,11 +11836,7 @@
             <a:pPr lvl="1"/>
             <a:r>
               <a:rPr lang="en-CA" sz="1600" dirty="0" smtClean="0"/>
-              <a:t>Merging a </a:t>
-            </a:r>
-            <a:r>
-              <a:rPr lang="en-CA" sz="1600" dirty="0" smtClean="0"/>
-              <a:t>branch</a:t>
+              <a:t>Merging a branch</a:t>
             </a:r>
           </a:p>
           <a:p>
@@ -10317,7 +11845,6 @@
               <a:rPr lang="en-CA" sz="1600" dirty="0" smtClean="0"/>
               <a:t>Deleting a branch</a:t>
             </a:r>
-            <a:endParaRPr lang="en-CA" sz="1600" dirty="0" smtClean="0"/>
           </a:p>
           <a:p>
             <a:pPr lvl="1"/>
@@ -10335,35 +11862,79 @@
           </a:p>
           <a:p>
             <a:r>
+              <a:rPr lang="en-CA" sz="1600" b="1" dirty="0"/>
+              <a:t>Any other topic you </a:t>
+            </a:r>
+            <a:r>
+              <a:rPr lang="en-CA" sz="1600" b="1" dirty="0" smtClean="0"/>
+              <a:t>wish me to discuss?</a:t>
+            </a:r>
+            <a:endParaRPr lang="en-CA" sz="2000" b="1" dirty="0"/>
+          </a:p>
+          <a:p>
+            <a:pPr marL="0" indent="0">
+              <a:buNone/>
+            </a:pPr>
+            <a:endParaRPr lang="en-CA" sz="1600" dirty="0"/>
+          </a:p>
+          <a:p>
+            <a:pPr marL="0" indent="0">
+              <a:buNone/>
+            </a:pPr>
+            <a:r>
               <a:rPr lang="en-CA" sz="1600" dirty="0" smtClean="0"/>
-              <a:t>How to manage a large application with GIT</a:t>
+              <a:t>OPTIONAL SECTIONS:</a:t>
+            </a:r>
+            <a:endParaRPr lang="en-CA" sz="1600" dirty="0"/>
+          </a:p>
+          <a:p>
+            <a:endParaRPr lang="en-CA" sz="1600" dirty="0" smtClean="0"/>
+          </a:p>
+          <a:p>
+            <a:r>
+              <a:rPr lang="en-CA" sz="1600" dirty="0" smtClean="0"/>
+              <a:t>How </a:t>
+            </a:r>
+            <a:r>
+              <a:rPr lang="en-CA" sz="1600" dirty="0" smtClean="0"/>
+              <a:t>to manage a large application with </a:t>
+            </a:r>
+            <a:r>
+              <a:rPr lang="en-CA" sz="1600" dirty="0" smtClean="0"/>
+              <a:t>GIT</a:t>
             </a:r>
           </a:p>
           <a:p>
             <a:pPr lvl="1"/>
             <a:r>
               <a:rPr lang="en-CA" sz="1600" dirty="0" smtClean="0"/>
-              <a:t>Subtree</a:t>
+              <a:t>Git and large code bases</a:t>
             </a:r>
           </a:p>
           <a:p>
             <a:pPr lvl="1"/>
             <a:r>
               <a:rPr lang="en-CA" sz="1600" dirty="0" smtClean="0"/>
-              <a:t>Submodule</a:t>
-            </a:r>
-          </a:p>
-          <a:p>
+              <a:t>When all else fails: Subtree</a:t>
+            </a:r>
+            <a:endParaRPr lang="en-CA" sz="1600" dirty="0" smtClean="0"/>
+          </a:p>
+          <a:p>
+            <a:pPr lvl="1"/>
             <a:r>
               <a:rPr lang="en-CA" sz="1600" dirty="0" smtClean="0"/>
-              <a:t>Any other topic you may be interested in?</a:t>
-            </a:r>
-            <a:endParaRPr lang="en-CA" sz="2000" dirty="0" smtClean="0"/>
+              <a:t>When all else fails: Submodule</a:t>
+            </a:r>
+            <a:endParaRPr lang="en-CA" sz="1600" dirty="0" smtClean="0"/>
           </a:p>
           <a:p>
             <a:r>
               <a:rPr lang="en-CA" sz="1600" dirty="0" smtClean="0"/>
-              <a:t>GIT and TFS</a:t>
+              <a:t>GIT </a:t>
+            </a:r>
+            <a:r>
+              <a:rPr lang="en-CA" sz="1600" dirty="0" smtClean="0"/>
+              <a:t>and TFS</a:t>
             </a:r>
           </a:p>
           <a:p>
@@ -14037,11 +15608,7 @@
             </a:r>
             <a:r>
               <a:rPr lang="en-CA" dirty="0" smtClean="0"/>
-              <a:t>(s) from another branch into yours, without merging the rest of the branch</a:t>
-            </a:r>
-            <a:r>
-              <a:rPr lang="en-CA" dirty="0" smtClean="0"/>
-              <a:t>. The </a:t>
+              <a:t>(s) from another branch into yours, without merging the rest of the branch. The </a:t>
             </a:r>
             <a:r>
               <a:rPr lang="en-CA" dirty="0" err="1" smtClean="0"/>
@@ -14334,6 +15901,2714 @@
 </p:sld>
 </file>
 
+<file path=ppt/slides/slide30.xml><?xml version="1.0" encoding="utf-8"?>
+<p:sld xmlns:a="http://schemas.openxmlformats.org/drawingml/2006/main" xmlns:r="http://schemas.openxmlformats.org/officeDocument/2006/relationships" xmlns:p="http://schemas.openxmlformats.org/presentationml/2006/main">
+  <p:cSld>
+    <p:spTree>
+      <p:nvGrpSpPr>
+        <p:cNvPr id="1" name=""/>
+        <p:cNvGrpSpPr/>
+        <p:nvPr/>
+      </p:nvGrpSpPr>
+      <p:grpSpPr>
+        <a:xfrm>
+          <a:off x="0" y="0"/>
+          <a:ext cx="0" cy="0"/>
+          <a:chOff x="0" y="0"/>
+          <a:chExt cx="0" cy="0"/>
+        </a:xfrm>
+      </p:grpSpPr>
+      <p:sp>
+        <p:nvSpPr>
+          <p:cNvPr id="2" name="Title 1"/>
+          <p:cNvSpPr>
+            <a:spLocks noGrp="1"/>
+          </p:cNvSpPr>
+          <p:nvPr>
+            <p:ph type="title"/>
+          </p:nvPr>
+        </p:nvSpPr>
+        <p:spPr/>
+        <p:txBody>
+          <a:bodyPr/>
+          <a:lstStyle/>
+          <a:p>
+            <a:r>
+              <a:rPr lang="en-CA" dirty="0" smtClean="0"/>
+              <a:t>Any Other topics you WISH ME TO discuss?</a:t>
+            </a:r>
+            <a:endParaRPr lang="en-CA" dirty="0"/>
+          </a:p>
+        </p:txBody>
+      </p:sp>
+      <p:sp>
+        <p:nvSpPr>
+          <p:cNvPr id="3" name="Text Placeholder 2"/>
+          <p:cNvSpPr>
+            <a:spLocks noGrp="1"/>
+          </p:cNvSpPr>
+          <p:nvPr>
+            <p:ph type="body" idx="1"/>
+          </p:nvPr>
+        </p:nvSpPr>
+        <p:spPr/>
+        <p:txBody>
+          <a:bodyPr/>
+          <a:lstStyle/>
+          <a:p>
+            <a:endParaRPr lang="en-CA"/>
+          </a:p>
+        </p:txBody>
+      </p:sp>
+    </p:spTree>
+    <p:extLst>
+      <p:ext uri="{BB962C8B-B14F-4D97-AF65-F5344CB8AC3E}">
+        <p14:creationId xmlns:p14="http://schemas.microsoft.com/office/powerpoint/2010/main" val="1454847279"/>
+      </p:ext>
+    </p:extLst>
+  </p:cSld>
+  <p:clrMapOvr>
+    <a:masterClrMapping/>
+  </p:clrMapOvr>
+  <p:timing>
+    <p:tnLst>
+      <p:par>
+        <p:cTn id="1" dur="indefinite" restart="never" nodeType="tmRoot"/>
+      </p:par>
+    </p:tnLst>
+  </p:timing>
+</p:sld>
+</file>
+
+<file path=ppt/slides/slide31.xml><?xml version="1.0" encoding="utf-8"?>
+<p:sld xmlns:a="http://schemas.openxmlformats.org/drawingml/2006/main" xmlns:r="http://schemas.openxmlformats.org/officeDocument/2006/relationships" xmlns:p="http://schemas.openxmlformats.org/presentationml/2006/main">
+  <p:cSld>
+    <p:spTree>
+      <p:nvGrpSpPr>
+        <p:cNvPr id="1" name=""/>
+        <p:cNvGrpSpPr/>
+        <p:nvPr/>
+      </p:nvGrpSpPr>
+      <p:grpSpPr>
+        <a:xfrm>
+          <a:off x="0" y="0"/>
+          <a:ext cx="0" cy="0"/>
+          <a:chOff x="0" y="0"/>
+          <a:chExt cx="0" cy="0"/>
+        </a:xfrm>
+      </p:grpSpPr>
+      <p:sp>
+        <p:nvSpPr>
+          <p:cNvPr id="2" name="Title 1"/>
+          <p:cNvSpPr>
+            <a:spLocks noGrp="1"/>
+          </p:cNvSpPr>
+          <p:nvPr>
+            <p:ph type="title"/>
+          </p:nvPr>
+        </p:nvSpPr>
+        <p:spPr/>
+        <p:txBody>
+          <a:bodyPr/>
+          <a:lstStyle/>
+          <a:p>
+            <a:r>
+              <a:rPr lang="en-CA" dirty="0" smtClean="0"/>
+              <a:t>HOW TO MANAGE A LARGE APPLICATION WITH GIT</a:t>
+            </a:r>
+            <a:endParaRPr lang="en-CA" dirty="0"/>
+          </a:p>
+        </p:txBody>
+      </p:sp>
+      <p:sp>
+        <p:nvSpPr>
+          <p:cNvPr id="3" name="Text Placeholder 2"/>
+          <p:cNvSpPr>
+            <a:spLocks noGrp="1"/>
+          </p:cNvSpPr>
+          <p:nvPr>
+            <p:ph type="body" idx="1"/>
+          </p:nvPr>
+        </p:nvSpPr>
+        <p:spPr/>
+        <p:txBody>
+          <a:bodyPr/>
+          <a:lstStyle/>
+          <a:p>
+            <a:endParaRPr lang="en-CA"/>
+          </a:p>
+        </p:txBody>
+      </p:sp>
+    </p:spTree>
+    <p:extLst>
+      <p:ext uri="{BB962C8B-B14F-4D97-AF65-F5344CB8AC3E}">
+        <p14:creationId xmlns:p14="http://schemas.microsoft.com/office/powerpoint/2010/main" val="19414260"/>
+      </p:ext>
+    </p:extLst>
+  </p:cSld>
+  <p:clrMapOvr>
+    <a:masterClrMapping/>
+  </p:clrMapOvr>
+  <p:timing>
+    <p:tnLst>
+      <p:par>
+        <p:cTn id="1" dur="indefinite" restart="never" nodeType="tmRoot"/>
+      </p:par>
+    </p:tnLst>
+  </p:timing>
+</p:sld>
+</file>
+
+<file path=ppt/slides/slide32.xml><?xml version="1.0" encoding="utf-8"?>
+<p:sld xmlns:a="http://schemas.openxmlformats.org/drawingml/2006/main" xmlns:r="http://schemas.openxmlformats.org/officeDocument/2006/relationships" xmlns:p="http://schemas.openxmlformats.org/presentationml/2006/main">
+  <p:cSld>
+    <p:spTree>
+      <p:nvGrpSpPr>
+        <p:cNvPr id="1" name=""/>
+        <p:cNvGrpSpPr/>
+        <p:nvPr/>
+      </p:nvGrpSpPr>
+      <p:grpSpPr>
+        <a:xfrm>
+          <a:off x="0" y="0"/>
+          <a:ext cx="0" cy="0"/>
+          <a:chOff x="0" y="0"/>
+          <a:chExt cx="0" cy="0"/>
+        </a:xfrm>
+      </p:grpSpPr>
+      <p:sp>
+        <p:nvSpPr>
+          <p:cNvPr id="2" name="Title 1"/>
+          <p:cNvSpPr>
+            <a:spLocks noGrp="1"/>
+          </p:cNvSpPr>
+          <p:nvPr>
+            <p:ph type="title"/>
+          </p:nvPr>
+        </p:nvSpPr>
+        <p:spPr/>
+        <p:txBody>
+          <a:bodyPr/>
+          <a:lstStyle/>
+          <a:p>
+            <a:r>
+              <a:rPr lang="en-CA" dirty="0" smtClean="0"/>
+              <a:t>GIT AND LAGE CODE BASES</a:t>
+            </a:r>
+            <a:endParaRPr lang="en-CA" dirty="0"/>
+          </a:p>
+        </p:txBody>
+      </p:sp>
+      <p:sp>
+        <p:nvSpPr>
+          <p:cNvPr id="3" name="Content Placeholder 2"/>
+          <p:cNvSpPr>
+            <a:spLocks noGrp="1"/>
+          </p:cNvSpPr>
+          <p:nvPr>
+            <p:ph idx="1"/>
+          </p:nvPr>
+        </p:nvSpPr>
+        <p:spPr/>
+        <p:txBody>
+          <a:bodyPr/>
+          <a:lstStyle/>
+          <a:p>
+            <a:pPr marL="0" indent="0">
+              <a:buNone/>
+            </a:pPr>
+            <a:r>
+              <a:rPr lang="en-CA" dirty="0" smtClean="0"/>
+              <a:t>Large code bases cause the following problems to a GIT repository:</a:t>
+            </a:r>
+          </a:p>
+          <a:p>
+            <a:r>
+              <a:rPr lang="en-CA" dirty="0" smtClean="0"/>
+              <a:t>More </a:t>
+            </a:r>
+            <a:r>
+              <a:rPr lang="en-CA" dirty="0" err="1" smtClean="0"/>
+              <a:t>changesets</a:t>
+            </a:r>
+            <a:r>
+              <a:rPr lang="en-CA" dirty="0" smtClean="0"/>
+              <a:t>, making it harder to store a significant history for your repository.</a:t>
+            </a:r>
+          </a:p>
+          <a:p>
+            <a:r>
+              <a:rPr lang="en-CA" dirty="0" smtClean="0"/>
+              <a:t>More files to download</a:t>
+            </a:r>
+          </a:p>
+          <a:p>
+            <a:r>
+              <a:rPr lang="en-CA" dirty="0" smtClean="0"/>
+              <a:t>Longer merges</a:t>
+            </a:r>
+          </a:p>
+          <a:p>
+            <a:r>
+              <a:rPr lang="en-CA" dirty="0" smtClean="0"/>
+              <a:t>More frequent and harder to resolve conflicts</a:t>
+            </a:r>
+          </a:p>
+          <a:p>
+            <a:r>
+              <a:rPr lang="en-CA" dirty="0" smtClean="0"/>
+              <a:t>Branches becomes hard to work with</a:t>
+            </a:r>
+          </a:p>
+          <a:p>
+            <a:pPr marL="0" indent="0">
+              <a:buNone/>
+            </a:pPr>
+            <a:endParaRPr lang="en-CA" dirty="0"/>
+          </a:p>
+        </p:txBody>
+      </p:sp>
+    </p:spTree>
+    <p:extLst>
+      <p:ext uri="{BB962C8B-B14F-4D97-AF65-F5344CB8AC3E}">
+        <p14:creationId xmlns:p14="http://schemas.microsoft.com/office/powerpoint/2010/main" val="2727086813"/>
+      </p:ext>
+    </p:extLst>
+  </p:cSld>
+  <p:clrMapOvr>
+    <a:masterClrMapping/>
+  </p:clrMapOvr>
+</p:sld>
+</file>
+
+<file path=ppt/slides/slide33.xml><?xml version="1.0" encoding="utf-8"?>
+<p:sld xmlns:a="http://schemas.openxmlformats.org/drawingml/2006/main" xmlns:r="http://schemas.openxmlformats.org/officeDocument/2006/relationships" xmlns:p="http://schemas.openxmlformats.org/presentationml/2006/main">
+  <p:cSld>
+    <p:spTree>
+      <p:nvGrpSpPr>
+        <p:cNvPr id="1" name=""/>
+        <p:cNvGrpSpPr/>
+        <p:nvPr/>
+      </p:nvGrpSpPr>
+      <p:grpSpPr>
+        <a:xfrm>
+          <a:off x="0" y="0"/>
+          <a:ext cx="0" cy="0"/>
+          <a:chOff x="0" y="0"/>
+          <a:chExt cx="0" cy="0"/>
+        </a:xfrm>
+      </p:grpSpPr>
+      <p:sp>
+        <p:nvSpPr>
+          <p:cNvPr id="2" name="Title 1"/>
+          <p:cNvSpPr>
+            <a:spLocks noGrp="1"/>
+          </p:cNvSpPr>
+          <p:nvPr>
+            <p:ph type="title"/>
+          </p:nvPr>
+        </p:nvSpPr>
+        <p:spPr/>
+        <p:txBody>
+          <a:bodyPr/>
+          <a:lstStyle/>
+          <a:p>
+            <a:r>
+              <a:rPr lang="en-CA" dirty="0" smtClean="0"/>
+              <a:t>GIT AND LARGE CODE BASES</a:t>
+            </a:r>
+            <a:endParaRPr lang="en-CA" dirty="0"/>
+          </a:p>
+        </p:txBody>
+      </p:sp>
+      <p:sp>
+        <p:nvSpPr>
+          <p:cNvPr id="3" name="Content Placeholder 2"/>
+          <p:cNvSpPr>
+            <a:spLocks noGrp="1"/>
+          </p:cNvSpPr>
+          <p:nvPr>
+            <p:ph idx="1"/>
+          </p:nvPr>
+        </p:nvSpPr>
+        <p:spPr/>
+        <p:txBody>
+          <a:bodyPr>
+            <a:normAutofit fontScale="92500" lnSpcReduction="20000"/>
+          </a:bodyPr>
+          <a:lstStyle/>
+          <a:p>
+            <a:pPr marL="0" indent="0">
+              <a:buNone/>
+            </a:pPr>
+            <a:r>
+              <a:rPr lang="en-CA" dirty="0" smtClean="0"/>
+              <a:t>What to do about it:</a:t>
+            </a:r>
+          </a:p>
+          <a:p>
+            <a:pPr marL="0" indent="0">
+              <a:buNone/>
+            </a:pPr>
+            <a:endParaRPr lang="en-CA" dirty="0" smtClean="0"/>
+          </a:p>
+          <a:p>
+            <a:r>
+              <a:rPr lang="en-CA" dirty="0" smtClean="0"/>
+              <a:t>Divide and Conquer: refactor large code bases into separate independent projects, each in its own repository.</a:t>
+            </a:r>
+          </a:p>
+          <a:p>
+            <a:r>
+              <a:rPr lang="en-CA" dirty="0" smtClean="0"/>
+              <a:t>Use your favourite build tool to define dependencies on binary artifacts generated by other GIT repositories.</a:t>
+            </a:r>
+          </a:p>
+          <a:p>
+            <a:r>
+              <a:rPr lang="en-CA" dirty="0" smtClean="0"/>
+              <a:t>Employ a multi-stage build process, where your GIT repositories are built in order and the binaries are used as binary dependencies.</a:t>
+            </a:r>
+          </a:p>
+          <a:p>
+            <a:pPr marL="0" indent="0">
+              <a:buNone/>
+            </a:pPr>
+            <a:endParaRPr lang="en-CA" dirty="0"/>
+          </a:p>
+          <a:p>
+            <a:pPr marL="0" indent="0">
+              <a:buNone/>
+            </a:pPr>
+            <a:endParaRPr lang="en-CA" dirty="0" smtClean="0"/>
+          </a:p>
+          <a:p>
+            <a:endParaRPr lang="en-CA" dirty="0"/>
+          </a:p>
+        </p:txBody>
+      </p:sp>
+    </p:spTree>
+    <p:extLst>
+      <p:ext uri="{BB962C8B-B14F-4D97-AF65-F5344CB8AC3E}">
+        <p14:creationId xmlns:p14="http://schemas.microsoft.com/office/powerpoint/2010/main" val="2307458371"/>
+      </p:ext>
+    </p:extLst>
+  </p:cSld>
+  <p:clrMapOvr>
+    <a:masterClrMapping/>
+  </p:clrMapOvr>
+</p:sld>
+</file>
+
+<file path=ppt/slides/slide34.xml><?xml version="1.0" encoding="utf-8"?>
+<p:sld xmlns:a="http://schemas.openxmlformats.org/drawingml/2006/main" xmlns:r="http://schemas.openxmlformats.org/officeDocument/2006/relationships" xmlns:p="http://schemas.openxmlformats.org/presentationml/2006/main">
+  <p:cSld>
+    <p:spTree>
+      <p:nvGrpSpPr>
+        <p:cNvPr id="1" name=""/>
+        <p:cNvGrpSpPr/>
+        <p:nvPr/>
+      </p:nvGrpSpPr>
+      <p:grpSpPr>
+        <a:xfrm>
+          <a:off x="0" y="0"/>
+          <a:ext cx="0" cy="0"/>
+          <a:chOff x="0" y="0"/>
+          <a:chExt cx="0" cy="0"/>
+        </a:xfrm>
+      </p:grpSpPr>
+      <p:sp>
+        <p:nvSpPr>
+          <p:cNvPr id="2" name="Title 1"/>
+          <p:cNvSpPr>
+            <a:spLocks noGrp="1"/>
+          </p:cNvSpPr>
+          <p:nvPr>
+            <p:ph type="title"/>
+          </p:nvPr>
+        </p:nvSpPr>
+        <p:spPr/>
+        <p:txBody>
+          <a:bodyPr/>
+          <a:lstStyle/>
+          <a:p>
+            <a:r>
+              <a:rPr lang="en-CA" dirty="0"/>
+              <a:t>GIT AND LARGE CODE BASES</a:t>
+            </a:r>
+          </a:p>
+        </p:txBody>
+      </p:sp>
+      <p:sp>
+        <p:nvSpPr>
+          <p:cNvPr id="3" name="Content Placeholder 2"/>
+          <p:cNvSpPr>
+            <a:spLocks noGrp="1"/>
+          </p:cNvSpPr>
+          <p:nvPr>
+            <p:ph idx="1"/>
+          </p:nvPr>
+        </p:nvSpPr>
+        <p:spPr/>
+        <p:txBody>
+          <a:bodyPr/>
+          <a:lstStyle/>
+          <a:p>
+            <a:endParaRPr lang="en-CA" dirty="0" smtClean="0"/>
+          </a:p>
+          <a:p>
+            <a:pPr marL="0" indent="0">
+              <a:buNone/>
+            </a:pPr>
+            <a:r>
+              <a:rPr lang="en-CA" dirty="0" smtClean="0"/>
+              <a:t>Sometimes your component is just too large and cannot be feasibly broken down.</a:t>
+            </a:r>
+            <a:endParaRPr lang="en-CA" dirty="0"/>
+          </a:p>
+          <a:p>
+            <a:endParaRPr lang="en-CA" dirty="0" smtClean="0"/>
+          </a:p>
+          <a:p>
+            <a:pPr marL="0" indent="0" algn="ctr">
+              <a:buNone/>
+            </a:pPr>
+            <a:r>
+              <a:rPr lang="en-CA" dirty="0" smtClean="0"/>
+              <a:t>And this is where things get ugly.</a:t>
+            </a:r>
+            <a:endParaRPr lang="en-CA" dirty="0"/>
+          </a:p>
+        </p:txBody>
+      </p:sp>
+    </p:spTree>
+    <p:extLst>
+      <p:ext uri="{BB962C8B-B14F-4D97-AF65-F5344CB8AC3E}">
+        <p14:creationId xmlns:p14="http://schemas.microsoft.com/office/powerpoint/2010/main" val="3006666438"/>
+      </p:ext>
+    </p:extLst>
+  </p:cSld>
+  <p:clrMapOvr>
+    <a:masterClrMapping/>
+  </p:clrMapOvr>
+</p:sld>
+</file>
+
+<file path=ppt/slides/slide35.xml><?xml version="1.0" encoding="utf-8"?>
+<p:sld xmlns:a="http://schemas.openxmlformats.org/drawingml/2006/main" xmlns:r="http://schemas.openxmlformats.org/officeDocument/2006/relationships" xmlns:p="http://schemas.openxmlformats.org/presentationml/2006/main">
+  <p:cSld>
+    <p:spTree>
+      <p:nvGrpSpPr>
+        <p:cNvPr id="1" name=""/>
+        <p:cNvGrpSpPr/>
+        <p:nvPr/>
+      </p:nvGrpSpPr>
+      <p:grpSpPr>
+        <a:xfrm>
+          <a:off x="0" y="0"/>
+          <a:ext cx="0" cy="0"/>
+          <a:chOff x="0" y="0"/>
+          <a:chExt cx="0" cy="0"/>
+        </a:xfrm>
+      </p:grpSpPr>
+      <p:sp>
+        <p:nvSpPr>
+          <p:cNvPr id="2" name="Title 1"/>
+          <p:cNvSpPr>
+            <a:spLocks noGrp="1"/>
+          </p:cNvSpPr>
+          <p:nvPr>
+            <p:ph type="title"/>
+          </p:nvPr>
+        </p:nvSpPr>
+        <p:spPr/>
+        <p:txBody>
+          <a:bodyPr/>
+          <a:lstStyle/>
+          <a:p>
+            <a:r>
+              <a:rPr lang="en-CA" dirty="0" smtClean="0"/>
+              <a:t>WHEN ALL ELSE FAILS: SUBTREE</a:t>
+            </a:r>
+            <a:endParaRPr lang="en-CA" dirty="0"/>
+          </a:p>
+        </p:txBody>
+      </p:sp>
+      <p:sp>
+        <p:nvSpPr>
+          <p:cNvPr id="3" name="Content Placeholder 2"/>
+          <p:cNvSpPr>
+            <a:spLocks noGrp="1"/>
+          </p:cNvSpPr>
+          <p:nvPr>
+            <p:ph idx="1"/>
+          </p:nvPr>
+        </p:nvSpPr>
+        <p:spPr>
+          <a:xfrm>
+            <a:off x="395536" y="1168152"/>
+            <a:ext cx="8229600" cy="1036712"/>
+          </a:xfrm>
+        </p:spPr>
+        <p:txBody>
+          <a:bodyPr>
+            <a:normAutofit lnSpcReduction="10000"/>
+          </a:bodyPr>
+          <a:lstStyle/>
+          <a:p>
+            <a:pPr marL="0" indent="0">
+              <a:buNone/>
+            </a:pPr>
+            <a:r>
+              <a:rPr lang="en-CA" dirty="0" smtClean="0"/>
+              <a:t>Subtree is a mechanism to put a GIT repository as a directory of a GIT repository.</a:t>
+            </a:r>
+            <a:endParaRPr lang="en-CA" dirty="0"/>
+          </a:p>
+        </p:txBody>
+      </p:sp>
+      <p:sp>
+        <p:nvSpPr>
+          <p:cNvPr id="4" name="Trapezoid 3"/>
+          <p:cNvSpPr/>
+          <p:nvPr/>
+        </p:nvSpPr>
+        <p:spPr>
+          <a:xfrm>
+            <a:off x="286653" y="5550444"/>
+            <a:ext cx="2520280" cy="1152128"/>
+          </a:xfrm>
+          <a:prstGeom prst="trapezoid">
+            <a:avLst/>
+          </a:prstGeom>
+        </p:spPr>
+        <p:style>
+          <a:lnRef idx="2">
+            <a:schemeClr val="accent1">
+              <a:shade val="50000"/>
+            </a:schemeClr>
+          </a:lnRef>
+          <a:fillRef idx="1">
+            <a:schemeClr val="accent1"/>
+          </a:fillRef>
+          <a:effectRef idx="0">
+            <a:schemeClr val="accent1"/>
+          </a:effectRef>
+          <a:fontRef idx="minor">
+            <a:schemeClr val="lt1"/>
+          </a:fontRef>
+        </p:style>
+        <p:txBody>
+          <a:bodyPr rtlCol="0" anchor="ctr"/>
+          <a:lstStyle/>
+          <a:p>
+            <a:r>
+              <a:rPr lang="en-CA" dirty="0" smtClean="0">
+                <a:ln w="18415" cmpd="sng">
+                  <a:solidFill>
+                    <a:srgbClr val="FFFFFF"/>
+                  </a:solidFill>
+                  <a:prstDash val="solid"/>
+                </a:ln>
+                <a:solidFill>
+                  <a:srgbClr val="FFFFFF"/>
+                </a:solidFill>
+                <a:latin typeface="Courier New" panose="02070309020205020404" pitchFamily="49" charset="0"/>
+                <a:cs typeface="Courier New" panose="02070309020205020404" pitchFamily="49" charset="0"/>
+              </a:rPr>
+              <a:t>Repository 1</a:t>
+            </a:r>
+            <a:endParaRPr lang="en-CA" dirty="0" smtClean="0">
+              <a:ln w="18415" cmpd="sng">
+                <a:solidFill>
+                  <a:srgbClr val="FFFFFF"/>
+                </a:solidFill>
+                <a:prstDash val="solid"/>
+              </a:ln>
+              <a:solidFill>
+                <a:srgbClr val="FFFFFF"/>
+              </a:solidFill>
+              <a:latin typeface="Courier New" panose="02070309020205020404" pitchFamily="49" charset="0"/>
+              <a:cs typeface="Courier New" panose="02070309020205020404" pitchFamily="49" charset="0"/>
+            </a:endParaRPr>
+          </a:p>
+          <a:p>
+            <a:r>
+              <a:rPr lang="en-CA" dirty="0" smtClean="0">
+                <a:ln w="18415" cmpd="sng">
+                  <a:solidFill>
+                    <a:srgbClr val="FFFFFF"/>
+                  </a:solidFill>
+                  <a:prstDash val="solid"/>
+                </a:ln>
+                <a:solidFill>
+                  <a:srgbClr val="FFFFFF"/>
+                </a:solidFill>
+                <a:latin typeface="Courier New" panose="02070309020205020404" pitchFamily="49" charset="0"/>
+                <a:cs typeface="Courier New" panose="02070309020205020404" pitchFamily="49" charset="0"/>
+              </a:rPr>
+              <a:t>  </a:t>
+            </a:r>
+            <a:r>
+              <a:rPr lang="en-CA" dirty="0" smtClean="0">
+                <a:ln w="18415" cmpd="sng">
+                  <a:solidFill>
+                    <a:srgbClr val="FFFFFF"/>
+                  </a:solidFill>
+                  <a:prstDash val="solid"/>
+                </a:ln>
+                <a:solidFill>
+                  <a:srgbClr val="FFFFFF"/>
+                </a:solidFill>
+                <a:latin typeface="Courier New" panose="02070309020205020404" pitchFamily="49" charset="0"/>
+                <a:cs typeface="Courier New" panose="02070309020205020404" pitchFamily="49" charset="0"/>
+              </a:rPr>
+              <a:t>| +</a:t>
+            </a:r>
+            <a:r>
+              <a:rPr lang="en-CA" dirty="0" err="1" smtClean="0">
+                <a:ln w="18415" cmpd="sng">
+                  <a:solidFill>
+                    <a:srgbClr val="FFFFFF"/>
+                  </a:solidFill>
+                  <a:prstDash val="solid"/>
+                </a:ln>
+                <a:solidFill>
+                  <a:srgbClr val="FFFFFF"/>
+                </a:solidFill>
+                <a:latin typeface="Courier New" panose="02070309020205020404" pitchFamily="49" charset="0"/>
+                <a:cs typeface="Courier New" panose="02070309020205020404" pitchFamily="49" charset="0"/>
+              </a:rPr>
+              <a:t>dir</a:t>
+            </a:r>
+            <a:r>
+              <a:rPr lang="en-CA" dirty="0" smtClean="0">
+                <a:ln w="18415" cmpd="sng">
+                  <a:solidFill>
+                    <a:srgbClr val="FFFFFF"/>
+                  </a:solidFill>
+                  <a:prstDash val="solid"/>
+                </a:ln>
+                <a:solidFill>
+                  <a:srgbClr val="FFFFFF"/>
+                </a:solidFill>
+                <a:latin typeface="Courier New" panose="02070309020205020404" pitchFamily="49" charset="0"/>
+                <a:cs typeface="Courier New" panose="02070309020205020404" pitchFamily="49" charset="0"/>
+              </a:rPr>
+              <a:t> 1</a:t>
+            </a:r>
+          </a:p>
+        </p:txBody>
+      </p:sp>
+      <p:sp>
+        <p:nvSpPr>
+          <p:cNvPr id="5" name="Trapezoid 4"/>
+          <p:cNvSpPr/>
+          <p:nvPr/>
+        </p:nvSpPr>
+        <p:spPr>
+          <a:xfrm>
+            <a:off x="286653" y="4509120"/>
+            <a:ext cx="2520280" cy="1152128"/>
+          </a:xfrm>
+          <a:prstGeom prst="trapezoid">
+            <a:avLst/>
+          </a:prstGeom>
+        </p:spPr>
+        <p:style>
+          <a:lnRef idx="2">
+            <a:schemeClr val="accent1">
+              <a:shade val="50000"/>
+            </a:schemeClr>
+          </a:lnRef>
+          <a:fillRef idx="1">
+            <a:schemeClr val="accent1"/>
+          </a:fillRef>
+          <a:effectRef idx="0">
+            <a:schemeClr val="accent1"/>
+          </a:effectRef>
+          <a:fontRef idx="minor">
+            <a:schemeClr val="lt1"/>
+          </a:fontRef>
+        </p:style>
+        <p:txBody>
+          <a:bodyPr rtlCol="0" anchor="ctr"/>
+          <a:lstStyle/>
+          <a:p>
+            <a:r>
+              <a:rPr lang="en-CA" dirty="0" smtClean="0">
+                <a:ln w="18415" cmpd="sng">
+                  <a:solidFill>
+                    <a:srgbClr val="FFFFFF"/>
+                  </a:solidFill>
+                  <a:prstDash val="solid"/>
+                </a:ln>
+                <a:solidFill>
+                  <a:srgbClr val="FFFFFF"/>
+                </a:solidFill>
+                <a:latin typeface="Courier New" panose="02070309020205020404" pitchFamily="49" charset="0"/>
+                <a:cs typeface="Courier New" panose="02070309020205020404" pitchFamily="49" charset="0"/>
+              </a:rPr>
+              <a:t>Repository 1</a:t>
+            </a:r>
+            <a:endParaRPr lang="en-CA" dirty="0" smtClean="0">
+              <a:ln w="18415" cmpd="sng">
+                <a:solidFill>
+                  <a:srgbClr val="FFFFFF"/>
+                </a:solidFill>
+                <a:prstDash val="solid"/>
+              </a:ln>
+              <a:solidFill>
+                <a:srgbClr val="FFFFFF"/>
+              </a:solidFill>
+              <a:latin typeface="Courier New" panose="02070309020205020404" pitchFamily="49" charset="0"/>
+              <a:cs typeface="Courier New" panose="02070309020205020404" pitchFamily="49" charset="0"/>
+            </a:endParaRPr>
+          </a:p>
+        </p:txBody>
+      </p:sp>
+      <p:sp>
+        <p:nvSpPr>
+          <p:cNvPr id="6" name="Trapezoid 5"/>
+          <p:cNvSpPr/>
+          <p:nvPr/>
+        </p:nvSpPr>
+        <p:spPr>
+          <a:xfrm>
+            <a:off x="286653" y="3356992"/>
+            <a:ext cx="2520280" cy="1152128"/>
+          </a:xfrm>
+          <a:prstGeom prst="trapezoid">
+            <a:avLst/>
+          </a:prstGeom>
+        </p:spPr>
+        <p:style>
+          <a:lnRef idx="2">
+            <a:schemeClr val="accent1">
+              <a:shade val="50000"/>
+            </a:schemeClr>
+          </a:lnRef>
+          <a:fillRef idx="1">
+            <a:schemeClr val="accent1"/>
+          </a:fillRef>
+          <a:effectRef idx="0">
+            <a:schemeClr val="accent1"/>
+          </a:effectRef>
+          <a:fontRef idx="minor">
+            <a:schemeClr val="lt1"/>
+          </a:fontRef>
+        </p:style>
+        <p:txBody>
+          <a:bodyPr rtlCol="0" anchor="ctr"/>
+          <a:lstStyle/>
+          <a:p>
+            <a:r>
+              <a:rPr lang="en-CA" dirty="0" smtClean="0">
+                <a:ln w="18415" cmpd="sng">
+                  <a:solidFill>
+                    <a:srgbClr val="FFFFFF"/>
+                  </a:solidFill>
+                  <a:prstDash val="solid"/>
+                </a:ln>
+                <a:solidFill>
+                  <a:srgbClr val="FFFFFF"/>
+                </a:solidFill>
+                <a:latin typeface="Courier New" panose="02070309020205020404" pitchFamily="49" charset="0"/>
+                <a:cs typeface="Courier New" panose="02070309020205020404" pitchFamily="49" charset="0"/>
+              </a:rPr>
+              <a:t>Repository 1</a:t>
+            </a:r>
+            <a:endParaRPr lang="en-CA" dirty="0" smtClean="0">
+              <a:ln w="18415" cmpd="sng">
+                <a:solidFill>
+                  <a:srgbClr val="FFFFFF"/>
+                </a:solidFill>
+                <a:prstDash val="solid"/>
+              </a:ln>
+              <a:solidFill>
+                <a:srgbClr val="FFFFFF"/>
+              </a:solidFill>
+              <a:latin typeface="Courier New" panose="02070309020205020404" pitchFamily="49" charset="0"/>
+              <a:cs typeface="Courier New" panose="02070309020205020404" pitchFamily="49" charset="0"/>
+            </a:endParaRPr>
+          </a:p>
+        </p:txBody>
+      </p:sp>
+      <p:sp>
+        <p:nvSpPr>
+          <p:cNvPr id="7" name="Trapezoid 6"/>
+          <p:cNvSpPr/>
+          <p:nvPr/>
+        </p:nvSpPr>
+        <p:spPr>
+          <a:xfrm>
+            <a:off x="3959061" y="5550444"/>
+            <a:ext cx="2520280" cy="1152128"/>
+          </a:xfrm>
+          <a:prstGeom prst="trapezoid">
+            <a:avLst/>
+          </a:prstGeom>
+          <a:solidFill>
+            <a:srgbClr val="00B050"/>
+          </a:solidFill>
+        </p:spPr>
+        <p:style>
+          <a:lnRef idx="2">
+            <a:schemeClr val="accent1">
+              <a:shade val="50000"/>
+            </a:schemeClr>
+          </a:lnRef>
+          <a:fillRef idx="1">
+            <a:schemeClr val="accent1"/>
+          </a:fillRef>
+          <a:effectRef idx="0">
+            <a:schemeClr val="accent1"/>
+          </a:effectRef>
+          <a:fontRef idx="minor">
+            <a:schemeClr val="lt1"/>
+          </a:fontRef>
+        </p:style>
+        <p:txBody>
+          <a:bodyPr rtlCol="0" anchor="ctr"/>
+          <a:lstStyle/>
+          <a:p>
+            <a:r>
+              <a:rPr lang="en-CA" dirty="0" smtClean="0">
+                <a:ln w="18415" cmpd="sng">
+                  <a:solidFill>
+                    <a:srgbClr val="FFFFFF"/>
+                  </a:solidFill>
+                  <a:prstDash val="solid"/>
+                </a:ln>
+                <a:solidFill>
+                  <a:srgbClr val="FFFFFF"/>
+                </a:solidFill>
+                <a:latin typeface="Courier New" panose="02070309020205020404" pitchFamily="49" charset="0"/>
+                <a:cs typeface="Courier New" panose="02070309020205020404" pitchFamily="49" charset="0"/>
+              </a:rPr>
+              <a:t>Repository 2</a:t>
+            </a:r>
+            <a:endParaRPr lang="en-CA" dirty="0" smtClean="0">
+              <a:ln w="18415" cmpd="sng">
+                <a:solidFill>
+                  <a:srgbClr val="FFFFFF"/>
+                </a:solidFill>
+                <a:prstDash val="solid"/>
+              </a:ln>
+              <a:solidFill>
+                <a:srgbClr val="FFFFFF"/>
+              </a:solidFill>
+              <a:latin typeface="Courier New" panose="02070309020205020404" pitchFamily="49" charset="0"/>
+              <a:cs typeface="Courier New" panose="02070309020205020404" pitchFamily="49" charset="0"/>
+            </a:endParaRPr>
+          </a:p>
+          <a:p>
+            <a:r>
+              <a:rPr lang="en-CA" dirty="0" smtClean="0">
+                <a:ln w="18415" cmpd="sng">
+                  <a:solidFill>
+                    <a:srgbClr val="FFFFFF"/>
+                  </a:solidFill>
+                  <a:prstDash val="solid"/>
+                </a:ln>
+                <a:solidFill>
+                  <a:srgbClr val="FFFFFF"/>
+                </a:solidFill>
+                <a:latin typeface="Courier New" panose="02070309020205020404" pitchFamily="49" charset="0"/>
+                <a:cs typeface="Courier New" panose="02070309020205020404" pitchFamily="49" charset="0"/>
+              </a:rPr>
+              <a:t> | </a:t>
+            </a:r>
+            <a:r>
+              <a:rPr lang="en-CA" dirty="0" smtClean="0">
+                <a:ln w="18415" cmpd="sng">
+                  <a:solidFill>
+                    <a:srgbClr val="FFFFFF"/>
+                  </a:solidFill>
+                  <a:prstDash val="solid"/>
+                </a:ln>
+                <a:solidFill>
+                  <a:srgbClr val="FFFFFF"/>
+                </a:solidFill>
+                <a:latin typeface="Courier New" panose="02070309020205020404" pitchFamily="49" charset="0"/>
+                <a:cs typeface="Courier New" panose="02070309020205020404" pitchFamily="49" charset="0"/>
+              </a:rPr>
+              <a:t>file 1</a:t>
+            </a:r>
+          </a:p>
+          <a:p>
+            <a:r>
+              <a:rPr lang="en-CA" dirty="0">
+                <a:ln w="18415" cmpd="sng">
+                  <a:solidFill>
+                    <a:srgbClr val="FFFFFF"/>
+                  </a:solidFill>
+                  <a:prstDash val="solid"/>
+                </a:ln>
+                <a:solidFill>
+                  <a:srgbClr val="FFFFFF"/>
+                </a:solidFill>
+                <a:latin typeface="Courier New" panose="02070309020205020404" pitchFamily="49" charset="0"/>
+                <a:cs typeface="Courier New" panose="02070309020205020404" pitchFamily="49" charset="0"/>
+              </a:rPr>
+              <a:t> </a:t>
+            </a:r>
+            <a:r>
+              <a:rPr lang="en-CA" dirty="0" smtClean="0">
+                <a:ln w="18415" cmpd="sng">
+                  <a:solidFill>
+                    <a:srgbClr val="FFFFFF"/>
+                  </a:solidFill>
+                  <a:prstDash val="solid"/>
+                </a:ln>
+                <a:solidFill>
+                  <a:srgbClr val="FFFFFF"/>
+                </a:solidFill>
+                <a:latin typeface="Courier New" panose="02070309020205020404" pitchFamily="49" charset="0"/>
+                <a:cs typeface="Courier New" panose="02070309020205020404" pitchFamily="49" charset="0"/>
+              </a:rPr>
+              <a:t>| file 2</a:t>
+            </a:r>
+            <a:endParaRPr lang="en-CA" dirty="0" smtClean="0">
+              <a:ln w="18415" cmpd="sng">
+                <a:solidFill>
+                  <a:srgbClr val="FFFFFF"/>
+                </a:solidFill>
+                <a:prstDash val="solid"/>
+              </a:ln>
+              <a:solidFill>
+                <a:srgbClr val="FFFFFF"/>
+              </a:solidFill>
+              <a:latin typeface="Courier New" panose="02070309020205020404" pitchFamily="49" charset="0"/>
+              <a:cs typeface="Courier New" panose="02070309020205020404" pitchFamily="49" charset="0"/>
+            </a:endParaRPr>
+          </a:p>
+        </p:txBody>
+      </p:sp>
+      <p:sp>
+        <p:nvSpPr>
+          <p:cNvPr id="8" name="Trapezoid 7"/>
+          <p:cNvSpPr/>
+          <p:nvPr/>
+        </p:nvSpPr>
+        <p:spPr>
+          <a:xfrm>
+            <a:off x="3959061" y="4509120"/>
+            <a:ext cx="2520280" cy="1152128"/>
+          </a:xfrm>
+          <a:prstGeom prst="trapezoid">
+            <a:avLst/>
+          </a:prstGeom>
+          <a:solidFill>
+            <a:srgbClr val="00B050"/>
+          </a:solidFill>
+        </p:spPr>
+        <p:style>
+          <a:lnRef idx="2">
+            <a:schemeClr val="accent1">
+              <a:shade val="50000"/>
+            </a:schemeClr>
+          </a:lnRef>
+          <a:fillRef idx="1">
+            <a:schemeClr val="accent1"/>
+          </a:fillRef>
+          <a:effectRef idx="0">
+            <a:schemeClr val="accent1"/>
+          </a:effectRef>
+          <a:fontRef idx="minor">
+            <a:schemeClr val="lt1"/>
+          </a:fontRef>
+        </p:style>
+        <p:txBody>
+          <a:bodyPr rtlCol="0" anchor="ctr"/>
+          <a:lstStyle/>
+          <a:p>
+            <a:r>
+              <a:rPr lang="en-CA" dirty="0" smtClean="0">
+                <a:ln w="18415" cmpd="sng">
+                  <a:solidFill>
+                    <a:srgbClr val="FFFFFF"/>
+                  </a:solidFill>
+                  <a:prstDash val="solid"/>
+                </a:ln>
+                <a:solidFill>
+                  <a:srgbClr val="FFFFFF"/>
+                </a:solidFill>
+                <a:latin typeface="Courier New" panose="02070309020205020404" pitchFamily="49" charset="0"/>
+                <a:cs typeface="Courier New" panose="02070309020205020404" pitchFamily="49" charset="0"/>
+              </a:rPr>
+              <a:t>Repository 2</a:t>
+            </a:r>
+            <a:endParaRPr lang="en-CA" dirty="0" smtClean="0">
+              <a:ln w="18415" cmpd="sng">
+                <a:solidFill>
+                  <a:srgbClr val="FFFFFF"/>
+                </a:solidFill>
+                <a:prstDash val="solid"/>
+              </a:ln>
+              <a:solidFill>
+                <a:srgbClr val="FFFFFF"/>
+              </a:solidFill>
+              <a:latin typeface="Courier New" panose="02070309020205020404" pitchFamily="49" charset="0"/>
+              <a:cs typeface="Courier New" panose="02070309020205020404" pitchFamily="49" charset="0"/>
+            </a:endParaRPr>
+          </a:p>
+          <a:p>
+            <a:r>
+              <a:rPr lang="en-CA" dirty="0">
+                <a:ln w="18415" cmpd="sng">
+                  <a:solidFill>
+                    <a:srgbClr val="FFFFFF"/>
+                  </a:solidFill>
+                  <a:prstDash val="solid"/>
+                </a:ln>
+                <a:solidFill>
+                  <a:srgbClr val="FFFFFF"/>
+                </a:solidFill>
+                <a:latin typeface="Courier New" panose="02070309020205020404" pitchFamily="49" charset="0"/>
+                <a:cs typeface="Courier New" panose="02070309020205020404" pitchFamily="49" charset="0"/>
+              </a:rPr>
+              <a:t> </a:t>
+            </a:r>
+            <a:r>
+              <a:rPr lang="en-CA" dirty="0" smtClean="0">
+                <a:ln w="18415" cmpd="sng">
+                  <a:solidFill>
+                    <a:srgbClr val="FFFFFF"/>
+                  </a:solidFill>
+                  <a:prstDash val="solid"/>
+                </a:ln>
+                <a:solidFill>
+                  <a:srgbClr val="FFFFFF"/>
+                </a:solidFill>
+                <a:latin typeface="Courier New" panose="02070309020205020404" pitchFamily="49" charset="0"/>
+                <a:cs typeface="Courier New" panose="02070309020205020404" pitchFamily="49" charset="0"/>
+              </a:rPr>
+              <a:t>| </a:t>
+            </a:r>
+            <a:r>
+              <a:rPr lang="en-CA" dirty="0" smtClean="0">
+                <a:ln w="18415" cmpd="sng">
+                  <a:solidFill>
+                    <a:srgbClr val="FFFFFF"/>
+                  </a:solidFill>
+                  <a:prstDash val="solid"/>
+                </a:ln>
+                <a:solidFill>
+                  <a:srgbClr val="FFFFFF"/>
+                </a:solidFill>
+                <a:latin typeface="Courier New" panose="02070309020205020404" pitchFamily="49" charset="0"/>
+                <a:cs typeface="Courier New" panose="02070309020205020404" pitchFamily="49" charset="0"/>
+              </a:rPr>
+              <a:t>file 1</a:t>
+            </a:r>
+          </a:p>
+          <a:p>
+            <a:r>
+              <a:rPr lang="en-CA" dirty="0" smtClean="0">
+                <a:ln w="18415" cmpd="sng">
+                  <a:solidFill>
+                    <a:srgbClr val="FFFFFF"/>
+                  </a:solidFill>
+                  <a:prstDash val="solid"/>
+                </a:ln>
+                <a:solidFill>
+                  <a:srgbClr val="FFFFFF"/>
+                </a:solidFill>
+                <a:latin typeface="Courier New" panose="02070309020205020404" pitchFamily="49" charset="0"/>
+                <a:cs typeface="Courier New" panose="02070309020205020404" pitchFamily="49" charset="0"/>
+              </a:rPr>
+              <a:t> | file 2</a:t>
+            </a:r>
+            <a:endParaRPr lang="en-CA" dirty="0" smtClean="0">
+              <a:ln w="18415" cmpd="sng">
+                <a:solidFill>
+                  <a:srgbClr val="FFFFFF"/>
+                </a:solidFill>
+                <a:prstDash val="solid"/>
+              </a:ln>
+              <a:solidFill>
+                <a:srgbClr val="FFFFFF"/>
+              </a:solidFill>
+              <a:latin typeface="Courier New" panose="02070309020205020404" pitchFamily="49" charset="0"/>
+              <a:cs typeface="Courier New" panose="02070309020205020404" pitchFamily="49" charset="0"/>
+            </a:endParaRPr>
+          </a:p>
+        </p:txBody>
+      </p:sp>
+      <p:sp>
+        <p:nvSpPr>
+          <p:cNvPr id="9" name="Trapezoid 8"/>
+          <p:cNvSpPr/>
+          <p:nvPr/>
+        </p:nvSpPr>
+        <p:spPr>
+          <a:xfrm>
+            <a:off x="3959061" y="3356992"/>
+            <a:ext cx="2520280" cy="1152128"/>
+          </a:xfrm>
+          <a:prstGeom prst="trapezoid">
+            <a:avLst/>
+          </a:prstGeom>
+          <a:solidFill>
+            <a:srgbClr val="00B050"/>
+          </a:solidFill>
+        </p:spPr>
+        <p:style>
+          <a:lnRef idx="2">
+            <a:schemeClr val="accent1">
+              <a:shade val="50000"/>
+            </a:schemeClr>
+          </a:lnRef>
+          <a:fillRef idx="1">
+            <a:schemeClr val="accent1"/>
+          </a:fillRef>
+          <a:effectRef idx="0">
+            <a:schemeClr val="accent1"/>
+          </a:effectRef>
+          <a:fontRef idx="minor">
+            <a:schemeClr val="lt1"/>
+          </a:fontRef>
+        </p:style>
+        <p:txBody>
+          <a:bodyPr rtlCol="0" anchor="ctr"/>
+          <a:lstStyle/>
+          <a:p>
+            <a:r>
+              <a:rPr lang="en-CA" dirty="0" smtClean="0">
+                <a:ln w="18415" cmpd="sng">
+                  <a:solidFill>
+                    <a:srgbClr val="FFFFFF"/>
+                  </a:solidFill>
+                  <a:prstDash val="solid"/>
+                </a:ln>
+                <a:solidFill>
+                  <a:srgbClr val="FFFFFF"/>
+                </a:solidFill>
+                <a:latin typeface="Courier New" panose="02070309020205020404" pitchFamily="49" charset="0"/>
+                <a:cs typeface="Courier New" panose="02070309020205020404" pitchFamily="49" charset="0"/>
+              </a:rPr>
+              <a:t>Repository 2</a:t>
+            </a:r>
+            <a:endParaRPr lang="en-CA" dirty="0" smtClean="0">
+              <a:ln w="18415" cmpd="sng">
+                <a:solidFill>
+                  <a:srgbClr val="FFFFFF"/>
+                </a:solidFill>
+                <a:prstDash val="solid"/>
+              </a:ln>
+              <a:solidFill>
+                <a:srgbClr val="FFFFFF"/>
+              </a:solidFill>
+              <a:latin typeface="Courier New" panose="02070309020205020404" pitchFamily="49" charset="0"/>
+              <a:cs typeface="Courier New" panose="02070309020205020404" pitchFamily="49" charset="0"/>
+            </a:endParaRPr>
+          </a:p>
+          <a:p>
+            <a:r>
+              <a:rPr lang="en-CA" dirty="0" smtClean="0">
+                <a:ln w="18415" cmpd="sng">
+                  <a:solidFill>
+                    <a:srgbClr val="FFFFFF"/>
+                  </a:solidFill>
+                  <a:prstDash val="solid"/>
+                </a:ln>
+                <a:solidFill>
+                  <a:srgbClr val="FFFFFF"/>
+                </a:solidFill>
+                <a:latin typeface="Courier New" panose="02070309020205020404" pitchFamily="49" charset="0"/>
+                <a:cs typeface="Courier New" panose="02070309020205020404" pitchFamily="49" charset="0"/>
+              </a:rPr>
+              <a:t> | </a:t>
+            </a:r>
+            <a:r>
+              <a:rPr lang="en-CA" dirty="0" smtClean="0">
+                <a:ln w="18415" cmpd="sng">
+                  <a:solidFill>
+                    <a:srgbClr val="FFFFFF"/>
+                  </a:solidFill>
+                  <a:prstDash val="solid"/>
+                </a:ln>
+                <a:solidFill>
+                  <a:srgbClr val="FFFFFF"/>
+                </a:solidFill>
+                <a:latin typeface="Courier New" panose="02070309020205020404" pitchFamily="49" charset="0"/>
+                <a:cs typeface="Courier New" panose="02070309020205020404" pitchFamily="49" charset="0"/>
+              </a:rPr>
+              <a:t>file 1</a:t>
+            </a:r>
+            <a:endParaRPr lang="en-CA" dirty="0" smtClean="0">
+              <a:ln w="18415" cmpd="sng">
+                <a:solidFill>
+                  <a:srgbClr val="FFFFFF"/>
+                </a:solidFill>
+                <a:prstDash val="solid"/>
+              </a:ln>
+              <a:solidFill>
+                <a:srgbClr val="FFFFFF"/>
+              </a:solidFill>
+              <a:latin typeface="Courier New" panose="02070309020205020404" pitchFamily="49" charset="0"/>
+              <a:cs typeface="Courier New" panose="02070309020205020404" pitchFamily="49" charset="0"/>
+            </a:endParaRPr>
+          </a:p>
+          <a:p>
+            <a:r>
+              <a:rPr lang="en-CA" dirty="0" smtClean="0">
+                <a:ln w="18415" cmpd="sng">
+                  <a:solidFill>
+                    <a:srgbClr val="FFFFFF"/>
+                  </a:solidFill>
+                  <a:prstDash val="solid"/>
+                </a:ln>
+                <a:solidFill>
+                  <a:srgbClr val="FFFFFF"/>
+                </a:solidFill>
+                <a:latin typeface="Courier New" panose="02070309020205020404" pitchFamily="49" charset="0"/>
+                <a:cs typeface="Courier New" panose="02070309020205020404" pitchFamily="49" charset="0"/>
+              </a:rPr>
+              <a:t> | </a:t>
+            </a:r>
+            <a:r>
+              <a:rPr lang="en-CA" dirty="0" smtClean="0">
+                <a:ln w="18415" cmpd="sng">
+                  <a:solidFill>
+                    <a:srgbClr val="FFFFFF"/>
+                  </a:solidFill>
+                  <a:prstDash val="solid"/>
+                </a:ln>
+                <a:solidFill>
+                  <a:srgbClr val="FFFFFF"/>
+                </a:solidFill>
+                <a:latin typeface="Courier New" panose="02070309020205020404" pitchFamily="49" charset="0"/>
+                <a:cs typeface="Courier New" panose="02070309020205020404" pitchFamily="49" charset="0"/>
+              </a:rPr>
+              <a:t>file 2</a:t>
+            </a:r>
+            <a:endParaRPr lang="en-CA" dirty="0" smtClean="0">
+              <a:ln w="18415" cmpd="sng">
+                <a:solidFill>
+                  <a:srgbClr val="FFFFFF"/>
+                </a:solidFill>
+                <a:prstDash val="solid"/>
+              </a:ln>
+              <a:solidFill>
+                <a:srgbClr val="FFFFFF"/>
+              </a:solidFill>
+              <a:latin typeface="Courier New" panose="02070309020205020404" pitchFamily="49" charset="0"/>
+              <a:cs typeface="Courier New" panose="02070309020205020404" pitchFamily="49" charset="0"/>
+            </a:endParaRPr>
+          </a:p>
+        </p:txBody>
+      </p:sp>
+      <p:cxnSp>
+        <p:nvCxnSpPr>
+          <p:cNvPr id="18" name="Straight Connector 17"/>
+          <p:cNvCxnSpPr/>
+          <p:nvPr/>
+        </p:nvCxnSpPr>
+        <p:spPr>
+          <a:xfrm>
+            <a:off x="2123728" y="6309320"/>
+            <a:ext cx="1224136" cy="0"/>
+          </a:xfrm>
+          <a:prstGeom prst="line">
+            <a:avLst/>
+          </a:prstGeom>
+          <a:ln w="44450">
+            <a:solidFill>
+              <a:srgbClr val="FF0000"/>
+            </a:solidFill>
+          </a:ln>
+        </p:spPr>
+        <p:style>
+          <a:lnRef idx="1">
+            <a:schemeClr val="accent1"/>
+          </a:lnRef>
+          <a:fillRef idx="0">
+            <a:schemeClr val="accent1"/>
+          </a:fillRef>
+          <a:effectRef idx="0">
+            <a:schemeClr val="accent1"/>
+          </a:effectRef>
+          <a:fontRef idx="minor">
+            <a:schemeClr val="tx1"/>
+          </a:fontRef>
+        </p:style>
+      </p:cxnSp>
+      <p:cxnSp>
+        <p:nvCxnSpPr>
+          <p:cNvPr id="20" name="Straight Connector 19"/>
+          <p:cNvCxnSpPr/>
+          <p:nvPr/>
+        </p:nvCxnSpPr>
+        <p:spPr>
+          <a:xfrm flipV="1">
+            <a:off x="3347864" y="2564904"/>
+            <a:ext cx="0" cy="3744416"/>
+          </a:xfrm>
+          <a:prstGeom prst="line">
+            <a:avLst/>
+          </a:prstGeom>
+          <a:ln w="44450">
+            <a:solidFill>
+              <a:srgbClr val="FF0000"/>
+            </a:solidFill>
+          </a:ln>
+        </p:spPr>
+        <p:style>
+          <a:lnRef idx="1">
+            <a:schemeClr val="accent1"/>
+          </a:lnRef>
+          <a:fillRef idx="0">
+            <a:schemeClr val="accent1"/>
+          </a:fillRef>
+          <a:effectRef idx="0">
+            <a:schemeClr val="accent1"/>
+          </a:effectRef>
+          <a:fontRef idx="minor">
+            <a:schemeClr val="tx1"/>
+          </a:fontRef>
+        </p:style>
+      </p:cxnSp>
+      <p:cxnSp>
+        <p:nvCxnSpPr>
+          <p:cNvPr id="22" name="Straight Connector 21"/>
+          <p:cNvCxnSpPr/>
+          <p:nvPr/>
+        </p:nvCxnSpPr>
+        <p:spPr>
+          <a:xfrm>
+            <a:off x="3347864" y="2564904"/>
+            <a:ext cx="1584176" cy="0"/>
+          </a:xfrm>
+          <a:prstGeom prst="line">
+            <a:avLst/>
+          </a:prstGeom>
+          <a:ln w="44450">
+            <a:solidFill>
+              <a:srgbClr val="FF0000"/>
+            </a:solidFill>
+          </a:ln>
+        </p:spPr>
+        <p:style>
+          <a:lnRef idx="1">
+            <a:schemeClr val="accent1"/>
+          </a:lnRef>
+          <a:fillRef idx="0">
+            <a:schemeClr val="accent1"/>
+          </a:fillRef>
+          <a:effectRef idx="0">
+            <a:schemeClr val="accent1"/>
+          </a:effectRef>
+          <a:fontRef idx="minor">
+            <a:schemeClr val="tx1"/>
+          </a:fontRef>
+        </p:style>
+      </p:cxnSp>
+      <p:cxnSp>
+        <p:nvCxnSpPr>
+          <p:cNvPr id="24" name="Straight Arrow Connector 23"/>
+          <p:cNvCxnSpPr/>
+          <p:nvPr/>
+        </p:nvCxnSpPr>
+        <p:spPr>
+          <a:xfrm>
+            <a:off x="4932040" y="2564904"/>
+            <a:ext cx="0" cy="648072"/>
+          </a:xfrm>
+          <a:prstGeom prst="straightConnector1">
+            <a:avLst/>
+          </a:prstGeom>
+          <a:ln w="44450">
+            <a:solidFill>
+              <a:srgbClr val="FF0000"/>
+            </a:solidFill>
+            <a:tailEnd type="arrow"/>
+          </a:ln>
+        </p:spPr>
+        <p:style>
+          <a:lnRef idx="1">
+            <a:schemeClr val="accent1"/>
+          </a:lnRef>
+          <a:fillRef idx="0">
+            <a:schemeClr val="accent1"/>
+          </a:fillRef>
+          <a:effectRef idx="0">
+            <a:schemeClr val="accent1"/>
+          </a:effectRef>
+          <a:fontRef idx="minor">
+            <a:schemeClr val="tx1"/>
+          </a:fontRef>
+        </p:style>
+      </p:cxnSp>
+    </p:spTree>
+    <p:extLst>
+      <p:ext uri="{BB962C8B-B14F-4D97-AF65-F5344CB8AC3E}">
+        <p14:creationId xmlns:p14="http://schemas.microsoft.com/office/powerpoint/2010/main" val="1984053427"/>
+      </p:ext>
+    </p:extLst>
+  </p:cSld>
+  <p:clrMapOvr>
+    <a:masterClrMapping/>
+  </p:clrMapOvr>
+</p:sld>
+</file>
+
+<file path=ppt/slides/slide36.xml><?xml version="1.0" encoding="utf-8"?>
+<p:sld xmlns:a="http://schemas.openxmlformats.org/drawingml/2006/main" xmlns:r="http://schemas.openxmlformats.org/officeDocument/2006/relationships" xmlns:p="http://schemas.openxmlformats.org/presentationml/2006/main">
+  <p:cSld>
+    <p:spTree>
+      <p:nvGrpSpPr>
+        <p:cNvPr id="1" name=""/>
+        <p:cNvGrpSpPr/>
+        <p:nvPr/>
+      </p:nvGrpSpPr>
+      <p:grpSpPr>
+        <a:xfrm>
+          <a:off x="0" y="0"/>
+          <a:ext cx="0" cy="0"/>
+          <a:chOff x="0" y="0"/>
+          <a:chExt cx="0" cy="0"/>
+        </a:xfrm>
+      </p:grpSpPr>
+      <p:sp>
+        <p:nvSpPr>
+          <p:cNvPr id="2" name="Title 1"/>
+          <p:cNvSpPr>
+            <a:spLocks noGrp="1"/>
+          </p:cNvSpPr>
+          <p:nvPr>
+            <p:ph type="title"/>
+          </p:nvPr>
+        </p:nvSpPr>
+        <p:spPr/>
+        <p:txBody>
+          <a:bodyPr>
+            <a:normAutofit fontScale="90000"/>
+          </a:bodyPr>
+          <a:lstStyle/>
+          <a:p>
+            <a:r>
+              <a:rPr lang="en-CA" dirty="0" smtClean="0"/>
+              <a:t>WHEN ALL ELSE FAILS: SUBMODULES</a:t>
+            </a:r>
+            <a:endParaRPr lang="en-CA" dirty="0"/>
+          </a:p>
+        </p:txBody>
+      </p:sp>
+      <p:sp>
+        <p:nvSpPr>
+          <p:cNvPr id="3" name="Content Placeholder 2"/>
+          <p:cNvSpPr>
+            <a:spLocks noGrp="1"/>
+          </p:cNvSpPr>
+          <p:nvPr>
+            <p:ph idx="1"/>
+          </p:nvPr>
+        </p:nvSpPr>
+        <p:spPr>
+          <a:xfrm>
+            <a:off x="457200" y="1600201"/>
+            <a:ext cx="8229600" cy="1540767"/>
+          </a:xfrm>
+        </p:spPr>
+        <p:txBody>
+          <a:bodyPr>
+            <a:normAutofit fontScale="85000" lnSpcReduction="20000"/>
+          </a:bodyPr>
+          <a:lstStyle/>
+          <a:p>
+            <a:pPr marL="0" indent="0">
+              <a:buNone/>
+            </a:pPr>
+            <a:r>
+              <a:rPr lang="en-CA" dirty="0" smtClean="0"/>
+              <a:t>Submodule is another mechanism to put an entire GIT repository as a directory another GIT repository. Unlike subtree, the reference is to a particular </a:t>
+            </a:r>
+            <a:r>
+              <a:rPr lang="en-CA" dirty="0" err="1" smtClean="0"/>
+              <a:t>changeset</a:t>
+            </a:r>
+            <a:r>
+              <a:rPr lang="en-CA" dirty="0" smtClean="0"/>
+              <a:t>, not a branch. Many people find this infuriating and confusing.</a:t>
+            </a:r>
+            <a:endParaRPr lang="en-CA" dirty="0"/>
+          </a:p>
+        </p:txBody>
+      </p:sp>
+      <p:sp>
+        <p:nvSpPr>
+          <p:cNvPr id="4" name="Trapezoid 3"/>
+          <p:cNvSpPr/>
+          <p:nvPr/>
+        </p:nvSpPr>
+        <p:spPr>
+          <a:xfrm>
+            <a:off x="286653" y="5550444"/>
+            <a:ext cx="2520280" cy="1152128"/>
+          </a:xfrm>
+          <a:prstGeom prst="trapezoid">
+            <a:avLst/>
+          </a:prstGeom>
+        </p:spPr>
+        <p:style>
+          <a:lnRef idx="2">
+            <a:schemeClr val="accent1">
+              <a:shade val="50000"/>
+            </a:schemeClr>
+          </a:lnRef>
+          <a:fillRef idx="1">
+            <a:schemeClr val="accent1"/>
+          </a:fillRef>
+          <a:effectRef idx="0">
+            <a:schemeClr val="accent1"/>
+          </a:effectRef>
+          <a:fontRef idx="minor">
+            <a:schemeClr val="lt1"/>
+          </a:fontRef>
+        </p:style>
+        <p:txBody>
+          <a:bodyPr rtlCol="0" anchor="ctr"/>
+          <a:lstStyle/>
+          <a:p>
+            <a:r>
+              <a:rPr lang="en-CA" dirty="0" smtClean="0">
+                <a:ln w="18415" cmpd="sng">
+                  <a:solidFill>
+                    <a:srgbClr val="FFFFFF"/>
+                  </a:solidFill>
+                  <a:prstDash val="solid"/>
+                </a:ln>
+                <a:solidFill>
+                  <a:srgbClr val="FFFFFF"/>
+                </a:solidFill>
+                <a:latin typeface="Courier New" panose="02070309020205020404" pitchFamily="49" charset="0"/>
+                <a:cs typeface="Courier New" panose="02070309020205020404" pitchFamily="49" charset="0"/>
+              </a:rPr>
+              <a:t>Repository 1</a:t>
+            </a:r>
+            <a:endParaRPr lang="en-CA" dirty="0" smtClean="0">
+              <a:ln w="18415" cmpd="sng">
+                <a:solidFill>
+                  <a:srgbClr val="FFFFFF"/>
+                </a:solidFill>
+                <a:prstDash val="solid"/>
+              </a:ln>
+              <a:solidFill>
+                <a:srgbClr val="FFFFFF"/>
+              </a:solidFill>
+              <a:latin typeface="Courier New" panose="02070309020205020404" pitchFamily="49" charset="0"/>
+              <a:cs typeface="Courier New" panose="02070309020205020404" pitchFamily="49" charset="0"/>
+            </a:endParaRPr>
+          </a:p>
+          <a:p>
+            <a:r>
+              <a:rPr lang="en-CA" dirty="0" smtClean="0">
+                <a:ln w="18415" cmpd="sng">
+                  <a:solidFill>
+                    <a:srgbClr val="FFFFFF"/>
+                  </a:solidFill>
+                  <a:prstDash val="solid"/>
+                </a:ln>
+                <a:solidFill>
+                  <a:srgbClr val="FFFFFF"/>
+                </a:solidFill>
+                <a:latin typeface="Courier New" panose="02070309020205020404" pitchFamily="49" charset="0"/>
+                <a:cs typeface="Courier New" panose="02070309020205020404" pitchFamily="49" charset="0"/>
+              </a:rPr>
+              <a:t>  </a:t>
+            </a:r>
+            <a:r>
+              <a:rPr lang="en-CA" dirty="0" smtClean="0">
+                <a:ln w="18415" cmpd="sng">
+                  <a:solidFill>
+                    <a:srgbClr val="FFFFFF"/>
+                  </a:solidFill>
+                  <a:prstDash val="solid"/>
+                </a:ln>
+                <a:solidFill>
+                  <a:srgbClr val="FFFFFF"/>
+                </a:solidFill>
+                <a:latin typeface="Courier New" panose="02070309020205020404" pitchFamily="49" charset="0"/>
+                <a:cs typeface="Courier New" panose="02070309020205020404" pitchFamily="49" charset="0"/>
+              </a:rPr>
+              <a:t>| +</a:t>
+            </a:r>
+            <a:r>
+              <a:rPr lang="en-CA" dirty="0" err="1" smtClean="0">
+                <a:ln w="18415" cmpd="sng">
+                  <a:solidFill>
+                    <a:srgbClr val="FFFFFF"/>
+                  </a:solidFill>
+                  <a:prstDash val="solid"/>
+                </a:ln>
+                <a:solidFill>
+                  <a:srgbClr val="FFFFFF"/>
+                </a:solidFill>
+                <a:latin typeface="Courier New" panose="02070309020205020404" pitchFamily="49" charset="0"/>
+                <a:cs typeface="Courier New" panose="02070309020205020404" pitchFamily="49" charset="0"/>
+              </a:rPr>
+              <a:t>dir</a:t>
+            </a:r>
+            <a:r>
+              <a:rPr lang="en-CA" dirty="0" smtClean="0">
+                <a:ln w="18415" cmpd="sng">
+                  <a:solidFill>
+                    <a:srgbClr val="FFFFFF"/>
+                  </a:solidFill>
+                  <a:prstDash val="solid"/>
+                </a:ln>
+                <a:solidFill>
+                  <a:srgbClr val="FFFFFF"/>
+                </a:solidFill>
+                <a:latin typeface="Courier New" panose="02070309020205020404" pitchFamily="49" charset="0"/>
+                <a:cs typeface="Courier New" panose="02070309020205020404" pitchFamily="49" charset="0"/>
+              </a:rPr>
+              <a:t> 1</a:t>
+            </a:r>
+          </a:p>
+        </p:txBody>
+      </p:sp>
+      <p:sp>
+        <p:nvSpPr>
+          <p:cNvPr id="5" name="Trapezoid 4"/>
+          <p:cNvSpPr/>
+          <p:nvPr/>
+        </p:nvSpPr>
+        <p:spPr>
+          <a:xfrm>
+            <a:off x="286653" y="4509120"/>
+            <a:ext cx="2520280" cy="1152128"/>
+          </a:xfrm>
+          <a:prstGeom prst="trapezoid">
+            <a:avLst/>
+          </a:prstGeom>
+        </p:spPr>
+        <p:style>
+          <a:lnRef idx="2">
+            <a:schemeClr val="accent1">
+              <a:shade val="50000"/>
+            </a:schemeClr>
+          </a:lnRef>
+          <a:fillRef idx="1">
+            <a:schemeClr val="accent1"/>
+          </a:fillRef>
+          <a:effectRef idx="0">
+            <a:schemeClr val="accent1"/>
+          </a:effectRef>
+          <a:fontRef idx="minor">
+            <a:schemeClr val="lt1"/>
+          </a:fontRef>
+        </p:style>
+        <p:txBody>
+          <a:bodyPr rtlCol="0" anchor="ctr"/>
+          <a:lstStyle/>
+          <a:p>
+            <a:r>
+              <a:rPr lang="en-CA" dirty="0" smtClean="0">
+                <a:ln w="18415" cmpd="sng">
+                  <a:solidFill>
+                    <a:srgbClr val="FFFFFF"/>
+                  </a:solidFill>
+                  <a:prstDash val="solid"/>
+                </a:ln>
+                <a:solidFill>
+                  <a:srgbClr val="FFFFFF"/>
+                </a:solidFill>
+                <a:latin typeface="Courier New" panose="02070309020205020404" pitchFamily="49" charset="0"/>
+                <a:cs typeface="Courier New" panose="02070309020205020404" pitchFamily="49" charset="0"/>
+              </a:rPr>
+              <a:t>Repository 1</a:t>
+            </a:r>
+            <a:endParaRPr lang="en-CA" dirty="0" smtClean="0">
+              <a:ln w="18415" cmpd="sng">
+                <a:solidFill>
+                  <a:srgbClr val="FFFFFF"/>
+                </a:solidFill>
+                <a:prstDash val="solid"/>
+              </a:ln>
+              <a:solidFill>
+                <a:srgbClr val="FFFFFF"/>
+              </a:solidFill>
+              <a:latin typeface="Courier New" panose="02070309020205020404" pitchFamily="49" charset="0"/>
+              <a:cs typeface="Courier New" panose="02070309020205020404" pitchFamily="49" charset="0"/>
+            </a:endParaRPr>
+          </a:p>
+        </p:txBody>
+      </p:sp>
+      <p:sp>
+        <p:nvSpPr>
+          <p:cNvPr id="6" name="Trapezoid 5"/>
+          <p:cNvSpPr/>
+          <p:nvPr/>
+        </p:nvSpPr>
+        <p:spPr>
+          <a:xfrm>
+            <a:off x="286653" y="3356992"/>
+            <a:ext cx="2520280" cy="1152128"/>
+          </a:xfrm>
+          <a:prstGeom prst="trapezoid">
+            <a:avLst/>
+          </a:prstGeom>
+        </p:spPr>
+        <p:style>
+          <a:lnRef idx="2">
+            <a:schemeClr val="accent1">
+              <a:shade val="50000"/>
+            </a:schemeClr>
+          </a:lnRef>
+          <a:fillRef idx="1">
+            <a:schemeClr val="accent1"/>
+          </a:fillRef>
+          <a:effectRef idx="0">
+            <a:schemeClr val="accent1"/>
+          </a:effectRef>
+          <a:fontRef idx="minor">
+            <a:schemeClr val="lt1"/>
+          </a:fontRef>
+        </p:style>
+        <p:txBody>
+          <a:bodyPr rtlCol="0" anchor="ctr"/>
+          <a:lstStyle/>
+          <a:p>
+            <a:r>
+              <a:rPr lang="en-CA" dirty="0" smtClean="0">
+                <a:ln w="18415" cmpd="sng">
+                  <a:solidFill>
+                    <a:srgbClr val="FFFFFF"/>
+                  </a:solidFill>
+                  <a:prstDash val="solid"/>
+                </a:ln>
+                <a:solidFill>
+                  <a:srgbClr val="FFFFFF"/>
+                </a:solidFill>
+                <a:latin typeface="Courier New" panose="02070309020205020404" pitchFamily="49" charset="0"/>
+                <a:cs typeface="Courier New" panose="02070309020205020404" pitchFamily="49" charset="0"/>
+              </a:rPr>
+              <a:t>Repository 1</a:t>
+            </a:r>
+          </a:p>
+          <a:p>
+            <a:r>
+              <a:rPr lang="en-CA" dirty="0">
+                <a:ln w="18415" cmpd="sng">
+                  <a:solidFill>
+                    <a:srgbClr val="FFFFFF"/>
+                  </a:solidFill>
+                  <a:prstDash val="solid"/>
+                </a:ln>
+                <a:solidFill>
+                  <a:srgbClr val="FFFFFF"/>
+                </a:solidFill>
+                <a:latin typeface="Courier New" panose="02070309020205020404" pitchFamily="49" charset="0"/>
+                <a:cs typeface="Courier New" panose="02070309020205020404" pitchFamily="49" charset="0"/>
+              </a:rPr>
+              <a:t> </a:t>
+            </a:r>
+            <a:r>
+              <a:rPr lang="en-CA" dirty="0" smtClean="0">
+                <a:ln w="18415" cmpd="sng">
+                  <a:solidFill>
+                    <a:srgbClr val="FFFFFF"/>
+                  </a:solidFill>
+                  <a:prstDash val="solid"/>
+                </a:ln>
+                <a:solidFill>
+                  <a:srgbClr val="FFFFFF"/>
+                </a:solidFill>
+                <a:latin typeface="Courier New" panose="02070309020205020404" pitchFamily="49" charset="0"/>
+                <a:cs typeface="Courier New" panose="02070309020205020404" pitchFamily="49" charset="0"/>
+              </a:rPr>
+              <a:t> | *</a:t>
+            </a:r>
+            <a:r>
+              <a:rPr lang="en-CA" dirty="0" err="1" smtClean="0">
+                <a:ln w="18415" cmpd="sng">
+                  <a:solidFill>
+                    <a:srgbClr val="FFFFFF"/>
+                  </a:solidFill>
+                  <a:prstDash val="solid"/>
+                </a:ln>
+                <a:solidFill>
+                  <a:srgbClr val="FFFFFF"/>
+                </a:solidFill>
+                <a:latin typeface="Courier New" panose="02070309020205020404" pitchFamily="49" charset="0"/>
+                <a:cs typeface="Courier New" panose="02070309020205020404" pitchFamily="49" charset="0"/>
+              </a:rPr>
+              <a:t>dir</a:t>
+            </a:r>
+            <a:r>
+              <a:rPr lang="en-CA" dirty="0" smtClean="0">
+                <a:ln w="18415" cmpd="sng">
+                  <a:solidFill>
+                    <a:srgbClr val="FFFFFF"/>
+                  </a:solidFill>
+                  <a:prstDash val="solid"/>
+                </a:ln>
+                <a:solidFill>
+                  <a:srgbClr val="FFFFFF"/>
+                </a:solidFill>
+                <a:latin typeface="Courier New" panose="02070309020205020404" pitchFamily="49" charset="0"/>
+                <a:cs typeface="Courier New" panose="02070309020205020404" pitchFamily="49" charset="0"/>
+              </a:rPr>
+              <a:t> 1</a:t>
+            </a:r>
+            <a:endParaRPr lang="en-CA" dirty="0" smtClean="0">
+              <a:ln w="18415" cmpd="sng">
+                <a:solidFill>
+                  <a:srgbClr val="FFFFFF"/>
+                </a:solidFill>
+                <a:prstDash val="solid"/>
+              </a:ln>
+              <a:solidFill>
+                <a:srgbClr val="FFFFFF"/>
+              </a:solidFill>
+              <a:latin typeface="Courier New" panose="02070309020205020404" pitchFamily="49" charset="0"/>
+              <a:cs typeface="Courier New" panose="02070309020205020404" pitchFamily="49" charset="0"/>
+            </a:endParaRPr>
+          </a:p>
+        </p:txBody>
+      </p:sp>
+      <p:sp>
+        <p:nvSpPr>
+          <p:cNvPr id="7" name="Trapezoid 6"/>
+          <p:cNvSpPr/>
+          <p:nvPr/>
+        </p:nvSpPr>
+        <p:spPr>
+          <a:xfrm>
+            <a:off x="3959061" y="5550444"/>
+            <a:ext cx="2520280" cy="1152128"/>
+          </a:xfrm>
+          <a:prstGeom prst="trapezoid">
+            <a:avLst/>
+          </a:prstGeom>
+          <a:solidFill>
+            <a:srgbClr val="00B050"/>
+          </a:solidFill>
+        </p:spPr>
+        <p:style>
+          <a:lnRef idx="2">
+            <a:schemeClr val="accent1">
+              <a:shade val="50000"/>
+            </a:schemeClr>
+          </a:lnRef>
+          <a:fillRef idx="1">
+            <a:schemeClr val="accent1"/>
+          </a:fillRef>
+          <a:effectRef idx="0">
+            <a:schemeClr val="accent1"/>
+          </a:effectRef>
+          <a:fontRef idx="minor">
+            <a:schemeClr val="lt1"/>
+          </a:fontRef>
+        </p:style>
+        <p:txBody>
+          <a:bodyPr rtlCol="0" anchor="ctr"/>
+          <a:lstStyle/>
+          <a:p>
+            <a:r>
+              <a:rPr lang="en-CA" dirty="0" smtClean="0">
+                <a:ln w="18415" cmpd="sng">
+                  <a:solidFill>
+                    <a:srgbClr val="FFFFFF"/>
+                  </a:solidFill>
+                  <a:prstDash val="solid"/>
+                </a:ln>
+                <a:solidFill>
+                  <a:srgbClr val="FFFFFF"/>
+                </a:solidFill>
+                <a:latin typeface="Courier New" panose="02070309020205020404" pitchFamily="49" charset="0"/>
+                <a:cs typeface="Courier New" panose="02070309020205020404" pitchFamily="49" charset="0"/>
+              </a:rPr>
+              <a:t>Repository 2</a:t>
+            </a:r>
+            <a:endParaRPr lang="en-CA" dirty="0" smtClean="0">
+              <a:ln w="18415" cmpd="sng">
+                <a:solidFill>
+                  <a:srgbClr val="FFFFFF"/>
+                </a:solidFill>
+                <a:prstDash val="solid"/>
+              </a:ln>
+              <a:solidFill>
+                <a:srgbClr val="FFFFFF"/>
+              </a:solidFill>
+              <a:latin typeface="Courier New" panose="02070309020205020404" pitchFamily="49" charset="0"/>
+              <a:cs typeface="Courier New" panose="02070309020205020404" pitchFamily="49" charset="0"/>
+            </a:endParaRPr>
+          </a:p>
+          <a:p>
+            <a:r>
+              <a:rPr lang="en-CA" dirty="0" smtClean="0">
+                <a:ln w="18415" cmpd="sng">
+                  <a:solidFill>
+                    <a:srgbClr val="FFFFFF"/>
+                  </a:solidFill>
+                  <a:prstDash val="solid"/>
+                </a:ln>
+                <a:solidFill>
+                  <a:srgbClr val="FFFFFF"/>
+                </a:solidFill>
+                <a:latin typeface="Courier New" panose="02070309020205020404" pitchFamily="49" charset="0"/>
+                <a:cs typeface="Courier New" panose="02070309020205020404" pitchFamily="49" charset="0"/>
+              </a:rPr>
+              <a:t> | </a:t>
+            </a:r>
+            <a:r>
+              <a:rPr lang="en-CA" dirty="0" smtClean="0">
+                <a:ln w="18415" cmpd="sng">
+                  <a:solidFill>
+                    <a:srgbClr val="FFFFFF"/>
+                  </a:solidFill>
+                  <a:prstDash val="solid"/>
+                </a:ln>
+                <a:solidFill>
+                  <a:srgbClr val="FFFFFF"/>
+                </a:solidFill>
+                <a:latin typeface="Courier New" panose="02070309020205020404" pitchFamily="49" charset="0"/>
+                <a:cs typeface="Courier New" panose="02070309020205020404" pitchFamily="49" charset="0"/>
+              </a:rPr>
+              <a:t>file 1</a:t>
+            </a:r>
+          </a:p>
+          <a:p>
+            <a:r>
+              <a:rPr lang="en-CA" dirty="0">
+                <a:ln w="18415" cmpd="sng">
+                  <a:solidFill>
+                    <a:srgbClr val="FFFFFF"/>
+                  </a:solidFill>
+                  <a:prstDash val="solid"/>
+                </a:ln>
+                <a:solidFill>
+                  <a:srgbClr val="FFFFFF"/>
+                </a:solidFill>
+                <a:latin typeface="Courier New" panose="02070309020205020404" pitchFamily="49" charset="0"/>
+                <a:cs typeface="Courier New" panose="02070309020205020404" pitchFamily="49" charset="0"/>
+              </a:rPr>
+              <a:t> </a:t>
+            </a:r>
+            <a:r>
+              <a:rPr lang="en-CA" dirty="0" smtClean="0">
+                <a:ln w="18415" cmpd="sng">
+                  <a:solidFill>
+                    <a:srgbClr val="FFFFFF"/>
+                  </a:solidFill>
+                  <a:prstDash val="solid"/>
+                </a:ln>
+                <a:solidFill>
+                  <a:srgbClr val="FFFFFF"/>
+                </a:solidFill>
+                <a:latin typeface="Courier New" panose="02070309020205020404" pitchFamily="49" charset="0"/>
+                <a:cs typeface="Courier New" panose="02070309020205020404" pitchFamily="49" charset="0"/>
+              </a:rPr>
+              <a:t>| file 2</a:t>
+            </a:r>
+            <a:endParaRPr lang="en-CA" dirty="0" smtClean="0">
+              <a:ln w="18415" cmpd="sng">
+                <a:solidFill>
+                  <a:srgbClr val="FFFFFF"/>
+                </a:solidFill>
+                <a:prstDash val="solid"/>
+              </a:ln>
+              <a:solidFill>
+                <a:srgbClr val="FFFFFF"/>
+              </a:solidFill>
+              <a:latin typeface="Courier New" panose="02070309020205020404" pitchFamily="49" charset="0"/>
+              <a:cs typeface="Courier New" panose="02070309020205020404" pitchFamily="49" charset="0"/>
+            </a:endParaRPr>
+          </a:p>
+        </p:txBody>
+      </p:sp>
+      <p:sp>
+        <p:nvSpPr>
+          <p:cNvPr id="8" name="Trapezoid 7"/>
+          <p:cNvSpPr/>
+          <p:nvPr/>
+        </p:nvSpPr>
+        <p:spPr>
+          <a:xfrm>
+            <a:off x="3959061" y="4509120"/>
+            <a:ext cx="2520280" cy="1152128"/>
+          </a:xfrm>
+          <a:prstGeom prst="trapezoid">
+            <a:avLst/>
+          </a:prstGeom>
+          <a:solidFill>
+            <a:srgbClr val="00B050"/>
+          </a:solidFill>
+        </p:spPr>
+        <p:style>
+          <a:lnRef idx="2">
+            <a:schemeClr val="accent1">
+              <a:shade val="50000"/>
+            </a:schemeClr>
+          </a:lnRef>
+          <a:fillRef idx="1">
+            <a:schemeClr val="accent1"/>
+          </a:fillRef>
+          <a:effectRef idx="0">
+            <a:schemeClr val="accent1"/>
+          </a:effectRef>
+          <a:fontRef idx="minor">
+            <a:schemeClr val="lt1"/>
+          </a:fontRef>
+        </p:style>
+        <p:txBody>
+          <a:bodyPr rtlCol="0" anchor="ctr"/>
+          <a:lstStyle/>
+          <a:p>
+            <a:r>
+              <a:rPr lang="en-CA" dirty="0" smtClean="0">
+                <a:ln w="18415" cmpd="sng">
+                  <a:solidFill>
+                    <a:srgbClr val="FFFFFF"/>
+                  </a:solidFill>
+                  <a:prstDash val="solid"/>
+                </a:ln>
+                <a:solidFill>
+                  <a:srgbClr val="FFFFFF"/>
+                </a:solidFill>
+                <a:latin typeface="Courier New" panose="02070309020205020404" pitchFamily="49" charset="0"/>
+                <a:cs typeface="Courier New" panose="02070309020205020404" pitchFamily="49" charset="0"/>
+              </a:rPr>
+              <a:t>Repository 2</a:t>
+            </a:r>
+            <a:endParaRPr lang="en-CA" dirty="0" smtClean="0">
+              <a:ln w="18415" cmpd="sng">
+                <a:solidFill>
+                  <a:srgbClr val="FFFFFF"/>
+                </a:solidFill>
+                <a:prstDash val="solid"/>
+              </a:ln>
+              <a:solidFill>
+                <a:srgbClr val="FFFFFF"/>
+              </a:solidFill>
+              <a:latin typeface="Courier New" panose="02070309020205020404" pitchFamily="49" charset="0"/>
+              <a:cs typeface="Courier New" panose="02070309020205020404" pitchFamily="49" charset="0"/>
+            </a:endParaRPr>
+          </a:p>
+          <a:p>
+            <a:r>
+              <a:rPr lang="en-CA" dirty="0">
+                <a:ln w="18415" cmpd="sng">
+                  <a:solidFill>
+                    <a:srgbClr val="FFFFFF"/>
+                  </a:solidFill>
+                  <a:prstDash val="solid"/>
+                </a:ln>
+                <a:solidFill>
+                  <a:srgbClr val="FFFFFF"/>
+                </a:solidFill>
+                <a:latin typeface="Courier New" panose="02070309020205020404" pitchFamily="49" charset="0"/>
+                <a:cs typeface="Courier New" panose="02070309020205020404" pitchFamily="49" charset="0"/>
+              </a:rPr>
+              <a:t> </a:t>
+            </a:r>
+            <a:r>
+              <a:rPr lang="en-CA" dirty="0" smtClean="0">
+                <a:ln w="18415" cmpd="sng">
+                  <a:solidFill>
+                    <a:srgbClr val="FFFFFF"/>
+                  </a:solidFill>
+                  <a:prstDash val="solid"/>
+                </a:ln>
+                <a:solidFill>
+                  <a:srgbClr val="FFFFFF"/>
+                </a:solidFill>
+                <a:latin typeface="Courier New" panose="02070309020205020404" pitchFamily="49" charset="0"/>
+                <a:cs typeface="Courier New" panose="02070309020205020404" pitchFamily="49" charset="0"/>
+              </a:rPr>
+              <a:t>| </a:t>
+            </a:r>
+            <a:r>
+              <a:rPr lang="en-CA" dirty="0" smtClean="0">
+                <a:ln w="18415" cmpd="sng">
+                  <a:solidFill>
+                    <a:srgbClr val="FFFFFF"/>
+                  </a:solidFill>
+                  <a:prstDash val="solid"/>
+                </a:ln>
+                <a:solidFill>
+                  <a:srgbClr val="FFFFFF"/>
+                </a:solidFill>
+                <a:latin typeface="Courier New" panose="02070309020205020404" pitchFamily="49" charset="0"/>
+                <a:cs typeface="Courier New" panose="02070309020205020404" pitchFamily="49" charset="0"/>
+              </a:rPr>
+              <a:t>file 1</a:t>
+            </a:r>
+          </a:p>
+          <a:p>
+            <a:r>
+              <a:rPr lang="en-CA" dirty="0" smtClean="0">
+                <a:ln w="18415" cmpd="sng">
+                  <a:solidFill>
+                    <a:srgbClr val="FFFFFF"/>
+                  </a:solidFill>
+                  <a:prstDash val="solid"/>
+                </a:ln>
+                <a:solidFill>
+                  <a:srgbClr val="FFFFFF"/>
+                </a:solidFill>
+                <a:latin typeface="Courier New" panose="02070309020205020404" pitchFamily="49" charset="0"/>
+                <a:cs typeface="Courier New" panose="02070309020205020404" pitchFamily="49" charset="0"/>
+              </a:rPr>
+              <a:t> | file 2</a:t>
+            </a:r>
+            <a:endParaRPr lang="en-CA" dirty="0" smtClean="0">
+              <a:ln w="18415" cmpd="sng">
+                <a:solidFill>
+                  <a:srgbClr val="FFFFFF"/>
+                </a:solidFill>
+                <a:prstDash val="solid"/>
+              </a:ln>
+              <a:solidFill>
+                <a:srgbClr val="FFFFFF"/>
+              </a:solidFill>
+              <a:latin typeface="Courier New" panose="02070309020205020404" pitchFamily="49" charset="0"/>
+              <a:cs typeface="Courier New" panose="02070309020205020404" pitchFamily="49" charset="0"/>
+            </a:endParaRPr>
+          </a:p>
+        </p:txBody>
+      </p:sp>
+      <p:sp>
+        <p:nvSpPr>
+          <p:cNvPr id="9" name="Trapezoid 8"/>
+          <p:cNvSpPr/>
+          <p:nvPr/>
+        </p:nvSpPr>
+        <p:spPr>
+          <a:xfrm>
+            <a:off x="3959061" y="3356992"/>
+            <a:ext cx="2520280" cy="1152128"/>
+          </a:xfrm>
+          <a:prstGeom prst="trapezoid">
+            <a:avLst/>
+          </a:prstGeom>
+          <a:solidFill>
+            <a:srgbClr val="00B050"/>
+          </a:solidFill>
+        </p:spPr>
+        <p:style>
+          <a:lnRef idx="2">
+            <a:schemeClr val="accent1">
+              <a:shade val="50000"/>
+            </a:schemeClr>
+          </a:lnRef>
+          <a:fillRef idx="1">
+            <a:schemeClr val="accent1"/>
+          </a:fillRef>
+          <a:effectRef idx="0">
+            <a:schemeClr val="accent1"/>
+          </a:effectRef>
+          <a:fontRef idx="minor">
+            <a:schemeClr val="lt1"/>
+          </a:fontRef>
+        </p:style>
+        <p:txBody>
+          <a:bodyPr rtlCol="0" anchor="ctr"/>
+          <a:lstStyle/>
+          <a:p>
+            <a:r>
+              <a:rPr lang="en-CA" dirty="0" smtClean="0">
+                <a:ln w="18415" cmpd="sng">
+                  <a:solidFill>
+                    <a:srgbClr val="FFFFFF"/>
+                  </a:solidFill>
+                  <a:prstDash val="solid"/>
+                </a:ln>
+                <a:solidFill>
+                  <a:srgbClr val="FFFFFF"/>
+                </a:solidFill>
+                <a:latin typeface="Courier New" panose="02070309020205020404" pitchFamily="49" charset="0"/>
+                <a:cs typeface="Courier New" panose="02070309020205020404" pitchFamily="49" charset="0"/>
+              </a:rPr>
+              <a:t>Repository 2</a:t>
+            </a:r>
+            <a:endParaRPr lang="en-CA" dirty="0" smtClean="0">
+              <a:ln w="18415" cmpd="sng">
+                <a:solidFill>
+                  <a:srgbClr val="FFFFFF"/>
+                </a:solidFill>
+                <a:prstDash val="solid"/>
+              </a:ln>
+              <a:solidFill>
+                <a:srgbClr val="FFFFFF"/>
+              </a:solidFill>
+              <a:latin typeface="Courier New" panose="02070309020205020404" pitchFamily="49" charset="0"/>
+              <a:cs typeface="Courier New" panose="02070309020205020404" pitchFamily="49" charset="0"/>
+            </a:endParaRPr>
+          </a:p>
+          <a:p>
+            <a:r>
+              <a:rPr lang="en-CA" dirty="0" smtClean="0">
+                <a:ln w="18415" cmpd="sng">
+                  <a:solidFill>
+                    <a:srgbClr val="FFFFFF"/>
+                  </a:solidFill>
+                  <a:prstDash val="solid"/>
+                </a:ln>
+                <a:solidFill>
+                  <a:srgbClr val="FFFFFF"/>
+                </a:solidFill>
+                <a:latin typeface="Courier New" panose="02070309020205020404" pitchFamily="49" charset="0"/>
+                <a:cs typeface="Courier New" panose="02070309020205020404" pitchFamily="49" charset="0"/>
+              </a:rPr>
+              <a:t> | </a:t>
+            </a:r>
+            <a:r>
+              <a:rPr lang="en-CA" dirty="0" smtClean="0">
+                <a:ln w="18415" cmpd="sng">
+                  <a:solidFill>
+                    <a:srgbClr val="FFFFFF"/>
+                  </a:solidFill>
+                  <a:prstDash val="solid"/>
+                </a:ln>
+                <a:solidFill>
+                  <a:srgbClr val="FFFFFF"/>
+                </a:solidFill>
+                <a:latin typeface="Courier New" panose="02070309020205020404" pitchFamily="49" charset="0"/>
+                <a:cs typeface="Courier New" panose="02070309020205020404" pitchFamily="49" charset="0"/>
+              </a:rPr>
+              <a:t>*file 1</a:t>
+            </a:r>
+            <a:endParaRPr lang="en-CA" dirty="0" smtClean="0">
+              <a:ln w="18415" cmpd="sng">
+                <a:solidFill>
+                  <a:srgbClr val="FFFFFF"/>
+                </a:solidFill>
+                <a:prstDash val="solid"/>
+              </a:ln>
+              <a:solidFill>
+                <a:srgbClr val="FFFFFF"/>
+              </a:solidFill>
+              <a:latin typeface="Courier New" panose="02070309020205020404" pitchFamily="49" charset="0"/>
+              <a:cs typeface="Courier New" panose="02070309020205020404" pitchFamily="49" charset="0"/>
+            </a:endParaRPr>
+          </a:p>
+          <a:p>
+            <a:r>
+              <a:rPr lang="en-CA" dirty="0" smtClean="0">
+                <a:ln w="18415" cmpd="sng">
+                  <a:solidFill>
+                    <a:srgbClr val="FFFFFF"/>
+                  </a:solidFill>
+                  <a:prstDash val="solid"/>
+                </a:ln>
+                <a:solidFill>
+                  <a:srgbClr val="FFFFFF"/>
+                </a:solidFill>
+                <a:latin typeface="Courier New" panose="02070309020205020404" pitchFamily="49" charset="0"/>
+                <a:cs typeface="Courier New" panose="02070309020205020404" pitchFamily="49" charset="0"/>
+              </a:rPr>
+              <a:t> | </a:t>
+            </a:r>
+            <a:r>
+              <a:rPr lang="en-CA" dirty="0" smtClean="0">
+                <a:ln w="18415" cmpd="sng">
+                  <a:solidFill>
+                    <a:srgbClr val="FFFFFF"/>
+                  </a:solidFill>
+                  <a:prstDash val="solid"/>
+                </a:ln>
+                <a:solidFill>
+                  <a:srgbClr val="FFFFFF"/>
+                </a:solidFill>
+                <a:latin typeface="Courier New" panose="02070309020205020404" pitchFamily="49" charset="0"/>
+                <a:cs typeface="Courier New" panose="02070309020205020404" pitchFamily="49" charset="0"/>
+              </a:rPr>
+              <a:t>file 2</a:t>
+            </a:r>
+            <a:endParaRPr lang="en-CA" dirty="0" smtClean="0">
+              <a:ln w="18415" cmpd="sng">
+                <a:solidFill>
+                  <a:srgbClr val="FFFFFF"/>
+                </a:solidFill>
+                <a:prstDash val="solid"/>
+              </a:ln>
+              <a:solidFill>
+                <a:srgbClr val="FFFFFF"/>
+              </a:solidFill>
+              <a:latin typeface="Courier New" panose="02070309020205020404" pitchFamily="49" charset="0"/>
+              <a:cs typeface="Courier New" panose="02070309020205020404" pitchFamily="49" charset="0"/>
+            </a:endParaRPr>
+          </a:p>
+        </p:txBody>
+      </p:sp>
+      <p:cxnSp>
+        <p:nvCxnSpPr>
+          <p:cNvPr id="11" name="Straight Connector 10"/>
+          <p:cNvCxnSpPr/>
+          <p:nvPr/>
+        </p:nvCxnSpPr>
+        <p:spPr>
+          <a:xfrm>
+            <a:off x="2051720" y="6309320"/>
+            <a:ext cx="1224136" cy="0"/>
+          </a:xfrm>
+          <a:prstGeom prst="line">
+            <a:avLst/>
+          </a:prstGeom>
+          <a:ln w="44450">
+            <a:solidFill>
+              <a:srgbClr val="FF0000"/>
+            </a:solidFill>
+          </a:ln>
+        </p:spPr>
+        <p:style>
+          <a:lnRef idx="1">
+            <a:schemeClr val="accent1"/>
+          </a:lnRef>
+          <a:fillRef idx="0">
+            <a:schemeClr val="accent1"/>
+          </a:fillRef>
+          <a:effectRef idx="0">
+            <a:schemeClr val="accent1"/>
+          </a:effectRef>
+          <a:fontRef idx="minor">
+            <a:schemeClr val="tx1"/>
+          </a:fontRef>
+        </p:style>
+      </p:cxnSp>
+      <p:cxnSp>
+        <p:nvCxnSpPr>
+          <p:cNvPr id="13" name="Straight Connector 12"/>
+          <p:cNvCxnSpPr/>
+          <p:nvPr/>
+        </p:nvCxnSpPr>
+        <p:spPr>
+          <a:xfrm flipV="1">
+            <a:off x="3275856" y="5085184"/>
+            <a:ext cx="0" cy="1224136"/>
+          </a:xfrm>
+          <a:prstGeom prst="line">
+            <a:avLst/>
+          </a:prstGeom>
+          <a:ln w="44450">
+            <a:solidFill>
+              <a:srgbClr val="FF0000"/>
+            </a:solidFill>
+          </a:ln>
+        </p:spPr>
+        <p:style>
+          <a:lnRef idx="1">
+            <a:schemeClr val="accent1"/>
+          </a:lnRef>
+          <a:fillRef idx="0">
+            <a:schemeClr val="accent1"/>
+          </a:fillRef>
+          <a:effectRef idx="0">
+            <a:schemeClr val="accent1"/>
+          </a:effectRef>
+          <a:fontRef idx="minor">
+            <a:schemeClr val="tx1"/>
+          </a:fontRef>
+        </p:style>
+      </p:cxnSp>
+      <p:cxnSp>
+        <p:nvCxnSpPr>
+          <p:cNvPr id="17" name="Straight Arrow Connector 16"/>
+          <p:cNvCxnSpPr/>
+          <p:nvPr/>
+        </p:nvCxnSpPr>
+        <p:spPr>
+          <a:xfrm>
+            <a:off x="3275856" y="5085184"/>
+            <a:ext cx="576064" cy="0"/>
+          </a:xfrm>
+          <a:prstGeom prst="straightConnector1">
+            <a:avLst/>
+          </a:prstGeom>
+          <a:ln w="44450">
+            <a:solidFill>
+              <a:srgbClr val="FF0000"/>
+            </a:solidFill>
+            <a:tailEnd type="arrow"/>
+          </a:ln>
+        </p:spPr>
+        <p:style>
+          <a:lnRef idx="1">
+            <a:schemeClr val="accent1"/>
+          </a:lnRef>
+          <a:fillRef idx="0">
+            <a:schemeClr val="accent1"/>
+          </a:fillRef>
+          <a:effectRef idx="0">
+            <a:schemeClr val="accent1"/>
+          </a:effectRef>
+          <a:fontRef idx="minor">
+            <a:schemeClr val="tx1"/>
+          </a:fontRef>
+        </p:style>
+      </p:cxnSp>
+      <p:cxnSp>
+        <p:nvCxnSpPr>
+          <p:cNvPr id="19" name="Straight Arrow Connector 18"/>
+          <p:cNvCxnSpPr/>
+          <p:nvPr/>
+        </p:nvCxnSpPr>
+        <p:spPr>
+          <a:xfrm>
+            <a:off x="2051720" y="4077072"/>
+            <a:ext cx="1800200" cy="0"/>
+          </a:xfrm>
+          <a:prstGeom prst="straightConnector1">
+            <a:avLst/>
+          </a:prstGeom>
+          <a:ln w="44450">
+            <a:solidFill>
+              <a:srgbClr val="FF0000"/>
+            </a:solidFill>
+            <a:tailEnd type="arrow"/>
+          </a:ln>
+        </p:spPr>
+        <p:style>
+          <a:lnRef idx="1">
+            <a:schemeClr val="accent1"/>
+          </a:lnRef>
+          <a:fillRef idx="0">
+            <a:schemeClr val="accent1"/>
+          </a:fillRef>
+          <a:effectRef idx="0">
+            <a:schemeClr val="accent1"/>
+          </a:effectRef>
+          <a:fontRef idx="minor">
+            <a:schemeClr val="tx1"/>
+          </a:fontRef>
+        </p:style>
+      </p:cxnSp>
+    </p:spTree>
+    <p:extLst>
+      <p:ext uri="{BB962C8B-B14F-4D97-AF65-F5344CB8AC3E}">
+        <p14:creationId xmlns:p14="http://schemas.microsoft.com/office/powerpoint/2010/main" val="1506512412"/>
+      </p:ext>
+    </p:extLst>
+  </p:cSld>
+  <p:clrMapOvr>
+    <a:masterClrMapping/>
+  </p:clrMapOvr>
+</p:sld>
+</file>
+
+<file path=ppt/slides/slide37.xml><?xml version="1.0" encoding="utf-8"?>
+<p:sld xmlns:a="http://schemas.openxmlformats.org/drawingml/2006/main" xmlns:r="http://schemas.openxmlformats.org/officeDocument/2006/relationships" xmlns:p="http://schemas.openxmlformats.org/presentationml/2006/main">
+  <p:cSld>
+    <p:spTree>
+      <p:nvGrpSpPr>
+        <p:cNvPr id="1" name=""/>
+        <p:cNvGrpSpPr/>
+        <p:nvPr/>
+      </p:nvGrpSpPr>
+      <p:grpSpPr>
+        <a:xfrm>
+          <a:off x="0" y="0"/>
+          <a:ext cx="0" cy="0"/>
+          <a:chOff x="0" y="0"/>
+          <a:chExt cx="0" cy="0"/>
+        </a:xfrm>
+      </p:grpSpPr>
+      <p:sp>
+        <p:nvSpPr>
+          <p:cNvPr id="2" name="Title 1"/>
+          <p:cNvSpPr>
+            <a:spLocks noGrp="1"/>
+          </p:cNvSpPr>
+          <p:nvPr>
+            <p:ph type="title"/>
+          </p:nvPr>
+        </p:nvSpPr>
+        <p:spPr/>
+        <p:txBody>
+          <a:bodyPr/>
+          <a:lstStyle/>
+          <a:p>
+            <a:r>
+              <a:rPr lang="en-CA" dirty="0" smtClean="0"/>
+              <a:t>GIT AND TFS</a:t>
+            </a:r>
+            <a:endParaRPr lang="en-CA" dirty="0"/>
+          </a:p>
+        </p:txBody>
+      </p:sp>
+      <p:sp>
+        <p:nvSpPr>
+          <p:cNvPr id="3" name="Text Placeholder 2"/>
+          <p:cNvSpPr>
+            <a:spLocks noGrp="1"/>
+          </p:cNvSpPr>
+          <p:nvPr>
+            <p:ph type="body" idx="1"/>
+          </p:nvPr>
+        </p:nvSpPr>
+        <p:spPr/>
+        <p:txBody>
+          <a:bodyPr/>
+          <a:lstStyle/>
+          <a:p>
+            <a:endParaRPr lang="en-CA"/>
+          </a:p>
+        </p:txBody>
+      </p:sp>
+    </p:spTree>
+    <p:extLst>
+      <p:ext uri="{BB962C8B-B14F-4D97-AF65-F5344CB8AC3E}">
+        <p14:creationId xmlns:p14="http://schemas.microsoft.com/office/powerpoint/2010/main" val="2384397923"/>
+      </p:ext>
+    </p:extLst>
+  </p:cSld>
+  <p:clrMapOvr>
+    <a:masterClrMapping/>
+  </p:clrMapOvr>
+  <p:timing>
+    <p:tnLst>
+      <p:par>
+        <p:cTn id="1" dur="indefinite" restart="never" nodeType="tmRoot"/>
+      </p:par>
+    </p:tnLst>
+  </p:timing>
+</p:sld>
+</file>
+
+<file path=ppt/slides/slide38.xml><?xml version="1.0" encoding="utf-8"?>
+<p:sld xmlns:a="http://schemas.openxmlformats.org/drawingml/2006/main" xmlns:r="http://schemas.openxmlformats.org/officeDocument/2006/relationships" xmlns:p="http://schemas.openxmlformats.org/presentationml/2006/main">
+  <p:cSld>
+    <p:spTree>
+      <p:nvGrpSpPr>
+        <p:cNvPr id="1" name=""/>
+        <p:cNvGrpSpPr/>
+        <p:nvPr/>
+      </p:nvGrpSpPr>
+      <p:grpSpPr>
+        <a:xfrm>
+          <a:off x="0" y="0"/>
+          <a:ext cx="0" cy="0"/>
+          <a:chOff x="0" y="0"/>
+          <a:chExt cx="0" cy="0"/>
+        </a:xfrm>
+      </p:grpSpPr>
+      <p:sp>
+        <p:nvSpPr>
+          <p:cNvPr id="2" name="Title 1"/>
+          <p:cNvSpPr>
+            <a:spLocks noGrp="1"/>
+          </p:cNvSpPr>
+          <p:nvPr>
+            <p:ph type="title"/>
+          </p:nvPr>
+        </p:nvSpPr>
+        <p:spPr/>
+        <p:txBody>
+          <a:bodyPr>
+            <a:normAutofit fontScale="90000"/>
+          </a:bodyPr>
+          <a:lstStyle/>
+          <a:p>
+            <a:r>
+              <a:rPr lang="en-CA" dirty="0" smtClean="0"/>
+              <a:t>HOW TO ACCESS A NATIVE TFS REPOSITORY WITH GIT</a:t>
+            </a:r>
+            <a:endParaRPr lang="en-CA" dirty="0"/>
+          </a:p>
+        </p:txBody>
+      </p:sp>
+      <p:sp>
+        <p:nvSpPr>
+          <p:cNvPr id="3" name="Content Placeholder 2"/>
+          <p:cNvSpPr>
+            <a:spLocks noGrp="1"/>
+          </p:cNvSpPr>
+          <p:nvPr>
+            <p:ph idx="1"/>
+          </p:nvPr>
+        </p:nvSpPr>
+        <p:spPr/>
+        <p:txBody>
+          <a:bodyPr>
+            <a:normAutofit fontScale="92500" lnSpcReduction="20000"/>
+          </a:bodyPr>
+          <a:lstStyle/>
+          <a:p>
+            <a:pPr marL="0" indent="0">
+              <a:buNone/>
+            </a:pPr>
+            <a:r>
+              <a:rPr lang="en-CA" dirty="0" smtClean="0"/>
+              <a:t>GIT-TF tool is located here: </a:t>
+            </a:r>
+            <a:r>
+              <a:rPr lang="en-CA" dirty="0" smtClean="0">
+                <a:hlinkClick r:id="rId2"/>
+              </a:rPr>
+              <a:t>https</a:t>
+            </a:r>
+            <a:r>
+              <a:rPr lang="en-CA" dirty="0">
+                <a:hlinkClick r:id="rId2"/>
+              </a:rPr>
+              <a:t>://gittf.codeplex.com</a:t>
+            </a:r>
+            <a:r>
+              <a:rPr lang="en-CA" dirty="0" smtClean="0">
+                <a:hlinkClick r:id="rId2"/>
+              </a:rPr>
+              <a:t>/</a:t>
+            </a:r>
+            <a:endParaRPr lang="en-CA" dirty="0" smtClean="0"/>
+          </a:p>
+          <a:p>
+            <a:pPr marL="0" indent="0">
+              <a:buNone/>
+            </a:pPr>
+            <a:endParaRPr lang="en-CA" dirty="0"/>
+          </a:p>
+          <a:p>
+            <a:pPr marL="0" indent="0">
+              <a:buNone/>
+            </a:pPr>
+            <a:r>
+              <a:rPr lang="en-CA" dirty="0" smtClean="0"/>
+              <a:t>This tool reads a native TFS repository and formats it as a local GIT repository for me to work with the usual way. The only changes are the push and pull commands, which are no longer working. I have to use the special TFS sync commands.</a:t>
+            </a:r>
+          </a:p>
+          <a:p>
+            <a:pPr marL="0" indent="0">
+              <a:buNone/>
+            </a:pPr>
+            <a:endParaRPr lang="en-CA" dirty="0"/>
+          </a:p>
+          <a:p>
+            <a:pPr marL="0" indent="0">
+              <a:buNone/>
+            </a:pPr>
+            <a:r>
+              <a:rPr lang="en-CA" dirty="0" smtClean="0"/>
+              <a:t>All my GIT commits are squashed as a single TFS commit and my branches become TFS </a:t>
+            </a:r>
+            <a:r>
+              <a:rPr lang="en-CA" dirty="0" err="1" smtClean="0"/>
+              <a:t>shelvesets</a:t>
+            </a:r>
+            <a:r>
+              <a:rPr lang="en-CA" dirty="0" smtClean="0"/>
+              <a:t>.</a:t>
+            </a:r>
+          </a:p>
+        </p:txBody>
+      </p:sp>
+    </p:spTree>
+    <p:extLst>
+      <p:ext uri="{BB962C8B-B14F-4D97-AF65-F5344CB8AC3E}">
+        <p14:creationId xmlns:p14="http://schemas.microsoft.com/office/powerpoint/2010/main" val="3034071520"/>
+      </p:ext>
+    </p:extLst>
+  </p:cSld>
+  <p:clrMapOvr>
+    <a:masterClrMapping/>
+  </p:clrMapOvr>
+</p:sld>
+</file>
+
 <file path=ppt/slides/slide4.xml><?xml version="1.0" encoding="utf-8"?>
 <p:sld xmlns:a="http://schemas.openxmlformats.org/drawingml/2006/main" xmlns:r="http://schemas.openxmlformats.org/officeDocument/2006/relationships" xmlns:p="http://schemas.openxmlformats.org/presentationml/2006/main">
   <p:cSld>
@@ -14370,7 +18645,6 @@
               <a:rPr lang="en-CA" dirty="0"/>
               <a:t>A GIT REPOSITORY</a:t>
             </a:r>
-            <a:endParaRPr lang="en-CA" dirty="0"/>
           </a:p>
         </p:txBody>
       </p:sp>
@@ -14529,7 +18803,6 @@
               <a:rPr lang="en-CA" dirty="0"/>
               <a:t>A GIT REPOSITORY</a:t>
             </a:r>
-            <a:endParaRPr lang="en-CA" dirty="0"/>
           </a:p>
         </p:txBody>
       </p:sp>
@@ -14641,7 +18914,6 @@
               <a:rPr lang="en-CA" dirty="0"/>
               <a:t>A GIT REPOSITORY</a:t>
             </a:r>
-            <a:endParaRPr lang="en-CA" dirty="0"/>
           </a:p>
         </p:txBody>
       </p:sp>
@@ -15381,7 +19653,6 @@
               <a:rPr lang="en-CA" dirty="0"/>
               <a:t>A GIT REPOSITORY</a:t>
             </a:r>
-            <a:endParaRPr lang="en-CA" dirty="0"/>
           </a:p>
         </p:txBody>
       </p:sp>

</xml_diff>